<commit_message>
Respuestas para el profesor Germán
</commit_message>
<xml_diff>
--- a/presentation/Examen de Calificacion de Doctorado_Carlos_Alberto_Salazar.pptx
+++ b/presentation/Examen de Calificacion de Doctorado_Carlos_Alberto_Salazar.pptx
@@ -18956,8 +18956,8 @@
         </p:blipFill>
         <p:spPr>
           <a:xfrm>
-            <a:off x="990600" y="4802215"/>
-            <a:ext cx="6629400" cy="1233863"/>
+            <a:off x="838262" y="5055104"/>
+            <a:ext cx="5029073" cy="1089646"/>
           </a:xfrm>
           <a:prstGeom prst="rect">
             <a:avLst/>
@@ -18979,13 +18979,13 @@
           <p:nvPr>
             <p:extLst>
               <p:ext uri="{D42A27DB-BD31-4B8C-83A1-F6EECF244321}">
-                <p14:modId xmlns:p14="http://schemas.microsoft.com/office/powerpoint/2010/main" val="2592638202"/>
+                <p14:modId xmlns:p14="http://schemas.microsoft.com/office/powerpoint/2010/main" val="249345361"/>
               </p:ext>
             </p:extLst>
           </p:nvPr>
         </p:nvGraphicFramePr>
         <p:xfrm>
-          <a:off x="6830060" y="1977006"/>
+          <a:off x="6557010" y="1961028"/>
           <a:ext cx="5181600" cy="2573252"/>
         </p:xfrm>
         <a:graphic>
@@ -19008,7 +19008,7 @@
         </p:nvSpPr>
         <p:spPr>
           <a:xfrm>
-            <a:off x="6934200" y="1581933"/>
+            <a:off x="6705600" y="1547741"/>
             <a:ext cx="6096000" cy="286232"/>
           </a:xfrm>
           <a:prstGeom prst="rect">
@@ -19079,7 +19079,7 @@
         <p:spPr>
           <a:xfrm>
             <a:off x="762000" y="1601819"/>
-            <a:ext cx="4253808" cy="738664"/>
+            <a:ext cx="5181600" cy="3065455"/>
           </a:xfrm>
           <a:prstGeom prst="rect">
             <a:avLst/>
@@ -19139,9 +19139,195 @@
                 <a:solidFill>
                   <a:prstClr val="black"/>
                 </a:solidFill>
+                <a:highlight>
+                  <a:srgbClr val="FFFF00"/>
+                </a:highlight>
                 <a:latin typeface="Ancizar Sans Black"/>
               </a:rPr>
-              <a:t>Both AOM (V</a:t>
+              <a:t>Both AOM AV2)  (Draft) and JVET(Draft) working groups are focus on  preserve the current scheme and explore DL-tools</a:t>
+            </a:r>
+          </a:p>
+          <a:p>
+            <a:pPr marL="285750" lvl="1" indent="-285750" defTabSz="800100">
+              <a:lnSpc>
+                <a:spcPct val="90000"/>
+              </a:lnSpc>
+              <a:spcBef>
+                <a:spcPct val="0"/>
+              </a:spcBef>
+              <a:spcAft>
+                <a:spcPct val="15000"/>
+              </a:spcAft>
+              <a:buClr>
+                <a:schemeClr val="accent2">
+                  <a:lumMod val="50000"/>
+                </a:schemeClr>
+              </a:buClr>
+              <a:buFont typeface="Wingdings" pitchFamily="2" charset="2"/>
+              <a:buChar char="Ø"/>
+            </a:pPr>
+            <a:endParaRPr lang="en-US" sz="1400" dirty="0">
+              <a:solidFill>
+                <a:prstClr val="black"/>
+              </a:solidFill>
+              <a:highlight>
+                <a:srgbClr val="FFFF00"/>
+              </a:highlight>
+              <a:latin typeface="Ancizar Sans Black"/>
+            </a:endParaRPr>
+          </a:p>
+          <a:p>
+            <a:pPr marL="285750" lvl="1" indent="-285750" defTabSz="800100">
+              <a:lnSpc>
+                <a:spcPct val="90000"/>
+              </a:lnSpc>
+              <a:spcBef>
+                <a:spcPct val="0"/>
+              </a:spcBef>
+              <a:spcAft>
+                <a:spcPct val="15000"/>
+              </a:spcAft>
+              <a:buClr>
+                <a:schemeClr val="accent2">
+                  <a:lumMod val="50000"/>
+                </a:schemeClr>
+              </a:buClr>
+              <a:buFont typeface="Wingdings" pitchFamily="2" charset="2"/>
+              <a:buChar char="Ø"/>
+            </a:pPr>
+            <a:r>
+              <a:rPr lang="en-US" sz="1400" dirty="0">
+                <a:solidFill>
+                  <a:prstClr val="black"/>
+                </a:solidFill>
+                <a:highlight>
+                  <a:srgbClr val="FFFF00"/>
+                </a:highlight>
+                <a:latin typeface="Ancizar Sans Black"/>
+              </a:rPr>
+              <a:t>Previous research around DL Tools have not been successfully deployed into the reference code, mainly because computational cost and architecture changes</a:t>
+            </a:r>
+          </a:p>
+          <a:p>
+            <a:pPr marL="285750" lvl="1" indent="-285750" defTabSz="800100">
+              <a:lnSpc>
+                <a:spcPct val="90000"/>
+              </a:lnSpc>
+              <a:spcBef>
+                <a:spcPct val="0"/>
+              </a:spcBef>
+              <a:spcAft>
+                <a:spcPct val="15000"/>
+              </a:spcAft>
+              <a:buClr>
+                <a:schemeClr val="accent2">
+                  <a:lumMod val="50000"/>
+                </a:schemeClr>
+              </a:buClr>
+              <a:buFont typeface="Wingdings" pitchFamily="2" charset="2"/>
+              <a:buChar char="Ø"/>
+            </a:pPr>
+            <a:endParaRPr lang="en-US" sz="1400" dirty="0">
+              <a:solidFill>
+                <a:prstClr val="black"/>
+              </a:solidFill>
+              <a:highlight>
+                <a:srgbClr val="FFFF00"/>
+              </a:highlight>
+              <a:latin typeface="Ancizar Sans Black"/>
+            </a:endParaRPr>
+          </a:p>
+          <a:p>
+            <a:pPr marL="285750" lvl="1" indent="-285750" defTabSz="800100">
+              <a:lnSpc>
+                <a:spcPct val="90000"/>
+              </a:lnSpc>
+              <a:spcBef>
+                <a:spcPct val="0"/>
+              </a:spcBef>
+              <a:spcAft>
+                <a:spcPct val="15000"/>
+              </a:spcAft>
+              <a:buClr>
+                <a:schemeClr val="accent2">
+                  <a:lumMod val="50000"/>
+                </a:schemeClr>
+              </a:buClr>
+              <a:buFont typeface="Wingdings" pitchFamily="2" charset="2"/>
+              <a:buChar char="Ø"/>
+            </a:pPr>
+            <a:r>
+              <a:rPr lang="en-US" sz="1400" dirty="0">
+                <a:solidFill>
+                  <a:prstClr val="black"/>
+                </a:solidFill>
+                <a:highlight>
+                  <a:srgbClr val="FFFF00"/>
+                </a:highlight>
+                <a:latin typeface="Ancizar Sans Black"/>
+              </a:rPr>
+              <a:t>The research community has been concentrated around  Intra and Inter prediction since 2018</a:t>
+            </a:r>
+          </a:p>
+          <a:p>
+            <a:pPr marL="285750" lvl="1" indent="-285750" defTabSz="800100">
+              <a:lnSpc>
+                <a:spcPct val="90000"/>
+              </a:lnSpc>
+              <a:spcBef>
+                <a:spcPct val="0"/>
+              </a:spcBef>
+              <a:spcAft>
+                <a:spcPct val="15000"/>
+              </a:spcAft>
+              <a:buClr>
+                <a:schemeClr val="accent2">
+                  <a:lumMod val="50000"/>
+                </a:schemeClr>
+              </a:buClr>
+              <a:buFont typeface="Wingdings" pitchFamily="2" charset="2"/>
+              <a:buChar char="Ø"/>
+            </a:pPr>
+            <a:endParaRPr lang="en-US" sz="1400" dirty="0">
+              <a:solidFill>
+                <a:prstClr val="black"/>
+              </a:solidFill>
+              <a:highlight>
+                <a:srgbClr val="FFFF00"/>
+              </a:highlight>
+              <a:latin typeface="Ancizar Sans Black"/>
+            </a:endParaRPr>
+          </a:p>
+          <a:p>
+            <a:pPr marL="285750" lvl="1" indent="-285750" defTabSz="800100">
+              <a:lnSpc>
+                <a:spcPct val="90000"/>
+              </a:lnSpc>
+              <a:spcBef>
+                <a:spcPct val="0"/>
+              </a:spcBef>
+              <a:spcAft>
+                <a:spcPct val="15000"/>
+              </a:spcAft>
+              <a:buClr>
+                <a:schemeClr val="accent2">
+                  <a:lumMod val="50000"/>
+                </a:schemeClr>
+              </a:buClr>
+              <a:buFont typeface="Wingdings" pitchFamily="2" charset="2"/>
+              <a:buChar char="Ø"/>
+            </a:pPr>
+            <a:r>
+              <a:rPr lang="en-US" sz="1400" dirty="0">
+                <a:solidFill>
+                  <a:prstClr val="black"/>
+                </a:solidFill>
+                <a:highlight>
+                  <a:srgbClr val="FFFF00"/>
+                </a:highlight>
+                <a:latin typeface="Ancizar Sans Black"/>
+              </a:rPr>
+              <a:t>Restoration filters are relatively new. They were introduced in AV1 () and HEVC () and are a potential optimization focus ()</a:t>
             </a:r>
           </a:p>
           <a:p>
@@ -19167,6 +19353,276 @@
               </a:solidFill>
               <a:latin typeface="Ancizar Sans Black"/>
             </a:endParaRPr>
+          </a:p>
+        </p:txBody>
+      </p:sp>
+      <p:sp>
+        <p:nvSpPr>
+          <p:cNvPr id="15" name="Rectangle 14">
+            <a:extLst>
+              <a:ext uri="{FF2B5EF4-FFF2-40B4-BE49-F238E27FC236}">
+                <a16:creationId xmlns:a16="http://schemas.microsoft.com/office/drawing/2014/main" id="{695B068B-9F41-204B-ABA5-8DBE7BCFA136}"/>
+              </a:ext>
+            </a:extLst>
+          </p:cNvPr>
+          <p:cNvSpPr/>
+          <p:nvPr/>
+        </p:nvSpPr>
+        <p:spPr>
+          <a:xfrm>
+            <a:off x="7086600" y="2286000"/>
+            <a:ext cx="1066800" cy="1143000"/>
+          </a:xfrm>
+          <a:prstGeom prst="rect">
+            <a:avLst/>
+          </a:prstGeom>
+          <a:solidFill>
+            <a:schemeClr val="accent1">
+              <a:alpha val="0"/>
+            </a:schemeClr>
+          </a:solidFill>
+          <a:ln w="22225">
+            <a:solidFill>
+              <a:schemeClr val="accent6"/>
+            </a:solidFill>
+            <a:prstDash val="sysDot"/>
+          </a:ln>
+        </p:spPr>
+        <p:style>
+          <a:lnRef idx="2">
+            <a:schemeClr val="accent1">
+              <a:shade val="50000"/>
+            </a:schemeClr>
+          </a:lnRef>
+          <a:fillRef idx="1">
+            <a:schemeClr val="accent1"/>
+          </a:fillRef>
+          <a:effectRef idx="0">
+            <a:schemeClr val="accent1"/>
+          </a:effectRef>
+          <a:fontRef idx="minor">
+            <a:schemeClr val="lt1"/>
+          </a:fontRef>
+        </p:style>
+        <p:txBody>
+          <a:bodyPr rtlCol="0" anchor="ctr"/>
+          <a:lstStyle/>
+          <a:p>
+            <a:pPr algn="ctr"/>
+            <a:endParaRPr lang="en-CO"/>
+          </a:p>
+        </p:txBody>
+      </p:sp>
+      <p:sp>
+        <p:nvSpPr>
+          <p:cNvPr id="16" name="Rectangle 15">
+            <a:extLst>
+              <a:ext uri="{FF2B5EF4-FFF2-40B4-BE49-F238E27FC236}">
+                <a16:creationId xmlns:a16="http://schemas.microsoft.com/office/drawing/2014/main" id="{F5BDB8CC-EA74-C349-8656-634948D3A7F5}"/>
+              </a:ext>
+            </a:extLst>
+          </p:cNvPr>
+          <p:cNvSpPr/>
+          <p:nvPr/>
+        </p:nvSpPr>
+        <p:spPr>
+          <a:xfrm>
+            <a:off x="6324666" y="5050604"/>
+            <a:ext cx="5638734" cy="1094146"/>
+          </a:xfrm>
+          <a:prstGeom prst="rect">
+            <a:avLst/>
+          </a:prstGeom>
+        </p:spPr>
+        <p:txBody>
+          <a:bodyPr wrap="square">
+            <a:spAutoFit/>
+          </a:bodyPr>
+          <a:lstStyle/>
+          <a:p>
+            <a:pPr marL="285750" lvl="1" indent="-285750" defTabSz="800100">
+              <a:lnSpc>
+                <a:spcPct val="90000"/>
+              </a:lnSpc>
+              <a:spcBef>
+                <a:spcPct val="0"/>
+              </a:spcBef>
+              <a:spcAft>
+                <a:spcPct val="15000"/>
+              </a:spcAft>
+              <a:buClr>
+                <a:schemeClr val="accent2">
+                  <a:lumMod val="50000"/>
+                </a:schemeClr>
+              </a:buClr>
+              <a:buFont typeface="Wingdings" pitchFamily="2" charset="2"/>
+              <a:buChar char="Ø"/>
+            </a:pPr>
+            <a:r>
+              <a:rPr lang="en-US" sz="1400" dirty="0">
+                <a:solidFill>
+                  <a:prstClr val="black"/>
+                </a:solidFill>
+                <a:latin typeface="Ancizar Sans Black"/>
+              </a:rPr>
+              <a:t>Standardization process is only announced through focus working groups</a:t>
+            </a:r>
+          </a:p>
+          <a:p>
+            <a:pPr marL="285750" lvl="1" indent="-285750" defTabSz="800100">
+              <a:lnSpc>
+                <a:spcPct val="90000"/>
+              </a:lnSpc>
+              <a:spcBef>
+                <a:spcPct val="0"/>
+              </a:spcBef>
+              <a:spcAft>
+                <a:spcPct val="15000"/>
+              </a:spcAft>
+              <a:buClr>
+                <a:schemeClr val="accent2">
+                  <a:lumMod val="50000"/>
+                </a:schemeClr>
+              </a:buClr>
+              <a:buFont typeface="Wingdings" pitchFamily="2" charset="2"/>
+              <a:buChar char="Ø"/>
+            </a:pPr>
+            <a:r>
+              <a:rPr lang="en-US" sz="1400" dirty="0">
+                <a:solidFill>
+                  <a:prstClr val="black"/>
+                </a:solidFill>
+                <a:latin typeface="Ancizar Sans Black"/>
+              </a:rPr>
+              <a:t>Tools which aim to be part of AV2 needs to pass acceptance criteria at different level, such as hardware cost  and compression efficiency. It is only possible as member of AOM.</a:t>
+            </a:r>
+          </a:p>
+        </p:txBody>
+      </p:sp>
+      <p:sp>
+        <p:nvSpPr>
+          <p:cNvPr id="17" name="Rectangle 16">
+            <a:extLst>
+              <a:ext uri="{FF2B5EF4-FFF2-40B4-BE49-F238E27FC236}">
+                <a16:creationId xmlns:a16="http://schemas.microsoft.com/office/drawing/2014/main" id="{D986A87A-5843-C94D-AD2F-46DC71D659F4}"/>
+              </a:ext>
+            </a:extLst>
+          </p:cNvPr>
+          <p:cNvSpPr/>
+          <p:nvPr/>
+        </p:nvSpPr>
+        <p:spPr>
+          <a:xfrm>
+            <a:off x="6710089" y="4534560"/>
+            <a:ext cx="6096000" cy="258532"/>
+          </a:xfrm>
+          <a:prstGeom prst="rect">
+            <a:avLst/>
+          </a:prstGeom>
+        </p:spPr>
+        <p:txBody>
+          <a:bodyPr>
+            <a:spAutoFit/>
+          </a:bodyPr>
+          <a:lstStyle/>
+          <a:p>
+            <a:pPr marL="0" lvl="1" defTabSz="800100">
+              <a:lnSpc>
+                <a:spcPct val="90000"/>
+              </a:lnSpc>
+              <a:spcBef>
+                <a:spcPct val="0"/>
+              </a:spcBef>
+              <a:spcAft>
+                <a:spcPct val="15000"/>
+              </a:spcAft>
+              <a:buClr>
+                <a:schemeClr val="accent2">
+                  <a:lumMod val="50000"/>
+                </a:schemeClr>
+              </a:buClr>
+            </a:pPr>
+            <a:r>
+              <a:rPr lang="en-US" sz="1200" b="1" dirty="0">
+                <a:solidFill>
+                  <a:prstClr val="black"/>
+                </a:solidFill>
+                <a:latin typeface="Ancizar Sans Black"/>
+              </a:rPr>
+              <a:t>Sources:  </a:t>
+            </a:r>
+            <a:r>
+              <a:rPr lang="en-US" sz="1200" dirty="0">
+                <a:solidFill>
+                  <a:prstClr val="black"/>
+                </a:solidFill>
+                <a:latin typeface="Ancizar Sans Black"/>
+              </a:rPr>
+              <a:t>Mendeley and Scopus databases</a:t>
+            </a:r>
+            <a:endParaRPr lang="en-CO" sz="1200" dirty="0">
+              <a:solidFill>
+                <a:prstClr val="black"/>
+              </a:solidFill>
+              <a:latin typeface="Ancizar Sans Black"/>
+            </a:endParaRPr>
+          </a:p>
+        </p:txBody>
+      </p:sp>
+      <p:sp>
+        <p:nvSpPr>
+          <p:cNvPr id="18" name="Rectangle 17">
+            <a:extLst>
+              <a:ext uri="{FF2B5EF4-FFF2-40B4-BE49-F238E27FC236}">
+                <a16:creationId xmlns:a16="http://schemas.microsoft.com/office/drawing/2014/main" id="{C33F9AD9-9DFD-EF4D-B69A-C531441894E3}"/>
+              </a:ext>
+            </a:extLst>
+          </p:cNvPr>
+          <p:cNvSpPr/>
+          <p:nvPr/>
+        </p:nvSpPr>
+        <p:spPr>
+          <a:xfrm>
+            <a:off x="10287000" y="3581400"/>
+            <a:ext cx="685800" cy="618798"/>
+          </a:xfrm>
+          <a:prstGeom prst="rect">
+            <a:avLst/>
+          </a:prstGeom>
+          <a:solidFill>
+            <a:schemeClr val="accent1">
+              <a:alpha val="0"/>
+            </a:schemeClr>
+          </a:solidFill>
+          <a:ln w="22225">
+            <a:solidFill>
+              <a:schemeClr val="accent6"/>
+            </a:solidFill>
+            <a:prstDash val="sysDot"/>
+          </a:ln>
+        </p:spPr>
+        <p:style>
+          <a:lnRef idx="2">
+            <a:schemeClr val="accent1">
+              <a:shade val="50000"/>
+            </a:schemeClr>
+          </a:lnRef>
+          <a:fillRef idx="1">
+            <a:schemeClr val="accent1"/>
+          </a:fillRef>
+          <a:effectRef idx="0">
+            <a:schemeClr val="accent1"/>
+          </a:effectRef>
+          <a:fontRef idx="minor">
+            <a:schemeClr val="lt1"/>
+          </a:fontRef>
+        </p:style>
+        <p:txBody>
+          <a:bodyPr rtlCol="0" anchor="ctr"/>
+          <a:lstStyle/>
+          <a:p>
+            <a:pPr algn="ctr"/>
+            <a:endParaRPr lang="en-CO"/>
           </a:p>
         </p:txBody>
       </p:sp>
@@ -19500,6 +19956,1241 @@
           </a:p>
         </p:txBody>
       </p:sp>
+      <p:sp>
+        <p:nvSpPr>
+          <p:cNvPr id="5" name="TextBox 4">
+            <a:extLst>
+              <a:ext uri="{FF2B5EF4-FFF2-40B4-BE49-F238E27FC236}">
+                <a16:creationId xmlns:a16="http://schemas.microsoft.com/office/drawing/2014/main" id="{19A02993-A2E5-AD41-930B-E343CB3F8B46}"/>
+              </a:ext>
+            </a:extLst>
+          </p:cNvPr>
+          <p:cNvSpPr txBox="1"/>
+          <p:nvPr/>
+        </p:nvSpPr>
+        <p:spPr>
+          <a:xfrm>
+            <a:off x="762000" y="1601819"/>
+            <a:ext cx="4267200" cy="4034951"/>
+          </a:xfrm>
+          <a:prstGeom prst="rect">
+            <a:avLst/>
+          </a:prstGeom>
+          <a:noFill/>
+        </p:spPr>
+        <p:txBody>
+          <a:bodyPr wrap="square" rtlCol="0">
+            <a:spAutoFit/>
+          </a:bodyPr>
+          <a:lstStyle/>
+          <a:p>
+            <a:pPr marL="0" lvl="1" defTabSz="800100">
+              <a:lnSpc>
+                <a:spcPct val="90000"/>
+              </a:lnSpc>
+              <a:spcBef>
+                <a:spcPct val="0"/>
+              </a:spcBef>
+              <a:spcAft>
+                <a:spcPct val="15000"/>
+              </a:spcAft>
+              <a:buClr>
+                <a:schemeClr val="accent2">
+                  <a:lumMod val="50000"/>
+                </a:schemeClr>
+              </a:buClr>
+            </a:pPr>
+            <a:endParaRPr lang="en-US" sz="1400" dirty="0">
+              <a:solidFill>
+                <a:prstClr val="black"/>
+              </a:solidFill>
+              <a:highlight>
+                <a:srgbClr val="FFFF00"/>
+              </a:highlight>
+              <a:latin typeface="Ancizar Sans Black"/>
+            </a:endParaRPr>
+          </a:p>
+          <a:p>
+            <a:pPr marL="285750" lvl="1" indent="-285750" defTabSz="800100">
+              <a:lnSpc>
+                <a:spcPct val="90000"/>
+              </a:lnSpc>
+              <a:spcBef>
+                <a:spcPct val="0"/>
+              </a:spcBef>
+              <a:spcAft>
+                <a:spcPct val="15000"/>
+              </a:spcAft>
+              <a:buClr>
+                <a:schemeClr val="accent2">
+                  <a:lumMod val="50000"/>
+                </a:schemeClr>
+              </a:buClr>
+              <a:buFont typeface="Wingdings" pitchFamily="2" charset="2"/>
+              <a:buChar char="Ø"/>
+            </a:pPr>
+            <a:r>
+              <a:rPr lang="en-US" sz="1400" i="1" dirty="0">
+                <a:solidFill>
+                  <a:prstClr val="black"/>
+                </a:solidFill>
+                <a:latin typeface="Ancizar Sans Black"/>
+              </a:rPr>
+              <a:t>“﻿the Wiener filter is particularly good at super-resolving and recovering lost high frequencies (…)  ﻿it is highly recommended that the loop-restoration tool is also used, even though that is not enforced in the bit-stream syntax. In fact, without this tool, there is no super-resolving, only upscaling in AV1” (Joshi, 2019)</a:t>
+            </a:r>
+          </a:p>
+          <a:p>
+            <a:pPr marL="285750" lvl="1" indent="-285750" defTabSz="800100">
+              <a:lnSpc>
+                <a:spcPct val="90000"/>
+              </a:lnSpc>
+              <a:spcBef>
+                <a:spcPct val="0"/>
+              </a:spcBef>
+              <a:spcAft>
+                <a:spcPct val="15000"/>
+              </a:spcAft>
+              <a:buClr>
+                <a:schemeClr val="accent2">
+                  <a:lumMod val="50000"/>
+                </a:schemeClr>
+              </a:buClr>
+              <a:buFont typeface="Wingdings" pitchFamily="2" charset="2"/>
+              <a:buChar char="Ø"/>
+            </a:pPr>
+            <a:endParaRPr lang="en-US" sz="1400" i="1" dirty="0">
+              <a:solidFill>
+                <a:prstClr val="black"/>
+              </a:solidFill>
+              <a:latin typeface="Ancizar Sans Black"/>
+            </a:endParaRPr>
+          </a:p>
+          <a:p>
+            <a:pPr marL="285750" lvl="1" indent="-285750" defTabSz="800100">
+              <a:lnSpc>
+                <a:spcPct val="90000"/>
+              </a:lnSpc>
+              <a:spcBef>
+                <a:spcPct val="0"/>
+              </a:spcBef>
+              <a:spcAft>
+                <a:spcPct val="15000"/>
+              </a:spcAft>
+              <a:buClr>
+                <a:schemeClr val="accent2">
+                  <a:lumMod val="50000"/>
+                </a:schemeClr>
+              </a:buClr>
+              <a:buFont typeface="Wingdings" pitchFamily="2" charset="2"/>
+              <a:buChar char="Ø"/>
+            </a:pPr>
+            <a:r>
+              <a:rPr lang="en-US" sz="1400" dirty="0">
+                <a:solidFill>
+                  <a:prstClr val="black"/>
+                </a:solidFill>
+                <a:latin typeface="Ancizar Sans Black"/>
+              </a:rPr>
+              <a:t>Restoration filters is a potential area where machine learning could bring processing time benefits based on pre-trained (offline) and context aware models </a:t>
+            </a:r>
+          </a:p>
+          <a:p>
+            <a:pPr marL="0" lvl="1" defTabSz="800100">
+              <a:lnSpc>
+                <a:spcPct val="90000"/>
+              </a:lnSpc>
+              <a:spcBef>
+                <a:spcPct val="0"/>
+              </a:spcBef>
+              <a:spcAft>
+                <a:spcPct val="15000"/>
+              </a:spcAft>
+              <a:buClr>
+                <a:schemeClr val="accent2">
+                  <a:lumMod val="50000"/>
+                </a:schemeClr>
+              </a:buClr>
+            </a:pPr>
+            <a:endParaRPr lang="en-US" sz="1400" dirty="0">
+              <a:solidFill>
+                <a:prstClr val="black"/>
+              </a:solidFill>
+              <a:highlight>
+                <a:srgbClr val="FFFF00"/>
+              </a:highlight>
+              <a:latin typeface="Ancizar Sans Black"/>
+            </a:endParaRPr>
+          </a:p>
+          <a:p>
+            <a:pPr marL="285750" lvl="1" indent="-285750" defTabSz="800100">
+              <a:lnSpc>
+                <a:spcPct val="90000"/>
+              </a:lnSpc>
+              <a:spcBef>
+                <a:spcPct val="0"/>
+              </a:spcBef>
+              <a:spcAft>
+                <a:spcPct val="15000"/>
+              </a:spcAft>
+              <a:buClr>
+                <a:schemeClr val="accent2">
+                  <a:lumMod val="50000"/>
+                </a:schemeClr>
+              </a:buClr>
+              <a:buFont typeface="Wingdings" pitchFamily="2" charset="2"/>
+              <a:buChar char="Ø"/>
+            </a:pPr>
+            <a:r>
+              <a:rPr lang="en-US" sz="1400" dirty="0">
+                <a:solidFill>
+                  <a:prstClr val="black"/>
+                </a:solidFill>
+                <a:latin typeface="Ancizar Sans Black"/>
+              </a:rPr>
+              <a:t>Restoration filters show bitrate savings  for both high al low resolutions (Joshi, 2019)</a:t>
+            </a:r>
+          </a:p>
+          <a:p>
+            <a:pPr marL="285750" lvl="1" indent="-285750" defTabSz="800100">
+              <a:lnSpc>
+                <a:spcPct val="90000"/>
+              </a:lnSpc>
+              <a:spcBef>
+                <a:spcPct val="0"/>
+              </a:spcBef>
+              <a:spcAft>
+                <a:spcPct val="15000"/>
+              </a:spcAft>
+              <a:buClr>
+                <a:schemeClr val="accent2">
+                  <a:lumMod val="50000"/>
+                </a:schemeClr>
+              </a:buClr>
+              <a:buFont typeface="Wingdings" pitchFamily="2" charset="2"/>
+              <a:buChar char="Ø"/>
+            </a:pPr>
+            <a:endParaRPr lang="en-US" sz="1400" dirty="0">
+              <a:solidFill>
+                <a:prstClr val="black"/>
+              </a:solidFill>
+              <a:latin typeface="Ancizar Sans Black"/>
+            </a:endParaRPr>
+          </a:p>
+          <a:p>
+            <a:pPr marL="285750" lvl="1" indent="-285750" defTabSz="800100">
+              <a:lnSpc>
+                <a:spcPct val="90000"/>
+              </a:lnSpc>
+              <a:spcBef>
+                <a:spcPct val="0"/>
+              </a:spcBef>
+              <a:spcAft>
+                <a:spcPct val="15000"/>
+              </a:spcAft>
+              <a:buClr>
+                <a:schemeClr val="accent2">
+                  <a:lumMod val="50000"/>
+                </a:schemeClr>
+              </a:buClr>
+              <a:buFont typeface="Wingdings" pitchFamily="2" charset="2"/>
+              <a:buChar char="Ø"/>
+            </a:pPr>
+            <a:r>
+              <a:rPr lang="en-US" sz="1400" dirty="0">
+                <a:solidFill>
+                  <a:prstClr val="black"/>
+                </a:solidFill>
+                <a:latin typeface="Ancizar Sans Black"/>
+              </a:rPr>
+              <a:t>AV2 aims to keep decoder complexity similar to AV1 (AOM,2020)</a:t>
+            </a:r>
+          </a:p>
+          <a:p>
+            <a:pPr marL="0" lvl="1" defTabSz="800100">
+              <a:lnSpc>
+                <a:spcPct val="90000"/>
+              </a:lnSpc>
+              <a:spcBef>
+                <a:spcPct val="0"/>
+              </a:spcBef>
+              <a:spcAft>
+                <a:spcPct val="15000"/>
+              </a:spcAft>
+              <a:buClr>
+                <a:schemeClr val="accent2">
+                  <a:lumMod val="50000"/>
+                </a:schemeClr>
+              </a:buClr>
+            </a:pPr>
+            <a:endParaRPr lang="en-US" sz="1400" dirty="0">
+              <a:solidFill>
+                <a:prstClr val="black"/>
+              </a:solidFill>
+              <a:highlight>
+                <a:srgbClr val="FFFF00"/>
+              </a:highlight>
+              <a:latin typeface="Ancizar Sans Black"/>
+            </a:endParaRPr>
+          </a:p>
+        </p:txBody>
+      </p:sp>
+      <p:graphicFrame>
+        <p:nvGraphicFramePr>
+          <p:cNvPr id="3" name="Table 2">
+            <a:extLst>
+              <a:ext uri="{FF2B5EF4-FFF2-40B4-BE49-F238E27FC236}">
+                <a16:creationId xmlns:a16="http://schemas.microsoft.com/office/drawing/2014/main" id="{477773DE-7D8F-9046-9527-DED169F1E04D}"/>
+              </a:ext>
+            </a:extLst>
+          </p:cNvPr>
+          <p:cNvGraphicFramePr>
+            <a:graphicFrameLocks noGrp="1"/>
+          </p:cNvGraphicFramePr>
+          <p:nvPr>
+            <p:extLst>
+              <p:ext uri="{D42A27DB-BD31-4B8C-83A1-F6EECF244321}">
+                <p14:modId xmlns:p14="http://schemas.microsoft.com/office/powerpoint/2010/main" val="4093234941"/>
+              </p:ext>
+            </p:extLst>
+          </p:nvPr>
+        </p:nvGraphicFramePr>
+        <p:xfrm>
+          <a:off x="6096000" y="2208181"/>
+          <a:ext cx="5486398" cy="1696085"/>
+        </p:xfrm>
+        <a:graphic>
+          <a:graphicData uri="http://schemas.openxmlformats.org/drawingml/2006/table">
+            <a:tbl>
+              <a:tblPr>
+                <a:tableStyleId>{5C22544A-7EE6-4342-B048-85BDC9FD1C3A}</a:tableStyleId>
+              </a:tblPr>
+              <a:tblGrid>
+                <a:gridCol w="1902148">
+                  <a:extLst>
+                    <a:ext uri="{9D8B030D-6E8A-4147-A177-3AD203B41FA5}">
+                      <a16:colId xmlns:a16="http://schemas.microsoft.com/office/drawing/2014/main" val="2053919110"/>
+                    </a:ext>
+                  </a:extLst>
+                </a:gridCol>
+                <a:gridCol w="892915">
+                  <a:extLst>
+                    <a:ext uri="{9D8B030D-6E8A-4147-A177-3AD203B41FA5}">
+                      <a16:colId xmlns:a16="http://schemas.microsoft.com/office/drawing/2014/main" val="381134983"/>
+                    </a:ext>
+                  </a:extLst>
+                </a:gridCol>
+                <a:gridCol w="953402">
+                  <a:extLst>
+                    <a:ext uri="{9D8B030D-6E8A-4147-A177-3AD203B41FA5}">
+                      <a16:colId xmlns:a16="http://schemas.microsoft.com/office/drawing/2014/main" val="2237659018"/>
+                    </a:ext>
+                  </a:extLst>
+                </a:gridCol>
+                <a:gridCol w="1737933">
+                  <a:extLst>
+                    <a:ext uri="{9D8B030D-6E8A-4147-A177-3AD203B41FA5}">
+                      <a16:colId xmlns:a16="http://schemas.microsoft.com/office/drawing/2014/main" val="842499024"/>
+                    </a:ext>
+                  </a:extLst>
+                </a:gridCol>
+              </a:tblGrid>
+              <a:tr h="304800">
+                <a:tc gridSpan="4">
+                  <a:txBody>
+                    <a:bodyPr/>
+                    <a:lstStyle/>
+                    <a:p>
+                      <a:pPr algn="ctr" fontAlgn="b"/>
+                      <a:r>
+                        <a:rPr lang="en-US" sz="1200" b="1" u="none" strike="noStrike" dirty="0">
+                          <a:effectLst/>
+                          <a:latin typeface="Times" pitchFamily="2" charset="0"/>
+                        </a:rPr>
+                        <a:t>Restoration Filter  (Weiner)</a:t>
+                      </a:r>
+                      <a:endParaRPr lang="en-US" sz="1200" b="1" i="0" u="none" strike="noStrike" dirty="0">
+                        <a:solidFill>
+                          <a:srgbClr val="000000"/>
+                        </a:solidFill>
+                        <a:effectLst/>
+                        <a:latin typeface="Times" pitchFamily="2" charset="0"/>
+                      </a:endParaRPr>
+                    </a:p>
+                  </a:txBody>
+                  <a:tcPr marL="9525" marR="9525" marT="9525" marB="0" anchor="ctr">
+                    <a:lnB w="12700" cap="flat" cmpd="sng" algn="ctr">
+                      <a:solidFill>
+                        <a:schemeClr val="tx1"/>
+                      </a:solidFill>
+                      <a:prstDash val="solid"/>
+                      <a:round/>
+                      <a:headEnd type="none" w="med" len="med"/>
+                      <a:tailEnd type="none" w="med" len="med"/>
+                    </a:lnB>
+                    <a:noFill/>
+                  </a:tcPr>
+                </a:tc>
+                <a:tc hMerge="1">
+                  <a:txBody>
+                    <a:bodyPr/>
+                    <a:lstStyle/>
+                    <a:p>
+                      <a:pPr algn="ctr" fontAlgn="b"/>
+                      <a:r>
+                        <a:rPr lang="en-US" sz="1200" b="1" u="none" strike="noStrike" dirty="0">
+                          <a:effectLst/>
+                          <a:latin typeface="Times" pitchFamily="2" charset="0"/>
+                        </a:rPr>
+                        <a:t>Restoration Filter  (Weiner)</a:t>
+                      </a:r>
+                      <a:endParaRPr lang="en-US" sz="1200" b="1" i="0" u="none" strike="noStrike" dirty="0">
+                        <a:solidFill>
+                          <a:srgbClr val="000000"/>
+                        </a:solidFill>
+                        <a:effectLst/>
+                        <a:latin typeface="Times" pitchFamily="2" charset="0"/>
+                      </a:endParaRPr>
+                    </a:p>
+                  </a:txBody>
+                  <a:tcPr marL="9525" marR="9525" marT="9525" marB="0" anchor="ctr">
+                    <a:lnB w="12700" cap="flat" cmpd="sng" algn="ctr">
+                      <a:solidFill>
+                        <a:schemeClr val="tx1"/>
+                      </a:solidFill>
+                      <a:prstDash val="solid"/>
+                      <a:round/>
+                      <a:headEnd type="none" w="med" len="med"/>
+                      <a:tailEnd type="none" w="med" len="med"/>
+                    </a:lnB>
+                    <a:noFill/>
+                  </a:tcPr>
+                </a:tc>
+                <a:tc hMerge="1">
+                  <a:txBody>
+                    <a:bodyPr/>
+                    <a:lstStyle/>
+                    <a:p>
+                      <a:endParaRPr lang="en-CO"/>
+                    </a:p>
+                  </a:txBody>
+                  <a:tcPr/>
+                </a:tc>
+                <a:tc hMerge="1">
+                  <a:txBody>
+                    <a:bodyPr/>
+                    <a:lstStyle/>
+                    <a:p>
+                      <a:pPr algn="l" fontAlgn="b"/>
+                      <a:endParaRPr lang="en-CO" sz="1200" b="0" i="0" u="none" strike="noStrike" dirty="0">
+                        <a:solidFill>
+                          <a:srgbClr val="000000"/>
+                        </a:solidFill>
+                        <a:effectLst/>
+                        <a:latin typeface="Times" pitchFamily="2" charset="0"/>
+                      </a:endParaRPr>
+                    </a:p>
+                  </a:txBody>
+                  <a:tcPr marL="9525" marR="9525" marT="9525" marB="0" anchor="ctr">
+                    <a:lnB w="12700" cap="flat" cmpd="sng" algn="ctr">
+                      <a:solidFill>
+                        <a:schemeClr val="tx1"/>
+                      </a:solidFill>
+                      <a:prstDash val="solid"/>
+                      <a:round/>
+                      <a:headEnd type="none" w="med" len="med"/>
+                      <a:tailEnd type="none" w="med" len="med"/>
+                    </a:lnB>
+                    <a:noFill/>
+                  </a:tcPr>
+                </a:tc>
+                <a:extLst>
+                  <a:ext uri="{0D108BD9-81ED-4DB2-BD59-A6C34878D82A}">
+                    <a16:rowId xmlns:a16="http://schemas.microsoft.com/office/drawing/2014/main" val="3936435420"/>
+                  </a:ext>
+                </a:extLst>
+              </a:tr>
+              <a:tr h="228600">
+                <a:tc>
+                  <a:txBody>
+                    <a:bodyPr/>
+                    <a:lstStyle/>
+                    <a:p>
+                      <a:pPr algn="l" fontAlgn="b"/>
+                      <a:endParaRPr lang="en-CO" sz="1400" b="0" i="0" u="none" strike="noStrike" dirty="0">
+                        <a:solidFill>
+                          <a:srgbClr val="000000"/>
+                        </a:solidFill>
+                        <a:effectLst/>
+                        <a:latin typeface="Times" pitchFamily="2" charset="0"/>
+                      </a:endParaRPr>
+                    </a:p>
+                  </a:txBody>
+                  <a:tcPr marL="9525" marR="9525" marT="9525" marB="0" anchor="ctr">
+                    <a:lnT w="12700" cap="flat" cmpd="sng" algn="ctr">
+                      <a:solidFill>
+                        <a:schemeClr val="tx1"/>
+                      </a:solidFill>
+                      <a:prstDash val="solid"/>
+                      <a:round/>
+                      <a:headEnd type="none" w="med" len="med"/>
+                      <a:tailEnd type="none" w="med" len="med"/>
+                    </a:lnT>
+                    <a:noFill/>
+                  </a:tcPr>
+                </a:tc>
+                <a:tc>
+                  <a:txBody>
+                    <a:bodyPr/>
+                    <a:lstStyle/>
+                    <a:p>
+                      <a:pPr algn="ctr" fontAlgn="b"/>
+                      <a:r>
+                        <a:rPr lang="en-US" sz="1200" b="1" u="none" strike="noStrike" dirty="0">
+                          <a:effectLst/>
+                          <a:latin typeface="Times" pitchFamily="2" charset="0"/>
+                        </a:rPr>
+                        <a:t>ON</a:t>
+                      </a:r>
+                      <a:endParaRPr lang="en-US" sz="1200" b="1" i="0" u="none" strike="noStrike" dirty="0">
+                        <a:solidFill>
+                          <a:srgbClr val="000000"/>
+                        </a:solidFill>
+                        <a:effectLst/>
+                        <a:latin typeface="Times" pitchFamily="2" charset="0"/>
+                      </a:endParaRPr>
+                    </a:p>
+                  </a:txBody>
+                  <a:tcPr marL="9525" marR="9525" marT="9525" marB="0" anchor="ctr">
+                    <a:lnT w="12700" cap="flat" cmpd="sng" algn="ctr">
+                      <a:solidFill>
+                        <a:schemeClr val="tx1"/>
+                      </a:solidFill>
+                      <a:prstDash val="solid"/>
+                      <a:round/>
+                      <a:headEnd type="none" w="med" len="med"/>
+                      <a:tailEnd type="none" w="med" len="med"/>
+                    </a:lnT>
+                    <a:noFill/>
+                  </a:tcPr>
+                </a:tc>
+                <a:tc>
+                  <a:txBody>
+                    <a:bodyPr/>
+                    <a:lstStyle/>
+                    <a:p>
+                      <a:pPr algn="ctr" fontAlgn="b"/>
+                      <a:r>
+                        <a:rPr lang="en-US" sz="1200" b="1" u="none" strike="noStrike" dirty="0">
+                          <a:effectLst/>
+                          <a:latin typeface="Times" pitchFamily="2" charset="0"/>
+                        </a:rPr>
+                        <a:t>OFF</a:t>
+                      </a:r>
+                      <a:endParaRPr lang="en-US" sz="1200" b="1" i="0" u="none" strike="noStrike" dirty="0">
+                        <a:solidFill>
+                          <a:srgbClr val="000000"/>
+                        </a:solidFill>
+                        <a:effectLst/>
+                        <a:latin typeface="Times" pitchFamily="2" charset="0"/>
+                      </a:endParaRPr>
+                    </a:p>
+                  </a:txBody>
+                  <a:tcPr marL="9525" marR="9525" marT="9525" marB="0" anchor="ctr">
+                    <a:lnT w="12700" cap="flat" cmpd="sng" algn="ctr">
+                      <a:solidFill>
+                        <a:schemeClr val="tx1"/>
+                      </a:solidFill>
+                      <a:prstDash val="solid"/>
+                      <a:round/>
+                      <a:headEnd type="none" w="med" len="med"/>
+                      <a:tailEnd type="none" w="med" len="med"/>
+                    </a:lnT>
+                    <a:noFill/>
+                  </a:tcPr>
+                </a:tc>
+                <a:tc>
+                  <a:txBody>
+                    <a:bodyPr/>
+                    <a:lstStyle/>
+                    <a:p>
+                      <a:pPr algn="ctr" fontAlgn="b"/>
+                      <a:r>
+                        <a:rPr lang="en-US" sz="1200" b="1" u="none" strike="noStrike" dirty="0">
+                          <a:effectLst/>
+                          <a:latin typeface="Times" pitchFamily="2" charset="0"/>
+                        </a:rPr>
+                        <a:t>Performance</a:t>
+                      </a:r>
+                      <a:br>
+                        <a:rPr lang="en-US" sz="1200" b="1" u="none" strike="noStrike" dirty="0">
+                          <a:effectLst/>
+                          <a:latin typeface="Times" pitchFamily="2" charset="0"/>
+                        </a:rPr>
+                      </a:br>
+                      <a:r>
+                        <a:rPr lang="en-US" sz="1200" b="1" u="none" strike="noStrike" dirty="0">
+                          <a:effectLst/>
+                          <a:latin typeface="Times" pitchFamily="2" charset="0"/>
+                        </a:rPr>
+                        <a:t>(ON vs OFF)</a:t>
+                      </a:r>
+                      <a:endParaRPr lang="en-US" sz="1200" b="1" i="0" u="none" strike="noStrike" dirty="0">
+                        <a:solidFill>
+                          <a:srgbClr val="000000"/>
+                        </a:solidFill>
+                        <a:effectLst/>
+                        <a:latin typeface="Times" pitchFamily="2" charset="0"/>
+                      </a:endParaRPr>
+                    </a:p>
+                  </a:txBody>
+                  <a:tcPr marL="9525" marR="9525" marT="9525" marB="0" anchor="ctr">
+                    <a:lnT w="12700" cap="flat" cmpd="sng" algn="ctr">
+                      <a:solidFill>
+                        <a:schemeClr val="tx1"/>
+                      </a:solidFill>
+                      <a:prstDash val="solid"/>
+                      <a:round/>
+                      <a:headEnd type="none" w="med" len="med"/>
+                      <a:tailEnd type="none" w="med" len="med"/>
+                    </a:lnT>
+                    <a:noFill/>
+                  </a:tcPr>
+                </a:tc>
+                <a:extLst>
+                  <a:ext uri="{0D108BD9-81ED-4DB2-BD59-A6C34878D82A}">
+                    <a16:rowId xmlns:a16="http://schemas.microsoft.com/office/drawing/2014/main" val="3293965727"/>
+                  </a:ext>
+                </a:extLst>
+              </a:tr>
+              <a:tr h="203200">
+                <a:tc>
+                  <a:txBody>
+                    <a:bodyPr/>
+                    <a:lstStyle/>
+                    <a:p>
+                      <a:pPr algn="l" fontAlgn="b"/>
+                      <a:r>
+                        <a:rPr lang="en-US" sz="1200" u="none" strike="noStrike">
+                          <a:effectLst/>
+                          <a:latin typeface="Times" pitchFamily="2" charset="0"/>
+                        </a:rPr>
+                        <a:t>Average Speed (fps)</a:t>
+                      </a:r>
+                      <a:endParaRPr lang="en-US" sz="1200" b="0" i="0" u="none" strike="noStrike">
+                        <a:solidFill>
+                          <a:srgbClr val="000000"/>
+                        </a:solidFill>
+                        <a:effectLst/>
+                        <a:latin typeface="Times" pitchFamily="2" charset="0"/>
+                      </a:endParaRPr>
+                    </a:p>
+                  </a:txBody>
+                  <a:tcPr marL="9525" marR="9525" marT="9525" marB="0" anchor="ctr">
+                    <a:noFill/>
+                  </a:tcPr>
+                </a:tc>
+                <a:tc>
+                  <a:txBody>
+                    <a:bodyPr/>
+                    <a:lstStyle/>
+                    <a:p>
+                      <a:pPr algn="ctr" fontAlgn="b"/>
+                      <a:r>
+                        <a:rPr lang="en-CO" sz="1200" u="none" strike="noStrike" dirty="0">
+                          <a:effectLst/>
+                          <a:latin typeface="Times" pitchFamily="2" charset="0"/>
+                        </a:rPr>
+                        <a:t>22</a:t>
+                      </a:r>
+                      <a:endParaRPr lang="en-CO" sz="1200" b="0" i="0" u="none" strike="noStrike" dirty="0">
+                        <a:solidFill>
+                          <a:srgbClr val="000000"/>
+                        </a:solidFill>
+                        <a:effectLst/>
+                        <a:latin typeface="Times" pitchFamily="2" charset="0"/>
+                      </a:endParaRPr>
+                    </a:p>
+                  </a:txBody>
+                  <a:tcPr marL="9525" marR="9525" marT="9525" marB="0" anchor="ctr">
+                    <a:noFill/>
+                  </a:tcPr>
+                </a:tc>
+                <a:tc>
+                  <a:txBody>
+                    <a:bodyPr/>
+                    <a:lstStyle/>
+                    <a:p>
+                      <a:pPr algn="ctr" fontAlgn="b"/>
+                      <a:r>
+                        <a:rPr lang="en-CO" sz="1200" u="none" strike="noStrike" dirty="0">
+                          <a:effectLst/>
+                          <a:latin typeface="Times" pitchFamily="2" charset="0"/>
+                        </a:rPr>
+                        <a:t>15</a:t>
+                      </a:r>
+                      <a:endParaRPr lang="en-CO" sz="1200" b="0" i="0" u="none" strike="noStrike" dirty="0">
+                        <a:solidFill>
+                          <a:srgbClr val="000000"/>
+                        </a:solidFill>
+                        <a:effectLst/>
+                        <a:latin typeface="Times" pitchFamily="2" charset="0"/>
+                      </a:endParaRPr>
+                    </a:p>
+                  </a:txBody>
+                  <a:tcPr marL="9525" marR="9525" marT="9525" marB="0" anchor="ctr">
+                    <a:noFill/>
+                  </a:tcPr>
+                </a:tc>
+                <a:tc>
+                  <a:txBody>
+                    <a:bodyPr/>
+                    <a:lstStyle/>
+                    <a:p>
+                      <a:pPr algn="ctr" fontAlgn="b"/>
+                      <a:r>
+                        <a:rPr lang="en-CO" sz="1200" u="none" strike="noStrike" dirty="0">
+                          <a:effectLst/>
+                          <a:latin typeface="Times" pitchFamily="2" charset="0"/>
+                        </a:rPr>
+                        <a:t>-32%</a:t>
+                      </a:r>
+                      <a:endParaRPr lang="en-CO" sz="1200" b="0" i="0" u="none" strike="noStrike" dirty="0">
+                        <a:solidFill>
+                          <a:srgbClr val="000000"/>
+                        </a:solidFill>
+                        <a:effectLst/>
+                        <a:latin typeface="Times" pitchFamily="2" charset="0"/>
+                      </a:endParaRPr>
+                    </a:p>
+                  </a:txBody>
+                  <a:tcPr marL="9525" marR="9525" marT="9525" marB="0" anchor="ctr">
+                    <a:noFill/>
+                  </a:tcPr>
+                </a:tc>
+                <a:extLst>
+                  <a:ext uri="{0D108BD9-81ED-4DB2-BD59-A6C34878D82A}">
+                    <a16:rowId xmlns:a16="http://schemas.microsoft.com/office/drawing/2014/main" val="2285897913"/>
+                  </a:ext>
+                </a:extLst>
+              </a:tr>
+              <a:tr h="203200">
+                <a:tc>
+                  <a:txBody>
+                    <a:bodyPr/>
+                    <a:lstStyle/>
+                    <a:p>
+                      <a:pPr algn="l" fontAlgn="b"/>
+                      <a:r>
+                        <a:rPr lang="en-US" sz="1200" u="none" strike="noStrike">
+                          <a:effectLst/>
+                          <a:latin typeface="Times" pitchFamily="2" charset="0"/>
+                        </a:rPr>
+                        <a:t>Total Encoding Time (ms)</a:t>
+                      </a:r>
+                      <a:endParaRPr lang="en-US" sz="1200" b="0" i="0" u="none" strike="noStrike">
+                        <a:solidFill>
+                          <a:srgbClr val="000000"/>
+                        </a:solidFill>
+                        <a:effectLst/>
+                        <a:latin typeface="Times" pitchFamily="2" charset="0"/>
+                      </a:endParaRPr>
+                    </a:p>
+                  </a:txBody>
+                  <a:tcPr marL="9525" marR="9525" marT="9525" marB="0" anchor="ctr">
+                    <a:noFill/>
+                  </a:tcPr>
+                </a:tc>
+                <a:tc>
+                  <a:txBody>
+                    <a:bodyPr/>
+                    <a:lstStyle/>
+                    <a:p>
+                      <a:pPr algn="ctr" fontAlgn="b"/>
+                      <a:r>
+                        <a:rPr lang="en-CO" sz="1200" u="none" strike="noStrike">
+                          <a:effectLst/>
+                          <a:latin typeface="Times" pitchFamily="2" charset="0"/>
+                        </a:rPr>
+                        <a:t>27951</a:t>
+                      </a:r>
+                      <a:endParaRPr lang="en-CO" sz="1200" b="0" i="0" u="none" strike="noStrike">
+                        <a:solidFill>
+                          <a:srgbClr val="000000"/>
+                        </a:solidFill>
+                        <a:effectLst/>
+                        <a:latin typeface="Times" pitchFamily="2" charset="0"/>
+                      </a:endParaRPr>
+                    </a:p>
+                  </a:txBody>
+                  <a:tcPr marL="9525" marR="9525" marT="9525" marB="0" anchor="ctr">
+                    <a:noFill/>
+                  </a:tcPr>
+                </a:tc>
+                <a:tc>
+                  <a:txBody>
+                    <a:bodyPr/>
+                    <a:lstStyle/>
+                    <a:p>
+                      <a:pPr algn="ctr" fontAlgn="b"/>
+                      <a:r>
+                        <a:rPr lang="en-CO" sz="1200" u="none" strike="noStrike" dirty="0">
+                          <a:effectLst/>
+                          <a:latin typeface="Times" pitchFamily="2" charset="0"/>
+                        </a:rPr>
+                        <a:t>40856</a:t>
+                      </a:r>
+                      <a:endParaRPr lang="en-CO" sz="1200" b="0" i="0" u="none" strike="noStrike" dirty="0">
+                        <a:solidFill>
+                          <a:srgbClr val="000000"/>
+                        </a:solidFill>
+                        <a:effectLst/>
+                        <a:latin typeface="Times" pitchFamily="2" charset="0"/>
+                      </a:endParaRPr>
+                    </a:p>
+                  </a:txBody>
+                  <a:tcPr marL="9525" marR="9525" marT="9525" marB="0" anchor="ctr">
+                    <a:noFill/>
+                  </a:tcPr>
+                </a:tc>
+                <a:tc>
+                  <a:txBody>
+                    <a:bodyPr/>
+                    <a:lstStyle/>
+                    <a:p>
+                      <a:pPr algn="ctr" fontAlgn="b"/>
+                      <a:r>
+                        <a:rPr lang="en-CO" sz="1200" u="none" strike="noStrike" dirty="0">
+                          <a:effectLst/>
+                          <a:latin typeface="Times" pitchFamily="2" charset="0"/>
+                        </a:rPr>
+                        <a:t>-46%</a:t>
+                      </a:r>
+                      <a:endParaRPr lang="en-CO" sz="1200" b="0" i="0" u="none" strike="noStrike" dirty="0">
+                        <a:solidFill>
+                          <a:srgbClr val="000000"/>
+                        </a:solidFill>
+                        <a:effectLst/>
+                        <a:latin typeface="Times" pitchFamily="2" charset="0"/>
+                      </a:endParaRPr>
+                    </a:p>
+                  </a:txBody>
+                  <a:tcPr marL="9525" marR="9525" marT="9525" marB="0" anchor="ctr">
+                    <a:noFill/>
+                  </a:tcPr>
+                </a:tc>
+                <a:extLst>
+                  <a:ext uri="{0D108BD9-81ED-4DB2-BD59-A6C34878D82A}">
+                    <a16:rowId xmlns:a16="http://schemas.microsoft.com/office/drawing/2014/main" val="2301656919"/>
+                  </a:ext>
+                </a:extLst>
+              </a:tr>
+              <a:tr h="203200">
+                <a:tc>
+                  <a:txBody>
+                    <a:bodyPr/>
+                    <a:lstStyle/>
+                    <a:p>
+                      <a:pPr algn="l" fontAlgn="b"/>
+                      <a:r>
+                        <a:rPr lang="en-US" sz="1200" u="none" strike="noStrike">
+                          <a:effectLst/>
+                          <a:latin typeface="Times" pitchFamily="2" charset="0"/>
+                        </a:rPr>
+                        <a:t>Total Execution Time (ms)</a:t>
+                      </a:r>
+                      <a:endParaRPr lang="en-US" sz="1200" b="0" i="0" u="none" strike="noStrike">
+                        <a:solidFill>
+                          <a:srgbClr val="000000"/>
+                        </a:solidFill>
+                        <a:effectLst/>
+                        <a:latin typeface="Times" pitchFamily="2" charset="0"/>
+                      </a:endParaRPr>
+                    </a:p>
+                  </a:txBody>
+                  <a:tcPr marL="9525" marR="9525" marT="9525" marB="0" anchor="ctr">
+                    <a:noFill/>
+                  </a:tcPr>
+                </a:tc>
+                <a:tc>
+                  <a:txBody>
+                    <a:bodyPr/>
+                    <a:lstStyle/>
+                    <a:p>
+                      <a:pPr algn="ctr" fontAlgn="b"/>
+                      <a:r>
+                        <a:rPr lang="en-CO" sz="1200" u="none" strike="noStrike">
+                          <a:effectLst/>
+                          <a:latin typeface="Times" pitchFamily="2" charset="0"/>
+                        </a:rPr>
+                        <a:t>29164</a:t>
+                      </a:r>
+                      <a:endParaRPr lang="en-CO" sz="1200" b="0" i="0" u="none" strike="noStrike">
+                        <a:solidFill>
+                          <a:srgbClr val="000000"/>
+                        </a:solidFill>
+                        <a:effectLst/>
+                        <a:latin typeface="Times" pitchFamily="2" charset="0"/>
+                      </a:endParaRPr>
+                    </a:p>
+                  </a:txBody>
+                  <a:tcPr marL="9525" marR="9525" marT="9525" marB="0" anchor="ctr">
+                    <a:noFill/>
+                  </a:tcPr>
+                </a:tc>
+                <a:tc>
+                  <a:txBody>
+                    <a:bodyPr/>
+                    <a:lstStyle/>
+                    <a:p>
+                      <a:pPr algn="ctr" fontAlgn="b"/>
+                      <a:r>
+                        <a:rPr lang="en-CO" sz="1200" u="none" strike="noStrike">
+                          <a:effectLst/>
+                          <a:latin typeface="Times" pitchFamily="2" charset="0"/>
+                        </a:rPr>
+                        <a:t>42071</a:t>
+                      </a:r>
+                      <a:endParaRPr lang="en-CO" sz="1200" b="0" i="0" u="none" strike="noStrike">
+                        <a:solidFill>
+                          <a:srgbClr val="000000"/>
+                        </a:solidFill>
+                        <a:effectLst/>
+                        <a:latin typeface="Times" pitchFamily="2" charset="0"/>
+                      </a:endParaRPr>
+                    </a:p>
+                  </a:txBody>
+                  <a:tcPr marL="9525" marR="9525" marT="9525" marB="0" anchor="ctr">
+                    <a:noFill/>
+                  </a:tcPr>
+                </a:tc>
+                <a:tc>
+                  <a:txBody>
+                    <a:bodyPr/>
+                    <a:lstStyle/>
+                    <a:p>
+                      <a:pPr algn="ctr" fontAlgn="b"/>
+                      <a:r>
+                        <a:rPr lang="en-CO" sz="1200" u="none" strike="noStrike" dirty="0">
+                          <a:effectLst/>
+                          <a:latin typeface="Times" pitchFamily="2" charset="0"/>
+                        </a:rPr>
+                        <a:t>-44%</a:t>
+                      </a:r>
+                      <a:endParaRPr lang="en-CO" sz="1200" b="0" i="0" u="none" strike="noStrike" dirty="0">
+                        <a:solidFill>
+                          <a:srgbClr val="000000"/>
+                        </a:solidFill>
+                        <a:effectLst/>
+                        <a:latin typeface="Times" pitchFamily="2" charset="0"/>
+                      </a:endParaRPr>
+                    </a:p>
+                  </a:txBody>
+                  <a:tcPr marL="9525" marR="9525" marT="9525" marB="0" anchor="ctr">
+                    <a:noFill/>
+                  </a:tcPr>
+                </a:tc>
+                <a:extLst>
+                  <a:ext uri="{0D108BD9-81ED-4DB2-BD59-A6C34878D82A}">
+                    <a16:rowId xmlns:a16="http://schemas.microsoft.com/office/drawing/2014/main" val="3103086872"/>
+                  </a:ext>
+                </a:extLst>
+              </a:tr>
+              <a:tr h="203200">
+                <a:tc>
+                  <a:txBody>
+                    <a:bodyPr/>
+                    <a:lstStyle/>
+                    <a:p>
+                      <a:pPr algn="l" fontAlgn="b"/>
+                      <a:r>
+                        <a:rPr lang="en-US" sz="1200" u="none" strike="noStrike">
+                          <a:effectLst/>
+                          <a:latin typeface="Times" pitchFamily="2" charset="0"/>
+                        </a:rPr>
+                        <a:t>Average Latency (ms) </a:t>
+                      </a:r>
+                      <a:endParaRPr lang="en-US" sz="1200" b="0" i="0" u="none" strike="noStrike">
+                        <a:solidFill>
+                          <a:srgbClr val="000000"/>
+                        </a:solidFill>
+                        <a:effectLst/>
+                        <a:latin typeface="Times" pitchFamily="2" charset="0"/>
+                      </a:endParaRPr>
+                    </a:p>
+                  </a:txBody>
+                  <a:tcPr marL="9525" marR="9525" marT="9525" marB="0" anchor="ctr">
+                    <a:noFill/>
+                  </a:tcPr>
+                </a:tc>
+                <a:tc>
+                  <a:txBody>
+                    <a:bodyPr/>
+                    <a:lstStyle/>
+                    <a:p>
+                      <a:pPr algn="ctr" fontAlgn="b"/>
+                      <a:r>
+                        <a:rPr lang="en-CO" sz="1200" u="none" strike="noStrike">
+                          <a:effectLst/>
+                          <a:latin typeface="Times" pitchFamily="2" charset="0"/>
+                        </a:rPr>
+                        <a:t>2854</a:t>
+                      </a:r>
+                      <a:endParaRPr lang="en-CO" sz="1200" b="0" i="0" u="none" strike="noStrike">
+                        <a:solidFill>
+                          <a:srgbClr val="000000"/>
+                        </a:solidFill>
+                        <a:effectLst/>
+                        <a:latin typeface="Times" pitchFamily="2" charset="0"/>
+                      </a:endParaRPr>
+                    </a:p>
+                  </a:txBody>
+                  <a:tcPr marL="9525" marR="9525" marT="9525" marB="0" anchor="ctr">
+                    <a:noFill/>
+                  </a:tcPr>
+                </a:tc>
+                <a:tc>
+                  <a:txBody>
+                    <a:bodyPr/>
+                    <a:lstStyle/>
+                    <a:p>
+                      <a:pPr algn="ctr" fontAlgn="b"/>
+                      <a:r>
+                        <a:rPr lang="en-CO" sz="1200" u="none" strike="noStrike">
+                          <a:effectLst/>
+                          <a:latin typeface="Times" pitchFamily="2" charset="0"/>
+                        </a:rPr>
+                        <a:t>4349</a:t>
+                      </a:r>
+                      <a:endParaRPr lang="en-CO" sz="1200" b="0" i="0" u="none" strike="noStrike">
+                        <a:solidFill>
+                          <a:srgbClr val="000000"/>
+                        </a:solidFill>
+                        <a:effectLst/>
+                        <a:latin typeface="Times" pitchFamily="2" charset="0"/>
+                      </a:endParaRPr>
+                    </a:p>
+                  </a:txBody>
+                  <a:tcPr marL="9525" marR="9525" marT="9525" marB="0" anchor="ctr">
+                    <a:noFill/>
+                  </a:tcPr>
+                </a:tc>
+                <a:tc>
+                  <a:txBody>
+                    <a:bodyPr/>
+                    <a:lstStyle/>
+                    <a:p>
+                      <a:pPr algn="ctr" fontAlgn="b"/>
+                      <a:r>
+                        <a:rPr lang="en-CO" sz="1200" u="none" strike="noStrike" dirty="0">
+                          <a:effectLst/>
+                          <a:latin typeface="Times" pitchFamily="2" charset="0"/>
+                        </a:rPr>
+                        <a:t>-52%</a:t>
+                      </a:r>
+                      <a:endParaRPr lang="en-CO" sz="1200" b="0" i="0" u="none" strike="noStrike" dirty="0">
+                        <a:solidFill>
+                          <a:srgbClr val="000000"/>
+                        </a:solidFill>
+                        <a:effectLst/>
+                        <a:latin typeface="Times" pitchFamily="2" charset="0"/>
+                      </a:endParaRPr>
+                    </a:p>
+                  </a:txBody>
+                  <a:tcPr marL="9525" marR="9525" marT="9525" marB="0" anchor="ctr">
+                    <a:noFill/>
+                  </a:tcPr>
+                </a:tc>
+                <a:extLst>
+                  <a:ext uri="{0D108BD9-81ED-4DB2-BD59-A6C34878D82A}">
+                    <a16:rowId xmlns:a16="http://schemas.microsoft.com/office/drawing/2014/main" val="1254741782"/>
+                  </a:ext>
+                </a:extLst>
+              </a:tr>
+              <a:tr h="203200">
+                <a:tc>
+                  <a:txBody>
+                    <a:bodyPr/>
+                    <a:lstStyle/>
+                    <a:p>
+                      <a:pPr algn="l" fontAlgn="b"/>
+                      <a:r>
+                        <a:rPr lang="en-US" sz="1200" u="none" strike="noStrike">
+                          <a:effectLst/>
+                          <a:latin typeface="Times" pitchFamily="2" charset="0"/>
+                        </a:rPr>
+                        <a:t>Max Latency (ms)</a:t>
+                      </a:r>
+                      <a:endParaRPr lang="en-US" sz="1200" b="0" i="0" u="none" strike="noStrike">
+                        <a:solidFill>
+                          <a:srgbClr val="000000"/>
+                        </a:solidFill>
+                        <a:effectLst/>
+                        <a:latin typeface="Times" pitchFamily="2" charset="0"/>
+                      </a:endParaRPr>
+                    </a:p>
+                  </a:txBody>
+                  <a:tcPr marL="9525" marR="9525" marT="9525" marB="0" anchor="ctr">
+                    <a:noFill/>
+                  </a:tcPr>
+                </a:tc>
+                <a:tc>
+                  <a:txBody>
+                    <a:bodyPr/>
+                    <a:lstStyle/>
+                    <a:p>
+                      <a:pPr algn="ctr" fontAlgn="b"/>
+                      <a:r>
+                        <a:rPr lang="en-CO" sz="1200" u="none" strike="noStrike">
+                          <a:effectLst/>
+                          <a:latin typeface="Times" pitchFamily="2" charset="0"/>
+                        </a:rPr>
+                        <a:t>3626</a:t>
+                      </a:r>
+                      <a:endParaRPr lang="en-CO" sz="1200" b="0" i="0" u="none" strike="noStrike">
+                        <a:solidFill>
+                          <a:srgbClr val="000000"/>
+                        </a:solidFill>
+                        <a:effectLst/>
+                        <a:latin typeface="Times" pitchFamily="2" charset="0"/>
+                      </a:endParaRPr>
+                    </a:p>
+                  </a:txBody>
+                  <a:tcPr marL="9525" marR="9525" marT="9525" marB="0" anchor="ctr">
+                    <a:noFill/>
+                  </a:tcPr>
+                </a:tc>
+                <a:tc>
+                  <a:txBody>
+                    <a:bodyPr/>
+                    <a:lstStyle/>
+                    <a:p>
+                      <a:pPr algn="ctr" fontAlgn="b"/>
+                      <a:r>
+                        <a:rPr lang="en-CO" sz="1200" u="none" strike="noStrike">
+                          <a:effectLst/>
+                          <a:latin typeface="Times" pitchFamily="2" charset="0"/>
+                        </a:rPr>
+                        <a:t>6071</a:t>
+                      </a:r>
+                      <a:endParaRPr lang="en-CO" sz="1200" b="0" i="0" u="none" strike="noStrike">
+                        <a:solidFill>
+                          <a:srgbClr val="000000"/>
+                        </a:solidFill>
+                        <a:effectLst/>
+                        <a:latin typeface="Times" pitchFamily="2" charset="0"/>
+                      </a:endParaRPr>
+                    </a:p>
+                  </a:txBody>
+                  <a:tcPr marL="9525" marR="9525" marT="9525" marB="0" anchor="ctr">
+                    <a:noFill/>
+                  </a:tcPr>
+                </a:tc>
+                <a:tc>
+                  <a:txBody>
+                    <a:bodyPr/>
+                    <a:lstStyle/>
+                    <a:p>
+                      <a:pPr algn="ctr" fontAlgn="b"/>
+                      <a:r>
+                        <a:rPr lang="en-CO" sz="1200" u="none" strike="noStrike" dirty="0">
+                          <a:effectLst/>
+                          <a:latin typeface="Times" pitchFamily="2" charset="0"/>
+                        </a:rPr>
+                        <a:t>-67%</a:t>
+                      </a:r>
+                      <a:endParaRPr lang="en-CO" sz="1200" b="0" i="0" u="none" strike="noStrike" dirty="0">
+                        <a:solidFill>
+                          <a:srgbClr val="000000"/>
+                        </a:solidFill>
+                        <a:effectLst/>
+                        <a:latin typeface="Times" pitchFamily="2" charset="0"/>
+                      </a:endParaRPr>
+                    </a:p>
+                  </a:txBody>
+                  <a:tcPr marL="9525" marR="9525" marT="9525" marB="0" anchor="ctr">
+                    <a:noFill/>
+                  </a:tcPr>
+                </a:tc>
+                <a:extLst>
+                  <a:ext uri="{0D108BD9-81ED-4DB2-BD59-A6C34878D82A}">
+                    <a16:rowId xmlns:a16="http://schemas.microsoft.com/office/drawing/2014/main" val="3871465886"/>
+                  </a:ext>
+                </a:extLst>
+              </a:tr>
+            </a:tbl>
+          </a:graphicData>
+        </a:graphic>
+      </p:graphicFrame>
+      <p:sp>
+        <p:nvSpPr>
+          <p:cNvPr id="7" name="Rectangle 6">
+            <a:extLst>
+              <a:ext uri="{FF2B5EF4-FFF2-40B4-BE49-F238E27FC236}">
+                <a16:creationId xmlns:a16="http://schemas.microsoft.com/office/drawing/2014/main" id="{FA192B9A-7E0E-8A49-884A-669FB81E5B8F}"/>
+              </a:ext>
+            </a:extLst>
+          </p:cNvPr>
+          <p:cNvSpPr/>
+          <p:nvPr/>
+        </p:nvSpPr>
+        <p:spPr>
+          <a:xfrm>
+            <a:off x="6019800" y="1828800"/>
+            <a:ext cx="6096000" cy="258532"/>
+          </a:xfrm>
+          <a:prstGeom prst="rect">
+            <a:avLst/>
+          </a:prstGeom>
+        </p:spPr>
+        <p:txBody>
+          <a:bodyPr>
+            <a:spAutoFit/>
+          </a:bodyPr>
+          <a:lstStyle/>
+          <a:p>
+            <a:pPr marL="0" lvl="1" defTabSz="800100">
+              <a:lnSpc>
+                <a:spcPct val="90000"/>
+              </a:lnSpc>
+              <a:spcBef>
+                <a:spcPct val="0"/>
+              </a:spcBef>
+              <a:spcAft>
+                <a:spcPct val="15000"/>
+              </a:spcAft>
+              <a:buClr>
+                <a:schemeClr val="accent2">
+                  <a:lumMod val="50000"/>
+                </a:schemeClr>
+              </a:buClr>
+            </a:pPr>
+            <a:r>
+              <a:rPr lang="en-US" sz="1200" b="1" dirty="0">
+                <a:solidFill>
+                  <a:prstClr val="black"/>
+                </a:solidFill>
+                <a:latin typeface="Ancizar Sans Black"/>
+              </a:rPr>
+              <a:t>Table 3. </a:t>
+            </a:r>
+            <a:r>
+              <a:rPr lang="en-US" sz="1200" dirty="0">
+                <a:solidFill>
+                  <a:prstClr val="black"/>
+                </a:solidFill>
+                <a:latin typeface="Ancizar Sans Black"/>
+              </a:rPr>
+              <a:t> SVT-AV1 impact of using Weiner restoration filter</a:t>
+            </a:r>
+            <a:endParaRPr lang="en-CO" sz="1200" dirty="0">
+              <a:solidFill>
+                <a:prstClr val="black"/>
+              </a:solidFill>
+              <a:latin typeface="Ancizar Sans Black"/>
+            </a:endParaRPr>
+          </a:p>
+        </p:txBody>
+      </p:sp>
     </p:spTree>
     <p:extLst>
       <p:ext uri="{BB962C8B-B14F-4D97-AF65-F5344CB8AC3E}">
@@ -19659,6 +21350,169 @@
               <a:t>12</a:t>
             </a:fld>
             <a:endParaRPr lang="en-CO" spc="-5" dirty="0"/>
+          </a:p>
+        </p:txBody>
+      </p:sp>
+      <p:sp>
+        <p:nvSpPr>
+          <p:cNvPr id="5" name="TextBox 4">
+            <a:extLst>
+              <a:ext uri="{FF2B5EF4-FFF2-40B4-BE49-F238E27FC236}">
+                <a16:creationId xmlns:a16="http://schemas.microsoft.com/office/drawing/2014/main" id="{E3F8A630-D80F-0142-BCDE-D1F40A918BEB}"/>
+              </a:ext>
+            </a:extLst>
+          </p:cNvPr>
+          <p:cNvSpPr txBox="1"/>
+          <p:nvPr/>
+        </p:nvSpPr>
+        <p:spPr>
+          <a:xfrm>
+            <a:off x="762000" y="1601819"/>
+            <a:ext cx="9067800" cy="1191095"/>
+          </a:xfrm>
+          <a:prstGeom prst="rect">
+            <a:avLst/>
+          </a:prstGeom>
+          <a:noFill/>
+        </p:spPr>
+        <p:txBody>
+          <a:bodyPr wrap="square" rtlCol="0">
+            <a:spAutoFit/>
+          </a:bodyPr>
+          <a:lstStyle/>
+          <a:p>
+            <a:pPr marL="0" lvl="1" defTabSz="800100">
+              <a:lnSpc>
+                <a:spcPct val="90000"/>
+              </a:lnSpc>
+              <a:spcBef>
+                <a:spcPct val="0"/>
+              </a:spcBef>
+              <a:spcAft>
+                <a:spcPct val="15000"/>
+              </a:spcAft>
+              <a:buClr>
+                <a:schemeClr val="accent2">
+                  <a:lumMod val="50000"/>
+                </a:schemeClr>
+              </a:buClr>
+            </a:pPr>
+            <a:endParaRPr lang="en-US" sz="1400" dirty="0">
+              <a:solidFill>
+                <a:prstClr val="black"/>
+              </a:solidFill>
+              <a:latin typeface="Ancizar Sans Black"/>
+            </a:endParaRPr>
+          </a:p>
+          <a:p>
+            <a:pPr marL="285750" lvl="1" indent="-285750" defTabSz="800100">
+              <a:lnSpc>
+                <a:spcPct val="90000"/>
+              </a:lnSpc>
+              <a:spcBef>
+                <a:spcPct val="0"/>
+              </a:spcBef>
+              <a:spcAft>
+                <a:spcPct val="15000"/>
+              </a:spcAft>
+              <a:buClr>
+                <a:schemeClr val="accent2">
+                  <a:lumMod val="50000"/>
+                </a:schemeClr>
+              </a:buClr>
+              <a:buFont typeface="Wingdings" pitchFamily="2" charset="2"/>
+              <a:buChar char="Ø"/>
+            </a:pPr>
+            <a:r>
+              <a:rPr lang="en-US" sz="1400" dirty="0">
+                <a:solidFill>
+                  <a:prstClr val="black"/>
+                </a:solidFill>
+                <a:highlight>
+                  <a:srgbClr val="FFFF00"/>
+                </a:highlight>
+                <a:latin typeface="Ancizar Sans Black"/>
+              </a:rPr>
+              <a:t>BD-Rate</a:t>
+            </a:r>
+          </a:p>
+          <a:p>
+            <a:pPr marL="0" lvl="1" defTabSz="800100">
+              <a:lnSpc>
+                <a:spcPct val="90000"/>
+              </a:lnSpc>
+              <a:spcBef>
+                <a:spcPct val="0"/>
+              </a:spcBef>
+              <a:spcAft>
+                <a:spcPct val="15000"/>
+              </a:spcAft>
+              <a:buClr>
+                <a:schemeClr val="accent2">
+                  <a:lumMod val="50000"/>
+                </a:schemeClr>
+              </a:buClr>
+            </a:pPr>
+            <a:endParaRPr lang="en-US" sz="1400" dirty="0">
+              <a:solidFill>
+                <a:prstClr val="black"/>
+              </a:solidFill>
+              <a:highlight>
+                <a:srgbClr val="FFFF00"/>
+              </a:highlight>
+              <a:latin typeface="Ancizar Sans Black"/>
+            </a:endParaRPr>
+          </a:p>
+          <a:p>
+            <a:pPr marL="0" lvl="1" defTabSz="800100">
+              <a:lnSpc>
+                <a:spcPct val="90000"/>
+              </a:lnSpc>
+              <a:spcBef>
+                <a:spcPct val="0"/>
+              </a:spcBef>
+              <a:spcAft>
+                <a:spcPct val="15000"/>
+              </a:spcAft>
+              <a:buClr>
+                <a:schemeClr val="accent2">
+                  <a:lumMod val="50000"/>
+                </a:schemeClr>
+              </a:buClr>
+            </a:pPr>
+            <a:endParaRPr lang="en-US" sz="1400" dirty="0">
+              <a:solidFill>
+                <a:prstClr val="black"/>
+              </a:solidFill>
+              <a:highlight>
+                <a:srgbClr val="FFFF00"/>
+              </a:highlight>
+              <a:latin typeface="Ancizar Sans Black"/>
+            </a:endParaRPr>
+          </a:p>
+          <a:p>
+            <a:pPr marL="0" lvl="1" defTabSz="800100">
+              <a:lnSpc>
+                <a:spcPct val="90000"/>
+              </a:lnSpc>
+              <a:spcBef>
+                <a:spcPct val="0"/>
+              </a:spcBef>
+              <a:spcAft>
+                <a:spcPct val="15000"/>
+              </a:spcAft>
+              <a:buClr>
+                <a:schemeClr val="accent2">
+                  <a:lumMod val="50000"/>
+                </a:schemeClr>
+              </a:buClr>
+            </a:pPr>
+            <a:endParaRPr lang="en-US" sz="1400" dirty="0">
+              <a:solidFill>
+                <a:prstClr val="black"/>
+              </a:solidFill>
+              <a:latin typeface="Ancizar Sans Black"/>
+            </a:endParaRPr>
           </a:p>
         </p:txBody>
       </p:sp>
@@ -19895,6 +21749,124 @@
           </a:p>
         </p:txBody>
       </p:sp>
+      <p:sp>
+        <p:nvSpPr>
+          <p:cNvPr id="5" name="TextBox 4">
+            <a:extLst>
+              <a:ext uri="{FF2B5EF4-FFF2-40B4-BE49-F238E27FC236}">
+                <a16:creationId xmlns:a16="http://schemas.microsoft.com/office/drawing/2014/main" id="{5EA15DD1-5550-0440-ADE4-413AF7BF1E60}"/>
+              </a:ext>
+            </a:extLst>
+          </p:cNvPr>
+          <p:cNvSpPr txBox="1"/>
+          <p:nvPr/>
+        </p:nvSpPr>
+        <p:spPr>
+          <a:xfrm>
+            <a:off x="762000" y="1601819"/>
+            <a:ext cx="9067800" cy="738664"/>
+          </a:xfrm>
+          <a:prstGeom prst="rect">
+            <a:avLst/>
+          </a:prstGeom>
+          <a:noFill/>
+        </p:spPr>
+        <p:txBody>
+          <a:bodyPr wrap="square" rtlCol="0">
+            <a:spAutoFit/>
+          </a:bodyPr>
+          <a:lstStyle/>
+          <a:p>
+            <a:pPr marL="0" lvl="1" defTabSz="800100">
+              <a:lnSpc>
+                <a:spcPct val="90000"/>
+              </a:lnSpc>
+              <a:spcBef>
+                <a:spcPct val="0"/>
+              </a:spcBef>
+              <a:spcAft>
+                <a:spcPct val="15000"/>
+              </a:spcAft>
+              <a:buClr>
+                <a:schemeClr val="accent2">
+                  <a:lumMod val="50000"/>
+                </a:schemeClr>
+              </a:buClr>
+            </a:pPr>
+            <a:r>
+              <a:rPr lang="en-US" sz="1400" dirty="0">
+                <a:solidFill>
+                  <a:prstClr val="black"/>
+                </a:solidFill>
+                <a:latin typeface="Ancizar Sans Black"/>
+              </a:rPr>
+              <a:t>???</a:t>
+            </a:r>
+            <a:endParaRPr lang="en-US" sz="1400" dirty="0">
+              <a:solidFill>
+                <a:prstClr val="black"/>
+              </a:solidFill>
+              <a:highlight>
+                <a:srgbClr val="FFFF00"/>
+              </a:highlight>
+              <a:latin typeface="Ancizar Sans Black"/>
+            </a:endParaRPr>
+          </a:p>
+          <a:p>
+            <a:pPr marL="285750" lvl="1" indent="-285750" defTabSz="800100">
+              <a:lnSpc>
+                <a:spcPct val="90000"/>
+              </a:lnSpc>
+              <a:spcBef>
+                <a:spcPct val="0"/>
+              </a:spcBef>
+              <a:spcAft>
+                <a:spcPct val="15000"/>
+              </a:spcAft>
+              <a:buClr>
+                <a:schemeClr val="accent2">
+                  <a:lumMod val="50000"/>
+                </a:schemeClr>
+              </a:buClr>
+              <a:buFont typeface="Wingdings" pitchFamily="2" charset="2"/>
+              <a:buChar char="Ø"/>
+            </a:pPr>
+            <a:endParaRPr lang="en-US" sz="1400" dirty="0">
+              <a:solidFill>
+                <a:prstClr val="black"/>
+              </a:solidFill>
+              <a:highlight>
+                <a:srgbClr val="FFFF00"/>
+              </a:highlight>
+              <a:latin typeface="Ancizar Sans Black"/>
+            </a:endParaRPr>
+          </a:p>
+          <a:p>
+            <a:pPr marL="0" lvl="1" defTabSz="800100">
+              <a:lnSpc>
+                <a:spcPct val="90000"/>
+              </a:lnSpc>
+              <a:spcBef>
+                <a:spcPct val="0"/>
+              </a:spcBef>
+              <a:spcAft>
+                <a:spcPct val="15000"/>
+              </a:spcAft>
+              <a:buClr>
+                <a:schemeClr val="accent2">
+                  <a:lumMod val="50000"/>
+                </a:schemeClr>
+              </a:buClr>
+            </a:pPr>
+            <a:endParaRPr lang="en-US" sz="1400" dirty="0">
+              <a:solidFill>
+                <a:prstClr val="black"/>
+              </a:solidFill>
+              <a:latin typeface="Ancizar Sans Black"/>
+            </a:endParaRPr>
+          </a:p>
+        </p:txBody>
+      </p:sp>
     </p:spTree>
     <p:extLst>
       <p:ext uri="{BB962C8B-B14F-4D97-AF65-F5344CB8AC3E}">
@@ -20122,6 +22094,390 @@
               <a:t>14</a:t>
             </a:fld>
             <a:endParaRPr lang="en-CO" spc="-5" dirty="0"/>
+          </a:p>
+        </p:txBody>
+      </p:sp>
+      <p:sp>
+        <p:nvSpPr>
+          <p:cNvPr id="5" name="TextBox 4">
+            <a:extLst>
+              <a:ext uri="{FF2B5EF4-FFF2-40B4-BE49-F238E27FC236}">
+                <a16:creationId xmlns:a16="http://schemas.microsoft.com/office/drawing/2014/main" id="{9F19D2D3-234A-0545-8C1E-4E171AD346F2}"/>
+              </a:ext>
+            </a:extLst>
+          </p:cNvPr>
+          <p:cNvSpPr txBox="1"/>
+          <p:nvPr/>
+        </p:nvSpPr>
+        <p:spPr>
+          <a:xfrm>
+            <a:off x="762000" y="1601819"/>
+            <a:ext cx="9067800" cy="2774606"/>
+          </a:xfrm>
+          <a:prstGeom prst="rect">
+            <a:avLst/>
+          </a:prstGeom>
+          <a:noFill/>
+        </p:spPr>
+        <p:txBody>
+          <a:bodyPr wrap="square" rtlCol="0">
+            <a:spAutoFit/>
+          </a:bodyPr>
+          <a:lstStyle/>
+          <a:p>
+            <a:pPr marL="285750" lvl="1" indent="-285750" defTabSz="800100">
+              <a:lnSpc>
+                <a:spcPct val="90000"/>
+              </a:lnSpc>
+              <a:spcBef>
+                <a:spcPct val="0"/>
+              </a:spcBef>
+              <a:spcAft>
+                <a:spcPct val="15000"/>
+              </a:spcAft>
+              <a:buClr>
+                <a:schemeClr val="accent2">
+                  <a:lumMod val="50000"/>
+                </a:schemeClr>
+              </a:buClr>
+              <a:buFont typeface="Wingdings" pitchFamily="2" charset="2"/>
+              <a:buChar char="Ø"/>
+            </a:pPr>
+            <a:r>
+              <a:rPr lang="en-US" sz="1400" dirty="0">
+                <a:solidFill>
+                  <a:prstClr val="black"/>
+                </a:solidFill>
+                <a:highlight>
+                  <a:srgbClr val="FFFF00"/>
+                </a:highlight>
+                <a:latin typeface="Ancizar Sans Black"/>
+              </a:rPr>
+              <a:t>Complexity</a:t>
+            </a:r>
+          </a:p>
+          <a:p>
+            <a:pPr marL="285750" lvl="1" indent="-285750" defTabSz="800100">
+              <a:lnSpc>
+                <a:spcPct val="90000"/>
+              </a:lnSpc>
+              <a:spcBef>
+                <a:spcPct val="0"/>
+              </a:spcBef>
+              <a:spcAft>
+                <a:spcPct val="15000"/>
+              </a:spcAft>
+              <a:buClr>
+                <a:schemeClr val="accent2">
+                  <a:lumMod val="50000"/>
+                </a:schemeClr>
+              </a:buClr>
+              <a:buFont typeface="Wingdings" pitchFamily="2" charset="2"/>
+              <a:buChar char="Ø"/>
+            </a:pPr>
+            <a:endParaRPr lang="en-US" sz="1400" dirty="0">
+              <a:solidFill>
+                <a:prstClr val="black"/>
+              </a:solidFill>
+              <a:highlight>
+                <a:srgbClr val="FFFF00"/>
+              </a:highlight>
+              <a:latin typeface="Ancizar Sans Black"/>
+            </a:endParaRPr>
+          </a:p>
+          <a:p>
+            <a:pPr marL="285750" lvl="1" indent="-285750" defTabSz="800100">
+              <a:lnSpc>
+                <a:spcPct val="90000"/>
+              </a:lnSpc>
+              <a:spcBef>
+                <a:spcPct val="0"/>
+              </a:spcBef>
+              <a:spcAft>
+                <a:spcPct val="15000"/>
+              </a:spcAft>
+              <a:buClr>
+                <a:schemeClr val="accent2">
+                  <a:lumMod val="50000"/>
+                </a:schemeClr>
+              </a:buClr>
+              <a:buFont typeface="Wingdings" pitchFamily="2" charset="2"/>
+              <a:buChar char="Ø"/>
+            </a:pPr>
+            <a:r>
+              <a:rPr lang="en-US" sz="1400" dirty="0">
+                <a:solidFill>
+                  <a:prstClr val="black"/>
+                </a:solidFill>
+                <a:highlight>
+                  <a:srgbClr val="FFFF00"/>
+                </a:highlight>
+                <a:latin typeface="Ancizar Sans Black"/>
+              </a:rPr>
+              <a:t>Reference hybrid video integration</a:t>
+            </a:r>
+          </a:p>
+          <a:p>
+            <a:pPr marL="285750" lvl="1" indent="-285750" defTabSz="800100">
+              <a:lnSpc>
+                <a:spcPct val="90000"/>
+              </a:lnSpc>
+              <a:spcBef>
+                <a:spcPct val="0"/>
+              </a:spcBef>
+              <a:spcAft>
+                <a:spcPct val="15000"/>
+              </a:spcAft>
+              <a:buClr>
+                <a:schemeClr val="accent2">
+                  <a:lumMod val="50000"/>
+                </a:schemeClr>
+              </a:buClr>
+              <a:buFont typeface="Wingdings" pitchFamily="2" charset="2"/>
+              <a:buChar char="Ø"/>
+            </a:pPr>
+            <a:endParaRPr lang="en-US" sz="1400" dirty="0">
+              <a:solidFill>
+                <a:prstClr val="black"/>
+              </a:solidFill>
+              <a:highlight>
+                <a:srgbClr val="FFFF00"/>
+              </a:highlight>
+              <a:latin typeface="Ancizar Sans Black"/>
+            </a:endParaRPr>
+          </a:p>
+          <a:p>
+            <a:pPr marL="285750" lvl="1" indent="-285750" defTabSz="800100">
+              <a:lnSpc>
+                <a:spcPct val="90000"/>
+              </a:lnSpc>
+              <a:spcBef>
+                <a:spcPct val="0"/>
+              </a:spcBef>
+              <a:spcAft>
+                <a:spcPct val="15000"/>
+              </a:spcAft>
+              <a:buClr>
+                <a:schemeClr val="accent2">
+                  <a:lumMod val="50000"/>
+                </a:schemeClr>
+              </a:buClr>
+              <a:buFont typeface="Wingdings" pitchFamily="2" charset="2"/>
+              <a:buChar char="Ø"/>
+            </a:pPr>
+            <a:r>
+              <a:rPr lang="en-US" sz="1400" dirty="0">
+                <a:solidFill>
+                  <a:prstClr val="black"/>
+                </a:solidFill>
+                <a:highlight>
+                  <a:srgbClr val="FFFF00"/>
+                </a:highlight>
+                <a:latin typeface="Ancizar Sans Black"/>
+              </a:rPr>
+              <a:t>Real-time</a:t>
+            </a:r>
+          </a:p>
+          <a:p>
+            <a:pPr marL="285750" lvl="1" indent="-285750" defTabSz="800100">
+              <a:lnSpc>
+                <a:spcPct val="90000"/>
+              </a:lnSpc>
+              <a:spcBef>
+                <a:spcPct val="0"/>
+              </a:spcBef>
+              <a:spcAft>
+                <a:spcPct val="15000"/>
+              </a:spcAft>
+              <a:buClr>
+                <a:schemeClr val="accent2">
+                  <a:lumMod val="50000"/>
+                </a:schemeClr>
+              </a:buClr>
+              <a:buFont typeface="Wingdings" pitchFamily="2" charset="2"/>
+              <a:buChar char="Ø"/>
+            </a:pPr>
+            <a:endParaRPr lang="en-US" sz="1400" dirty="0">
+              <a:solidFill>
+                <a:prstClr val="black"/>
+              </a:solidFill>
+              <a:highlight>
+                <a:srgbClr val="FFFF00"/>
+              </a:highlight>
+              <a:latin typeface="Ancizar Sans Black"/>
+            </a:endParaRPr>
+          </a:p>
+          <a:p>
+            <a:pPr marL="285750" lvl="1" indent="-285750" defTabSz="800100">
+              <a:lnSpc>
+                <a:spcPct val="90000"/>
+              </a:lnSpc>
+              <a:spcBef>
+                <a:spcPct val="0"/>
+              </a:spcBef>
+              <a:spcAft>
+                <a:spcPct val="15000"/>
+              </a:spcAft>
+              <a:buClr>
+                <a:schemeClr val="accent2">
+                  <a:lumMod val="50000"/>
+                </a:schemeClr>
+              </a:buClr>
+              <a:buFont typeface="Wingdings" pitchFamily="2" charset="2"/>
+              <a:buChar char="Ø"/>
+            </a:pPr>
+            <a:endParaRPr lang="en-US" sz="1400" dirty="0">
+              <a:solidFill>
+                <a:prstClr val="black"/>
+              </a:solidFill>
+              <a:highlight>
+                <a:srgbClr val="FFFF00"/>
+              </a:highlight>
+              <a:latin typeface="Ancizar Sans Black"/>
+            </a:endParaRPr>
+          </a:p>
+          <a:p>
+            <a:pPr marL="285750" lvl="1" indent="-285750" defTabSz="800100">
+              <a:lnSpc>
+                <a:spcPct val="90000"/>
+              </a:lnSpc>
+              <a:spcBef>
+                <a:spcPct val="0"/>
+              </a:spcBef>
+              <a:spcAft>
+                <a:spcPct val="15000"/>
+              </a:spcAft>
+              <a:buClr>
+                <a:schemeClr val="accent2">
+                  <a:lumMod val="50000"/>
+                </a:schemeClr>
+              </a:buClr>
+              <a:buFont typeface="Wingdings" pitchFamily="2" charset="2"/>
+              <a:buChar char="Ø"/>
+            </a:pPr>
+            <a:r>
+              <a:rPr lang="en-US" sz="1400" dirty="0">
+                <a:solidFill>
+                  <a:prstClr val="black"/>
+                </a:solidFill>
+                <a:highlight>
+                  <a:srgbClr val="FFFF00"/>
+                </a:highlight>
+                <a:latin typeface="Ancizar Sans Black"/>
+              </a:rPr>
+              <a:t>Bandwidth</a:t>
+            </a:r>
+          </a:p>
+          <a:p>
+            <a:pPr marL="285750" lvl="1" indent="-285750" defTabSz="800100">
+              <a:lnSpc>
+                <a:spcPct val="90000"/>
+              </a:lnSpc>
+              <a:spcBef>
+                <a:spcPct val="0"/>
+              </a:spcBef>
+              <a:spcAft>
+                <a:spcPct val="15000"/>
+              </a:spcAft>
+              <a:buClr>
+                <a:schemeClr val="accent2">
+                  <a:lumMod val="50000"/>
+                </a:schemeClr>
+              </a:buClr>
+              <a:buFont typeface="Wingdings" pitchFamily="2" charset="2"/>
+              <a:buChar char="Ø"/>
+            </a:pPr>
+            <a:endParaRPr lang="en-US" sz="1400" dirty="0">
+              <a:solidFill>
+                <a:prstClr val="black"/>
+              </a:solidFill>
+              <a:highlight>
+                <a:srgbClr val="FFFF00"/>
+              </a:highlight>
+              <a:latin typeface="Ancizar Sans Black"/>
+            </a:endParaRPr>
+          </a:p>
+          <a:p>
+            <a:pPr marL="285750" lvl="1" indent="-285750" defTabSz="800100">
+              <a:lnSpc>
+                <a:spcPct val="90000"/>
+              </a:lnSpc>
+              <a:spcBef>
+                <a:spcPct val="0"/>
+              </a:spcBef>
+              <a:spcAft>
+                <a:spcPct val="15000"/>
+              </a:spcAft>
+              <a:buClr>
+                <a:schemeClr val="accent2">
+                  <a:lumMod val="50000"/>
+                </a:schemeClr>
+              </a:buClr>
+              <a:buFont typeface="Wingdings" pitchFamily="2" charset="2"/>
+              <a:buChar char="Ø"/>
+            </a:pPr>
+            <a:endParaRPr lang="en-US" sz="1400" dirty="0">
+              <a:solidFill>
+                <a:prstClr val="black"/>
+              </a:solidFill>
+              <a:highlight>
+                <a:srgbClr val="FFFF00"/>
+              </a:highlight>
+              <a:latin typeface="Ancizar Sans Black"/>
+            </a:endParaRPr>
+          </a:p>
+          <a:p>
+            <a:pPr marL="285750" lvl="1" indent="-285750" defTabSz="800100">
+              <a:lnSpc>
+                <a:spcPct val="90000"/>
+              </a:lnSpc>
+              <a:spcBef>
+                <a:spcPct val="0"/>
+              </a:spcBef>
+              <a:spcAft>
+                <a:spcPct val="15000"/>
+              </a:spcAft>
+              <a:buClr>
+                <a:schemeClr val="accent2">
+                  <a:lumMod val="50000"/>
+                </a:schemeClr>
+              </a:buClr>
+              <a:buFont typeface="Wingdings" pitchFamily="2" charset="2"/>
+              <a:buChar char="Ø"/>
+            </a:pPr>
+            <a:endParaRPr lang="en-US" sz="1400" dirty="0">
+              <a:solidFill>
+                <a:prstClr val="black"/>
+              </a:solidFill>
+              <a:highlight>
+                <a:srgbClr val="FFFF00"/>
+              </a:highlight>
+              <a:latin typeface="Ancizar Sans Black"/>
+            </a:endParaRPr>
+          </a:p>
+          <a:p>
+            <a:pPr marL="0" lvl="1" defTabSz="800100">
+              <a:lnSpc>
+                <a:spcPct val="90000"/>
+              </a:lnSpc>
+              <a:spcBef>
+                <a:spcPct val="0"/>
+              </a:spcBef>
+              <a:spcAft>
+                <a:spcPct val="15000"/>
+              </a:spcAft>
+              <a:buClr>
+                <a:schemeClr val="accent2">
+                  <a:lumMod val="50000"/>
+                </a:schemeClr>
+              </a:buClr>
+            </a:pPr>
+            <a:endParaRPr lang="en-US" sz="1400" dirty="0">
+              <a:solidFill>
+                <a:prstClr val="black"/>
+              </a:solidFill>
+              <a:latin typeface="Ancizar Sans Black"/>
+            </a:endParaRPr>
           </a:p>
         </p:txBody>
       </p:sp>
@@ -20362,6 +22718,149 @@
           </a:p>
         </p:txBody>
       </p:sp>
+      <p:sp>
+        <p:nvSpPr>
+          <p:cNvPr id="5" name="TextBox 4">
+            <a:extLst>
+              <a:ext uri="{FF2B5EF4-FFF2-40B4-BE49-F238E27FC236}">
+                <a16:creationId xmlns:a16="http://schemas.microsoft.com/office/drawing/2014/main" id="{1572E25E-8AA7-D44F-AF79-CA0C1B21F2C8}"/>
+              </a:ext>
+            </a:extLst>
+          </p:cNvPr>
+          <p:cNvSpPr txBox="1"/>
+          <p:nvPr/>
+        </p:nvSpPr>
+        <p:spPr>
+          <a:xfrm>
+            <a:off x="762000" y="1601819"/>
+            <a:ext cx="9067800" cy="964880"/>
+          </a:xfrm>
+          <a:prstGeom prst="rect">
+            <a:avLst/>
+          </a:prstGeom>
+          <a:noFill/>
+        </p:spPr>
+        <p:txBody>
+          <a:bodyPr wrap="square" rtlCol="0">
+            <a:spAutoFit/>
+          </a:bodyPr>
+          <a:lstStyle/>
+          <a:p>
+            <a:pPr marL="285750" lvl="1" indent="-285750" defTabSz="800100">
+              <a:lnSpc>
+                <a:spcPct val="90000"/>
+              </a:lnSpc>
+              <a:spcBef>
+                <a:spcPct val="0"/>
+              </a:spcBef>
+              <a:spcAft>
+                <a:spcPct val="15000"/>
+              </a:spcAft>
+              <a:buClr>
+                <a:schemeClr val="accent2">
+                  <a:lumMod val="50000"/>
+                </a:schemeClr>
+              </a:buClr>
+              <a:buFont typeface="Wingdings" pitchFamily="2" charset="2"/>
+              <a:buChar char="Ø"/>
+            </a:pPr>
+            <a:r>
+              <a:rPr lang="en-US" sz="1400" dirty="0">
+                <a:solidFill>
+                  <a:prstClr val="black"/>
+                </a:solidFill>
+                <a:highlight>
+                  <a:srgbClr val="FFFF00"/>
+                </a:highlight>
+                <a:latin typeface="Ancizar Sans Black"/>
+              </a:rPr>
+              <a:t>Same as  Germán</a:t>
+            </a:r>
+          </a:p>
+          <a:p>
+            <a:pPr marL="285750" lvl="1" indent="-285750" defTabSz="800100">
+              <a:lnSpc>
+                <a:spcPct val="90000"/>
+              </a:lnSpc>
+              <a:spcBef>
+                <a:spcPct val="0"/>
+              </a:spcBef>
+              <a:spcAft>
+                <a:spcPct val="15000"/>
+              </a:spcAft>
+              <a:buClr>
+                <a:schemeClr val="accent2">
+                  <a:lumMod val="50000"/>
+                </a:schemeClr>
+              </a:buClr>
+              <a:buFont typeface="Wingdings" pitchFamily="2" charset="2"/>
+              <a:buChar char="Ø"/>
+            </a:pPr>
+            <a:endParaRPr lang="en-US" sz="1400" dirty="0">
+              <a:solidFill>
+                <a:prstClr val="black"/>
+              </a:solidFill>
+              <a:highlight>
+                <a:srgbClr val="FFFF00"/>
+              </a:highlight>
+              <a:latin typeface="Ancizar Sans Black"/>
+            </a:endParaRPr>
+          </a:p>
+          <a:p>
+            <a:pPr marL="285750" lvl="1" indent="-285750" defTabSz="800100">
+              <a:lnSpc>
+                <a:spcPct val="90000"/>
+              </a:lnSpc>
+              <a:spcBef>
+                <a:spcPct val="0"/>
+              </a:spcBef>
+              <a:spcAft>
+                <a:spcPct val="15000"/>
+              </a:spcAft>
+              <a:buClr>
+                <a:schemeClr val="accent2">
+                  <a:lumMod val="50000"/>
+                </a:schemeClr>
+              </a:buClr>
+              <a:buFont typeface="Wingdings" pitchFamily="2" charset="2"/>
+              <a:buChar char="Ø"/>
+            </a:pPr>
+            <a:endParaRPr lang="en-US" sz="1400" dirty="0">
+              <a:solidFill>
+                <a:prstClr val="black"/>
+              </a:solidFill>
+              <a:highlight>
+                <a:srgbClr val="FFFF00"/>
+              </a:highlight>
+              <a:latin typeface="Ancizar Sans Black"/>
+            </a:endParaRPr>
+          </a:p>
+          <a:p>
+            <a:pPr marL="0" lvl="1" defTabSz="800100">
+              <a:lnSpc>
+                <a:spcPct val="90000"/>
+              </a:lnSpc>
+              <a:spcBef>
+                <a:spcPct val="0"/>
+              </a:spcBef>
+              <a:spcAft>
+                <a:spcPct val="15000"/>
+              </a:spcAft>
+              <a:buClr>
+                <a:schemeClr val="accent2">
+                  <a:lumMod val="50000"/>
+                </a:schemeClr>
+              </a:buClr>
+            </a:pPr>
+            <a:endParaRPr lang="en-US" sz="1400" dirty="0">
+              <a:solidFill>
+                <a:prstClr val="black"/>
+              </a:solidFill>
+              <a:latin typeface="Ancizar Sans Black"/>
+            </a:endParaRPr>
+          </a:p>
+        </p:txBody>
+      </p:sp>
     </p:spTree>
     <p:extLst>
       <p:ext uri="{BB962C8B-B14F-4D97-AF65-F5344CB8AC3E}">
@@ -20444,7 +22943,7 @@
         <p:spPr>
           <a:xfrm>
             <a:off x="379222" y="1066800"/>
-            <a:ext cx="11433555" cy="3724096"/>
+            <a:ext cx="11433555" cy="4231928"/>
           </a:xfrm>
         </p:spPr>
         <p:txBody>
@@ -20792,7 +23291,32 @@
             </a:r>
             <a:r>
               <a:rPr lang="en-US" sz="1100" dirty="0"/>
-              <a:t>(17–18), 11699–11722. https://</a:t>
+              <a:t>(17–18), 11699–11722. </a:t>
+            </a:r>
+            <a:r>
+              <a:rPr lang="en-US" sz="1100" dirty="0">
+                <a:hlinkClick r:id="rId4"/>
+              </a:rPr>
+              <a:t>https://doi.org/10.1007/s11042-019-08572-3</a:t>
+            </a:r>
+            <a:endParaRPr lang="en-US" sz="1100" dirty="0"/>
+          </a:p>
+          <a:p>
+            <a:pPr marL="285750" indent="-285750">
+              <a:buFont typeface="Arial" panose="020B0604020202020204" pitchFamily="34" charset="0"/>
+              <a:buChar char="•"/>
+            </a:pPr>
+            <a:r>
+              <a:rPr lang="en-US" sz="1100" dirty="0"/>
+              <a:t>Joshi, U., Mukherjee, D., Chen, Y., Parker, S., &amp; Grange, A. (2019). In-loop Frame Super-resolution in AV1. </a:t>
+            </a:r>
+            <a:r>
+              <a:rPr lang="en-US" sz="1100" i="1" dirty="0"/>
+              <a:t>2019 Picture Coding Symposium, PCS 2019</a:t>
+            </a:r>
+            <a:r>
+              <a:rPr lang="en-US" sz="1100" dirty="0"/>
+              <a:t>, 1–5. https://</a:t>
             </a:r>
             <a:r>
               <a:rPr lang="en-US" sz="1100" dirty="0" err="1"/>
@@ -20800,8 +23324,15 @@
             </a:r>
             <a:r>
               <a:rPr lang="en-US" sz="1100" dirty="0"/>
-              <a:t>/10.1007/s11042-019-08572-3</a:t>
-            </a:r>
+              <a:t>/10.1109/PCS48520.2019.8954553</a:t>
+            </a:r>
+          </a:p>
+          <a:p>
+            <a:pPr marL="285750" indent="-285750">
+              <a:buFont typeface="Arial" panose="020B0604020202020204" pitchFamily="34" charset="0"/>
+              <a:buChar char="•"/>
+            </a:pPr>
+            <a:endParaRPr lang="en-US" sz="1100" dirty="0"/>
           </a:p>
           <a:p>
             <a:endParaRPr lang="en-US" sz="1100" dirty="0"/>
@@ -24509,13 +27040,13 @@
           <p:nvPr>
             <p:extLst>
               <p:ext uri="{D42A27DB-BD31-4B8C-83A1-F6EECF244321}">
-                <p14:modId xmlns:p14="http://schemas.microsoft.com/office/powerpoint/2010/main" val="3518279474"/>
+                <p14:modId xmlns:p14="http://schemas.microsoft.com/office/powerpoint/2010/main" val="4026630288"/>
               </p:ext>
             </p:extLst>
           </p:nvPr>
         </p:nvGraphicFramePr>
         <p:xfrm>
-          <a:off x="1066800" y="1066800"/>
+          <a:off x="1066800" y="1524000"/>
           <a:ext cx="4419600" cy="3329344"/>
         </p:xfrm>
         <a:graphic>
@@ -26352,13 +28883,13 @@
           <p:nvPr>
             <p:extLst>
               <p:ext uri="{D42A27DB-BD31-4B8C-83A1-F6EECF244321}">
-                <p14:modId xmlns:p14="http://schemas.microsoft.com/office/powerpoint/2010/main" val="1870190193"/>
+                <p14:modId xmlns:p14="http://schemas.microsoft.com/office/powerpoint/2010/main" val="3796761598"/>
               </p:ext>
             </p:extLst>
           </p:nvPr>
         </p:nvGraphicFramePr>
         <p:xfrm>
-          <a:off x="6324600" y="1091609"/>
+          <a:off x="6324600" y="1524000"/>
           <a:ext cx="4419600" cy="1814758"/>
         </p:xfrm>
         <a:graphic>
@@ -27148,7 +29679,7 @@
         </p:nvSpPr>
         <p:spPr>
           <a:xfrm>
-            <a:off x="1409701" y="4896468"/>
+            <a:off x="6428740" y="4572000"/>
             <a:ext cx="3733798" cy="894732"/>
           </a:xfrm>
           <a:prstGeom prst="rect">
@@ -27193,6 +29724,146 @@
                 <a:latin typeface="Ancizar Sans Black"/>
               </a:rPr>
               <a:t>(Agustsson,2020) - Google</a:t>
+            </a:r>
+            <a:endParaRPr lang="en-CO" sz="1200" dirty="0">
+              <a:solidFill>
+                <a:prstClr val="black"/>
+              </a:solidFill>
+              <a:latin typeface="Ancizar Sans Black"/>
+            </a:endParaRPr>
+          </a:p>
+        </p:txBody>
+      </p:sp>
+      <p:sp>
+        <p:nvSpPr>
+          <p:cNvPr id="14" name="Rectangle 13">
+            <a:extLst>
+              <a:ext uri="{FF2B5EF4-FFF2-40B4-BE49-F238E27FC236}">
+                <a16:creationId xmlns:a16="http://schemas.microsoft.com/office/drawing/2014/main" id="{005108D7-BD85-0246-871C-236B6EE9D4EB}"/>
+              </a:ext>
+            </a:extLst>
+          </p:cNvPr>
+          <p:cNvSpPr/>
+          <p:nvPr/>
+        </p:nvSpPr>
+        <p:spPr>
+          <a:xfrm>
+            <a:off x="1066800" y="5082167"/>
+            <a:ext cx="6096000" cy="258532"/>
+          </a:xfrm>
+          <a:prstGeom prst="rect">
+            <a:avLst/>
+          </a:prstGeom>
+        </p:spPr>
+        <p:txBody>
+          <a:bodyPr>
+            <a:spAutoFit/>
+          </a:bodyPr>
+          <a:lstStyle/>
+          <a:p>
+            <a:pPr marL="0" lvl="1" defTabSz="800100">
+              <a:lnSpc>
+                <a:spcPct val="90000"/>
+              </a:lnSpc>
+              <a:spcBef>
+                <a:spcPct val="0"/>
+              </a:spcBef>
+              <a:spcAft>
+                <a:spcPct val="15000"/>
+              </a:spcAft>
+              <a:buClr>
+                <a:schemeClr val="accent2">
+                  <a:lumMod val="50000"/>
+                </a:schemeClr>
+              </a:buClr>
+            </a:pPr>
+            <a:r>
+              <a:rPr lang="en-US" sz="1200" b="1" dirty="0">
+                <a:solidFill>
+                  <a:prstClr val="black"/>
+                </a:solidFill>
+                <a:latin typeface="Ancizar Sans Black"/>
+              </a:rPr>
+              <a:t>Table 1. </a:t>
+            </a:r>
+            <a:r>
+              <a:rPr lang="en-US" sz="1200" dirty="0">
+                <a:solidFill>
+                  <a:prstClr val="black"/>
+                </a:solidFill>
+                <a:latin typeface="Ancizar Sans Black"/>
+              </a:rPr>
+              <a:t> Deep tools for video coding</a:t>
+            </a:r>
+            <a:endParaRPr lang="en-CO" sz="1200" dirty="0">
+              <a:solidFill>
+                <a:prstClr val="black"/>
+              </a:solidFill>
+              <a:latin typeface="Ancizar Sans Black"/>
+            </a:endParaRPr>
+          </a:p>
+        </p:txBody>
+      </p:sp>
+      <p:sp>
+        <p:nvSpPr>
+          <p:cNvPr id="17" name="Rectangle 16">
+            <a:extLst>
+              <a:ext uri="{FF2B5EF4-FFF2-40B4-BE49-F238E27FC236}">
+                <a16:creationId xmlns:a16="http://schemas.microsoft.com/office/drawing/2014/main" id="{426D15E4-52C1-804E-BC72-6FD28FC9C9E3}"/>
+              </a:ext>
+            </a:extLst>
+          </p:cNvPr>
+          <p:cNvSpPr/>
+          <p:nvPr/>
+        </p:nvSpPr>
+        <p:spPr>
+          <a:xfrm>
+            <a:off x="6324600" y="3590393"/>
+            <a:ext cx="6096000" cy="258532"/>
+          </a:xfrm>
+          <a:prstGeom prst="rect">
+            <a:avLst/>
+          </a:prstGeom>
+        </p:spPr>
+        <p:txBody>
+          <a:bodyPr>
+            <a:spAutoFit/>
+          </a:bodyPr>
+          <a:lstStyle/>
+          <a:p>
+            <a:pPr marL="0" lvl="1" defTabSz="800100">
+              <a:lnSpc>
+                <a:spcPct val="90000"/>
+              </a:lnSpc>
+              <a:spcBef>
+                <a:spcPct val="0"/>
+              </a:spcBef>
+              <a:spcAft>
+                <a:spcPct val="15000"/>
+              </a:spcAft>
+              <a:buClr>
+                <a:schemeClr val="accent2">
+                  <a:lumMod val="50000"/>
+                </a:schemeClr>
+              </a:buClr>
+            </a:pPr>
+            <a:r>
+              <a:rPr lang="en-US" sz="1200" b="1" dirty="0">
+                <a:solidFill>
+                  <a:prstClr val="black"/>
+                </a:solidFill>
+                <a:latin typeface="Ancizar Sans Black"/>
+              </a:rPr>
+              <a:t>Table 2. </a:t>
+            </a:r>
+            <a:r>
+              <a:rPr lang="en-US" sz="1200" dirty="0">
+                <a:solidFill>
+                  <a:prstClr val="black"/>
+                </a:solidFill>
+                <a:latin typeface="Ancizar Sans Black"/>
+              </a:rPr>
+              <a:t> E2E deep learning based video coding</a:t>
             </a:r>
             <a:endParaRPr lang="en-CO" sz="1200" dirty="0">
               <a:solidFill>

</xml_diff>

<commit_message>
solo falta el profesor Sergio
</commit_message>
<xml_diff>
--- a/presentation/Examen de Calificacion de Doctorado_Carlos_Alberto_Salazar.pptx
+++ b/presentation/Examen de Calificacion de Doctorado_Carlos_Alberto_Salazar.pptx
@@ -19205,7 +19205,7 @@
                 </a:highlight>
                 <a:latin typeface="Ancizar Sans Black"/>
               </a:rPr>
-              <a:t>Previous research around DL Tools have not been successfully deployed into the reference code, mainly because computational cost and architecture changes</a:t>
+              <a:t>Previous research around DL Tools have not been successfully deployed into the reference code, mainly because computational cost and architecture changes ()</a:t>
             </a:r>
           </a:p>
           <a:p>
@@ -20202,7 +20202,7 @@
                 </a:solidFill>
                 <a:latin typeface="Ancizar Sans Black"/>
               </a:rPr>
-              <a:t>AV2 aims to keep decoder complexity similar to AV1 (AOM,2020)</a:t>
+              <a:t>AV2 aims to achieve complexity &lt; 2xAV1 (AOM,2020)</a:t>
             </a:r>
           </a:p>
           <a:p>
@@ -21355,10 +21355,551 @@
       </p:sp>
       <p:sp>
         <p:nvSpPr>
-          <p:cNvPr id="5" name="TextBox 4">
+          <p:cNvPr id="3" name="Rectangle 2">
             <a:extLst>
               <a:ext uri="{FF2B5EF4-FFF2-40B4-BE49-F238E27FC236}">
-                <a16:creationId xmlns:a16="http://schemas.microsoft.com/office/drawing/2014/main" id="{E3F8A630-D80F-0142-BCDE-D1F40A918BEB}"/>
+                <a16:creationId xmlns:a16="http://schemas.microsoft.com/office/drawing/2014/main" id="{F06117F7-894D-DF43-A67F-2228C4292D26}"/>
+              </a:ext>
+            </a:extLst>
+          </p:cNvPr>
+          <p:cNvSpPr/>
+          <p:nvPr/>
+        </p:nvSpPr>
+        <p:spPr>
+          <a:xfrm>
+            <a:off x="509270" y="4941413"/>
+            <a:ext cx="6047740" cy="738664"/>
+          </a:xfrm>
+          <a:prstGeom prst="rect">
+            <a:avLst/>
+          </a:prstGeom>
+        </p:spPr>
+        <p:txBody>
+          <a:bodyPr wrap="square">
+            <a:spAutoFit/>
+          </a:bodyPr>
+          <a:lstStyle/>
+          <a:p>
+            <a:r>
+              <a:rPr lang="en-US" sz="1050" dirty="0" err="1">
+                <a:solidFill>
+                  <a:srgbClr val="000000"/>
+                </a:solidFill>
+                <a:latin typeface="Menlo" panose="020B0609030804020204" pitchFamily="49" charset="0"/>
+              </a:rPr>
+              <a:t>Svt</a:t>
+            </a:r>
+            <a:r>
+              <a:rPr lang="en-US" sz="1050" dirty="0">
+                <a:solidFill>
+                  <a:srgbClr val="000000"/>
+                </a:solidFill>
+                <a:latin typeface="Menlo" panose="020B0609030804020204" pitchFamily="49" charset="0"/>
+              </a:rPr>
+              <a:t>[warn]: The VBR and CVBR rate control modes are a work-in-progress projects, and are only available for demos, experimental and further development uses and should not be used for benchmarking until fully implemented.</a:t>
+            </a:r>
+            <a:endParaRPr lang="en-US" sz="1050" dirty="0">
+              <a:solidFill>
+                <a:srgbClr val="000000"/>
+              </a:solidFill>
+              <a:effectLst/>
+              <a:latin typeface="Menlo" panose="020B0609030804020204" pitchFamily="49" charset="0"/>
+            </a:endParaRPr>
+          </a:p>
+        </p:txBody>
+      </p:sp>
+      <p:grpSp>
+        <p:nvGrpSpPr>
+          <p:cNvPr id="6" name="Group 5">
+            <a:extLst>
+              <a:ext uri="{FF2B5EF4-FFF2-40B4-BE49-F238E27FC236}">
+                <a16:creationId xmlns:a16="http://schemas.microsoft.com/office/drawing/2014/main" id="{443F7B34-581B-4344-9C6E-D58FA3BDFCBB}"/>
+              </a:ext>
+            </a:extLst>
+          </p:cNvPr>
+          <p:cNvGrpSpPr/>
+          <p:nvPr/>
+        </p:nvGrpSpPr>
+        <p:grpSpPr>
+          <a:xfrm>
+            <a:off x="7391400" y="1525166"/>
+            <a:ext cx="2748699" cy="3734314"/>
+            <a:chOff x="7157301" y="1143000"/>
+            <a:chExt cx="3282099" cy="4607012"/>
+          </a:xfrm>
+        </p:grpSpPr>
+        <p:pic>
+          <p:nvPicPr>
+            <p:cNvPr id="2050" name="Picture 2" descr="AWS_Elemental_QVBR_Diagram_CBR">
+              <a:extLst>
+                <a:ext uri="{FF2B5EF4-FFF2-40B4-BE49-F238E27FC236}">
+                  <a16:creationId xmlns:a16="http://schemas.microsoft.com/office/drawing/2014/main" id="{A9D6C3ED-83FF-C540-AAD5-707DB2ABD7E9}"/>
+                </a:ext>
+              </a:extLst>
+            </p:cNvPr>
+            <p:cNvPicPr>
+              <a:picLocks noChangeAspect="1" noChangeArrowheads="1"/>
+            </p:cNvPicPr>
+            <p:nvPr/>
+          </p:nvPicPr>
+          <p:blipFill>
+            <a:blip r:embed="rId3">
+              <a:extLst>
+                <a:ext uri="{28A0092B-C50C-407E-A947-70E740481C1C}">
+                  <a14:useLocalDpi xmlns:a14="http://schemas.microsoft.com/office/drawing/2010/main" val="0"/>
+                </a:ext>
+              </a:extLst>
+            </a:blip>
+            <a:srcRect/>
+            <a:stretch>
+              <a:fillRect/>
+            </a:stretch>
+          </p:blipFill>
+          <p:spPr bwMode="auto">
+            <a:xfrm>
+              <a:off x="7162800" y="1143000"/>
+              <a:ext cx="3276600" cy="1499822"/>
+            </a:xfrm>
+            <a:prstGeom prst="rect">
+              <a:avLst/>
+            </a:prstGeom>
+            <a:noFill/>
+            <a:extLst>
+              <a:ext uri="{909E8E84-426E-40DD-AFC4-6F175D3DCCD1}">
+                <a14:hiddenFill xmlns:a14="http://schemas.microsoft.com/office/drawing/2010/main">
+                  <a:solidFill>
+                    <a:srgbClr val="FFFFFF"/>
+                  </a:solidFill>
+                </a14:hiddenFill>
+              </a:ext>
+            </a:extLst>
+          </p:spPr>
+        </p:pic>
+        <p:pic>
+          <p:nvPicPr>
+            <p:cNvPr id="2052" name="Picture 4" descr="AWS_Elemental_QVBR_Diagram_VBR">
+              <a:extLst>
+                <a:ext uri="{FF2B5EF4-FFF2-40B4-BE49-F238E27FC236}">
+                  <a16:creationId xmlns:a16="http://schemas.microsoft.com/office/drawing/2014/main" id="{0989A9D7-B5BA-7F4A-B501-9A3FDCD25A23}"/>
+                </a:ext>
+              </a:extLst>
+            </p:cNvPr>
+            <p:cNvPicPr>
+              <a:picLocks noChangeAspect="1" noChangeArrowheads="1"/>
+            </p:cNvPicPr>
+            <p:nvPr/>
+          </p:nvPicPr>
+          <p:blipFill>
+            <a:blip r:embed="rId4">
+              <a:extLst>
+                <a:ext uri="{28A0092B-C50C-407E-A947-70E740481C1C}">
+                  <a14:useLocalDpi xmlns:a14="http://schemas.microsoft.com/office/drawing/2010/main" val="0"/>
+                </a:ext>
+              </a:extLst>
+            </a:blip>
+            <a:srcRect/>
+            <a:stretch>
+              <a:fillRect/>
+            </a:stretch>
+          </p:blipFill>
+          <p:spPr bwMode="auto">
+            <a:xfrm>
+              <a:off x="7162800" y="2642822"/>
+              <a:ext cx="3276600" cy="1607367"/>
+            </a:xfrm>
+            <a:prstGeom prst="rect">
+              <a:avLst/>
+            </a:prstGeom>
+            <a:noFill/>
+            <a:extLst>
+              <a:ext uri="{909E8E84-426E-40DD-AFC4-6F175D3DCCD1}">
+                <a14:hiddenFill xmlns:a14="http://schemas.microsoft.com/office/drawing/2010/main">
+                  <a:solidFill>
+                    <a:srgbClr val="FFFFFF"/>
+                  </a:solidFill>
+                </a14:hiddenFill>
+              </a:ext>
+            </a:extLst>
+          </p:spPr>
+        </p:pic>
+        <p:pic>
+          <p:nvPicPr>
+            <p:cNvPr id="2056" name="Picture 8" descr="AWS_Elemental_QVBR_Diagram_QVBR">
+              <a:extLst>
+                <a:ext uri="{FF2B5EF4-FFF2-40B4-BE49-F238E27FC236}">
+                  <a16:creationId xmlns:a16="http://schemas.microsoft.com/office/drawing/2014/main" id="{F92BB65A-6EA0-7447-BAA4-BC95C779C510}"/>
+                </a:ext>
+              </a:extLst>
+            </p:cNvPr>
+            <p:cNvPicPr>
+              <a:picLocks noChangeAspect="1" noChangeArrowheads="1"/>
+            </p:cNvPicPr>
+            <p:nvPr/>
+          </p:nvPicPr>
+          <p:blipFill>
+            <a:blip r:embed="rId5">
+              <a:extLst>
+                <a:ext uri="{28A0092B-C50C-407E-A947-70E740481C1C}">
+                  <a14:useLocalDpi xmlns:a14="http://schemas.microsoft.com/office/drawing/2010/main" val="0"/>
+                </a:ext>
+              </a:extLst>
+            </a:blip>
+            <a:srcRect/>
+            <a:stretch>
+              <a:fillRect/>
+            </a:stretch>
+          </p:blipFill>
+          <p:spPr bwMode="auto">
+            <a:xfrm>
+              <a:off x="7157301" y="4250190"/>
+              <a:ext cx="3276601" cy="1499822"/>
+            </a:xfrm>
+            <a:prstGeom prst="rect">
+              <a:avLst/>
+            </a:prstGeom>
+            <a:noFill/>
+            <a:extLst>
+              <a:ext uri="{909E8E84-426E-40DD-AFC4-6F175D3DCCD1}">
+                <a14:hiddenFill xmlns:a14="http://schemas.microsoft.com/office/drawing/2010/main">
+                  <a:solidFill>
+                    <a:srgbClr val="FFFFFF"/>
+                  </a:solidFill>
+                </a14:hiddenFill>
+              </a:ext>
+            </a:extLst>
+          </p:spPr>
+        </p:pic>
+      </p:grpSp>
+      <p:sp>
+        <p:nvSpPr>
+          <p:cNvPr id="11" name="Rectangle 10">
+            <a:extLst>
+              <a:ext uri="{FF2B5EF4-FFF2-40B4-BE49-F238E27FC236}">
+                <a16:creationId xmlns:a16="http://schemas.microsoft.com/office/drawing/2014/main" id="{59D68117-0113-9740-89EE-C8507D08915F}"/>
+              </a:ext>
+            </a:extLst>
+          </p:cNvPr>
+          <p:cNvSpPr/>
+          <p:nvPr/>
+        </p:nvSpPr>
+        <p:spPr>
+          <a:xfrm>
+            <a:off x="7282992" y="1102005"/>
+            <a:ext cx="6096000" cy="286232"/>
+          </a:xfrm>
+          <a:prstGeom prst="rect">
+            <a:avLst/>
+          </a:prstGeom>
+        </p:spPr>
+        <p:txBody>
+          <a:bodyPr>
+            <a:spAutoFit/>
+          </a:bodyPr>
+          <a:lstStyle/>
+          <a:p>
+            <a:pPr marL="0" lvl="1" defTabSz="800100">
+              <a:lnSpc>
+                <a:spcPct val="90000"/>
+              </a:lnSpc>
+              <a:spcBef>
+                <a:spcPct val="0"/>
+              </a:spcBef>
+              <a:spcAft>
+                <a:spcPct val="15000"/>
+              </a:spcAft>
+              <a:buClr>
+                <a:schemeClr val="accent2">
+                  <a:lumMod val="50000"/>
+                </a:schemeClr>
+              </a:buClr>
+            </a:pPr>
+            <a:r>
+              <a:rPr lang="en-US" sz="1400" b="1" dirty="0">
+                <a:solidFill>
+                  <a:prstClr val="black"/>
+                </a:solidFill>
+                <a:latin typeface="Ancizar Sans Black"/>
+              </a:rPr>
+              <a:t>Figure 6. </a:t>
+            </a:r>
+            <a:r>
+              <a:rPr lang="en-US" sz="1400" dirty="0">
+                <a:solidFill>
+                  <a:prstClr val="black"/>
+                </a:solidFill>
+                <a:latin typeface="Ancizar Sans Black"/>
+              </a:rPr>
+              <a:t> Rate control mechanism for VOD</a:t>
+            </a:r>
+            <a:endParaRPr lang="en-CO" sz="1400" dirty="0">
+              <a:solidFill>
+                <a:prstClr val="black"/>
+              </a:solidFill>
+              <a:latin typeface="Ancizar Sans Black"/>
+            </a:endParaRPr>
+          </a:p>
+        </p:txBody>
+      </p:sp>
+      <p:sp>
+        <p:nvSpPr>
+          <p:cNvPr id="12" name="Rectangle 11">
+            <a:extLst>
+              <a:ext uri="{FF2B5EF4-FFF2-40B4-BE49-F238E27FC236}">
+                <a16:creationId xmlns:a16="http://schemas.microsoft.com/office/drawing/2014/main" id="{DB2CDF46-29EE-BA4A-956C-7D6862B52E96}"/>
+              </a:ext>
+            </a:extLst>
+          </p:cNvPr>
+          <p:cNvSpPr/>
+          <p:nvPr/>
+        </p:nvSpPr>
+        <p:spPr>
+          <a:xfrm>
+            <a:off x="10144704" y="2041260"/>
+            <a:ext cx="562794" cy="244682"/>
+          </a:xfrm>
+          <a:prstGeom prst="rect">
+            <a:avLst/>
+          </a:prstGeom>
+        </p:spPr>
+        <p:txBody>
+          <a:bodyPr wrap="square">
+            <a:spAutoFit/>
+          </a:bodyPr>
+          <a:lstStyle/>
+          <a:p>
+            <a:pPr marL="0" lvl="1" defTabSz="800100">
+              <a:lnSpc>
+                <a:spcPct val="90000"/>
+              </a:lnSpc>
+              <a:spcBef>
+                <a:spcPct val="0"/>
+              </a:spcBef>
+              <a:spcAft>
+                <a:spcPct val="15000"/>
+              </a:spcAft>
+              <a:buClr>
+                <a:schemeClr val="accent2">
+                  <a:lumMod val="50000"/>
+                </a:schemeClr>
+              </a:buClr>
+            </a:pPr>
+            <a:r>
+              <a:rPr lang="en-US" sz="1100" b="1" dirty="0">
+                <a:solidFill>
+                  <a:prstClr val="black"/>
+                </a:solidFill>
+                <a:latin typeface="Ancizar Sans Black"/>
+              </a:rPr>
+              <a:t>CBR</a:t>
+            </a:r>
+            <a:endParaRPr lang="en-CO" sz="1100" dirty="0">
+              <a:solidFill>
+                <a:prstClr val="black"/>
+              </a:solidFill>
+              <a:latin typeface="Ancizar Sans Black"/>
+            </a:endParaRPr>
+          </a:p>
+        </p:txBody>
+      </p:sp>
+      <p:sp>
+        <p:nvSpPr>
+          <p:cNvPr id="13" name="Rectangle 12">
+            <a:extLst>
+              <a:ext uri="{FF2B5EF4-FFF2-40B4-BE49-F238E27FC236}">
+                <a16:creationId xmlns:a16="http://schemas.microsoft.com/office/drawing/2014/main" id="{321FB964-3137-894B-A824-65BE4EC06568}"/>
+              </a:ext>
+            </a:extLst>
+          </p:cNvPr>
+          <p:cNvSpPr/>
+          <p:nvPr/>
+        </p:nvSpPr>
+        <p:spPr>
+          <a:xfrm>
+            <a:off x="10144704" y="3280132"/>
+            <a:ext cx="562794" cy="244682"/>
+          </a:xfrm>
+          <a:prstGeom prst="rect">
+            <a:avLst/>
+          </a:prstGeom>
+        </p:spPr>
+        <p:txBody>
+          <a:bodyPr wrap="square">
+            <a:spAutoFit/>
+          </a:bodyPr>
+          <a:lstStyle/>
+          <a:p>
+            <a:pPr marL="0" lvl="1" defTabSz="800100">
+              <a:lnSpc>
+                <a:spcPct val="90000"/>
+              </a:lnSpc>
+              <a:spcBef>
+                <a:spcPct val="0"/>
+              </a:spcBef>
+              <a:spcAft>
+                <a:spcPct val="15000"/>
+              </a:spcAft>
+              <a:buClr>
+                <a:schemeClr val="accent2">
+                  <a:lumMod val="50000"/>
+                </a:schemeClr>
+              </a:buClr>
+            </a:pPr>
+            <a:r>
+              <a:rPr lang="en-US" sz="1100" b="1" dirty="0">
+                <a:solidFill>
+                  <a:prstClr val="black"/>
+                </a:solidFill>
+                <a:latin typeface="Ancizar Sans Black"/>
+              </a:rPr>
+              <a:t>VBR</a:t>
+            </a:r>
+            <a:endParaRPr lang="en-CO" sz="1100" dirty="0">
+              <a:solidFill>
+                <a:prstClr val="black"/>
+              </a:solidFill>
+              <a:latin typeface="Ancizar Sans Black"/>
+            </a:endParaRPr>
+          </a:p>
+        </p:txBody>
+      </p:sp>
+      <p:sp>
+        <p:nvSpPr>
+          <p:cNvPr id="14" name="Rectangle 13">
+            <a:extLst>
+              <a:ext uri="{FF2B5EF4-FFF2-40B4-BE49-F238E27FC236}">
+                <a16:creationId xmlns:a16="http://schemas.microsoft.com/office/drawing/2014/main" id="{DABE194C-9730-3746-8CD9-AF4B66404A05}"/>
+              </a:ext>
+            </a:extLst>
+          </p:cNvPr>
+          <p:cNvSpPr/>
+          <p:nvPr/>
+        </p:nvSpPr>
+        <p:spPr>
+          <a:xfrm>
+            <a:off x="10145216" y="4696976"/>
+            <a:ext cx="562794" cy="244682"/>
+          </a:xfrm>
+          <a:prstGeom prst="rect">
+            <a:avLst/>
+          </a:prstGeom>
+        </p:spPr>
+        <p:txBody>
+          <a:bodyPr wrap="square">
+            <a:spAutoFit/>
+          </a:bodyPr>
+          <a:lstStyle/>
+          <a:p>
+            <a:pPr marL="0" lvl="1" defTabSz="800100">
+              <a:lnSpc>
+                <a:spcPct val="90000"/>
+              </a:lnSpc>
+              <a:spcBef>
+                <a:spcPct val="0"/>
+              </a:spcBef>
+              <a:spcAft>
+                <a:spcPct val="15000"/>
+              </a:spcAft>
+              <a:buClr>
+                <a:schemeClr val="accent2">
+                  <a:lumMod val="50000"/>
+                </a:schemeClr>
+              </a:buClr>
+            </a:pPr>
+            <a:r>
+              <a:rPr lang="en-US" sz="1100" b="1" dirty="0">
+                <a:solidFill>
+                  <a:prstClr val="black"/>
+                </a:solidFill>
+                <a:latin typeface="Ancizar Sans Black"/>
+              </a:rPr>
+              <a:t>QBR</a:t>
+            </a:r>
+            <a:endParaRPr lang="en-CO" sz="1100" dirty="0">
+              <a:solidFill>
+                <a:prstClr val="black"/>
+              </a:solidFill>
+              <a:latin typeface="Ancizar Sans Black"/>
+            </a:endParaRPr>
+          </a:p>
+        </p:txBody>
+      </p:sp>
+      <p:sp>
+        <p:nvSpPr>
+          <p:cNvPr id="15" name="Rectangle 14">
+            <a:extLst>
+              <a:ext uri="{FF2B5EF4-FFF2-40B4-BE49-F238E27FC236}">
+                <a16:creationId xmlns:a16="http://schemas.microsoft.com/office/drawing/2014/main" id="{18433135-595F-5C4A-81C7-042B2FE1687B}"/>
+              </a:ext>
+            </a:extLst>
+          </p:cNvPr>
+          <p:cNvSpPr/>
+          <p:nvPr/>
+        </p:nvSpPr>
+        <p:spPr>
+          <a:xfrm>
+            <a:off x="7315200" y="5396407"/>
+            <a:ext cx="6096000" cy="258532"/>
+          </a:xfrm>
+          <a:prstGeom prst="rect">
+            <a:avLst/>
+          </a:prstGeom>
+        </p:spPr>
+        <p:txBody>
+          <a:bodyPr>
+            <a:spAutoFit/>
+          </a:bodyPr>
+          <a:lstStyle/>
+          <a:p>
+            <a:pPr marL="0" lvl="1" defTabSz="800100">
+              <a:lnSpc>
+                <a:spcPct val="90000"/>
+              </a:lnSpc>
+              <a:spcBef>
+                <a:spcPct val="0"/>
+              </a:spcBef>
+              <a:spcAft>
+                <a:spcPct val="15000"/>
+              </a:spcAft>
+              <a:buClr>
+                <a:schemeClr val="accent2">
+                  <a:lumMod val="50000"/>
+                </a:schemeClr>
+              </a:buClr>
+            </a:pPr>
+            <a:r>
+              <a:rPr lang="en-US" sz="1200" b="1" dirty="0">
+                <a:solidFill>
+                  <a:prstClr val="black"/>
+                </a:solidFill>
+                <a:latin typeface="Ancizar Sans Black"/>
+              </a:rPr>
+              <a:t>Sources:  </a:t>
+            </a:r>
+            <a:r>
+              <a:rPr lang="en-US" sz="1200" dirty="0">
+                <a:solidFill>
+                  <a:prstClr val="black"/>
+                </a:solidFill>
+                <a:latin typeface="Ancizar Sans Black"/>
+                <a:hlinkClick r:id="rId6"/>
+              </a:rPr>
+              <a:t>aws-elemental</a:t>
+            </a:r>
+            <a:endParaRPr lang="en-CO" sz="1200" dirty="0">
+              <a:solidFill>
+                <a:prstClr val="black"/>
+              </a:solidFill>
+              <a:latin typeface="Ancizar Sans Black"/>
+            </a:endParaRPr>
+          </a:p>
+        </p:txBody>
+      </p:sp>
+      <p:sp>
+        <p:nvSpPr>
+          <p:cNvPr id="16" name="TextBox 15">
+            <a:extLst>
+              <a:ext uri="{FF2B5EF4-FFF2-40B4-BE49-F238E27FC236}">
+                <a16:creationId xmlns:a16="http://schemas.microsoft.com/office/drawing/2014/main" id="{1A59D544-C92B-6C4C-B536-B2DA7CAA953F}"/>
               </a:ext>
             </a:extLst>
           </p:cNvPr>
@@ -21367,8 +21908,8 @@
         </p:nvSpPr>
         <p:spPr>
           <a:xfrm>
-            <a:off x="762000" y="1601819"/>
-            <a:ext cx="9067800" cy="1191095"/>
+            <a:off x="609600" y="1177923"/>
+            <a:ext cx="5486400" cy="3517886"/>
           </a:xfrm>
           <a:prstGeom prst="rect">
             <a:avLst/>
@@ -21428,12 +21969,9 @@
                 <a:solidFill>
                   <a:prstClr val="black"/>
                 </a:solidFill>
-                <a:highlight>
-                  <a:srgbClr val="FFFF00"/>
-                </a:highlight>
                 <a:latin typeface="Ancizar Sans Black"/>
               </a:rPr>
-              <a:t>BD-Rate</a:t>
+              <a:t>Rate control is the ability of the video encoder to distribute its budget of bits among the frame sequences following a specific criteria  (quality or bitrate).</a:t>
             </a:r>
           </a:p>
           <a:p>
@@ -21453,6 +21991,210 @@
                 </a:schemeClr>
               </a:buClr>
             </a:pPr>
+            <a:endParaRPr lang="en-US" sz="1400" i="1" dirty="0">
+              <a:solidFill>
+                <a:prstClr val="black"/>
+              </a:solidFill>
+              <a:latin typeface="Ancizar Sans Black"/>
+            </a:endParaRPr>
+          </a:p>
+          <a:p>
+            <a:pPr marL="285750" lvl="1" indent="-285750" defTabSz="800100">
+              <a:lnSpc>
+                <a:spcPct val="90000"/>
+              </a:lnSpc>
+              <a:spcBef>
+                <a:spcPct val="0"/>
+              </a:spcBef>
+              <a:spcAft>
+                <a:spcPct val="15000"/>
+              </a:spcAft>
+              <a:buClr>
+                <a:schemeClr val="accent2">
+                  <a:lumMod val="50000"/>
+                </a:schemeClr>
+              </a:buClr>
+              <a:buFont typeface="Wingdings" pitchFamily="2" charset="2"/>
+              <a:buChar char="Ø"/>
+            </a:pPr>
+            <a:r>
+              <a:rPr lang="en-US" sz="1400" dirty="0">
+                <a:solidFill>
+                  <a:prstClr val="black"/>
+                </a:solidFill>
+                <a:latin typeface="Ancizar Sans Black"/>
+              </a:rPr>
+              <a:t>Rate control is a well-known feature in HEVC and AV1 using 2 passes</a:t>
+            </a:r>
+          </a:p>
+          <a:p>
+            <a:pPr marL="285750" lvl="1" indent="-285750" defTabSz="800100">
+              <a:lnSpc>
+                <a:spcPct val="90000"/>
+              </a:lnSpc>
+              <a:spcBef>
+                <a:spcPct val="0"/>
+              </a:spcBef>
+              <a:spcAft>
+                <a:spcPct val="15000"/>
+              </a:spcAft>
+              <a:buClr>
+                <a:schemeClr val="accent2">
+                  <a:lumMod val="50000"/>
+                </a:schemeClr>
+              </a:buClr>
+              <a:buFont typeface="Wingdings" pitchFamily="2" charset="2"/>
+              <a:buChar char="Ø"/>
+            </a:pPr>
+            <a:endParaRPr lang="en-US" sz="1400" dirty="0">
+              <a:solidFill>
+                <a:prstClr val="black"/>
+              </a:solidFill>
+              <a:latin typeface="Ancizar Sans Black"/>
+            </a:endParaRPr>
+          </a:p>
+          <a:p>
+            <a:pPr marL="285750" lvl="1" indent="-285750" defTabSz="800100">
+              <a:lnSpc>
+                <a:spcPct val="90000"/>
+              </a:lnSpc>
+              <a:spcBef>
+                <a:spcPct val="0"/>
+              </a:spcBef>
+              <a:spcAft>
+                <a:spcPct val="15000"/>
+              </a:spcAft>
+              <a:buClr>
+                <a:schemeClr val="accent2">
+                  <a:lumMod val="50000"/>
+                </a:schemeClr>
+              </a:buClr>
+              <a:buFont typeface="Wingdings" pitchFamily="2" charset="2"/>
+              <a:buChar char="Ø"/>
+            </a:pPr>
+            <a:r>
+              <a:rPr lang="en-US" sz="1400" dirty="0">
+                <a:solidFill>
+                  <a:prstClr val="black"/>
+                </a:solidFill>
+                <a:latin typeface="Ancizar Sans Black"/>
+              </a:rPr>
+              <a:t>A key factor for AV1 poor performance on real-time is  the weakness of rate control mechanism in 1-pass  (Fang, 2020 )</a:t>
+            </a:r>
+          </a:p>
+          <a:p>
+            <a:pPr marL="285750" lvl="1" indent="-285750" defTabSz="800100">
+              <a:lnSpc>
+                <a:spcPct val="90000"/>
+              </a:lnSpc>
+              <a:spcBef>
+                <a:spcPct val="0"/>
+              </a:spcBef>
+              <a:spcAft>
+                <a:spcPct val="15000"/>
+              </a:spcAft>
+              <a:buClr>
+                <a:schemeClr val="accent2">
+                  <a:lumMod val="50000"/>
+                </a:schemeClr>
+              </a:buClr>
+              <a:buFont typeface="Wingdings" pitchFamily="2" charset="2"/>
+              <a:buChar char="Ø"/>
+            </a:pPr>
+            <a:endParaRPr lang="en-US" sz="1400" i="1" dirty="0">
+              <a:solidFill>
+                <a:prstClr val="black"/>
+              </a:solidFill>
+              <a:latin typeface="Ancizar Sans Black"/>
+            </a:endParaRPr>
+          </a:p>
+          <a:p>
+            <a:pPr marL="285750" lvl="1" indent="-285750" defTabSz="800100">
+              <a:lnSpc>
+                <a:spcPct val="90000"/>
+              </a:lnSpc>
+              <a:spcBef>
+                <a:spcPct val="0"/>
+              </a:spcBef>
+              <a:spcAft>
+                <a:spcPct val="15000"/>
+              </a:spcAft>
+              <a:buClr>
+                <a:schemeClr val="accent2">
+                  <a:lumMod val="50000"/>
+                </a:schemeClr>
+              </a:buClr>
+              <a:buFont typeface="Wingdings" pitchFamily="2" charset="2"/>
+              <a:buChar char="Ø"/>
+            </a:pPr>
+            <a:r>
+              <a:rPr lang="en-US" sz="1400" dirty="0">
+                <a:solidFill>
+                  <a:prstClr val="black"/>
+                </a:solidFill>
+                <a:latin typeface="Ancizar Sans Black"/>
+              </a:rPr>
+              <a:t>AV2 expects to include VBR and Context VBR tools as part of the reference codec (AOM, 2020)</a:t>
+            </a:r>
+          </a:p>
+          <a:p>
+            <a:pPr marL="285750" lvl="1" indent="-285750" defTabSz="800100">
+              <a:lnSpc>
+                <a:spcPct val="90000"/>
+              </a:lnSpc>
+              <a:spcBef>
+                <a:spcPct val="0"/>
+              </a:spcBef>
+              <a:spcAft>
+                <a:spcPct val="15000"/>
+              </a:spcAft>
+              <a:buClr>
+                <a:schemeClr val="accent2">
+                  <a:lumMod val="50000"/>
+                </a:schemeClr>
+              </a:buClr>
+              <a:buFont typeface="Wingdings" pitchFamily="2" charset="2"/>
+              <a:buChar char="Ø"/>
+            </a:pPr>
+            <a:endParaRPr lang="en-US" sz="1400" dirty="0">
+              <a:solidFill>
+                <a:prstClr val="black"/>
+              </a:solidFill>
+              <a:latin typeface="Ancizar Sans Black"/>
+            </a:endParaRPr>
+          </a:p>
+          <a:p>
+            <a:pPr marL="285750" lvl="1" indent="-285750" defTabSz="800100">
+              <a:lnSpc>
+                <a:spcPct val="90000"/>
+              </a:lnSpc>
+              <a:spcBef>
+                <a:spcPct val="0"/>
+              </a:spcBef>
+              <a:spcAft>
+                <a:spcPct val="15000"/>
+              </a:spcAft>
+              <a:buClr>
+                <a:schemeClr val="accent2">
+                  <a:lumMod val="50000"/>
+                </a:schemeClr>
+              </a:buClr>
+              <a:buFont typeface="Wingdings" pitchFamily="2" charset="2"/>
+              <a:buChar char="Ø"/>
+            </a:pPr>
+            <a:r>
+              <a:rPr lang="en-US" sz="1400" dirty="0">
+                <a:solidFill>
+                  <a:prstClr val="black"/>
+                </a:solidFill>
+                <a:latin typeface="Ancizar Sans Black"/>
+              </a:rPr>
+              <a:t>CNN for predicting bits allocation  and distortion have me reported by (Gomez, 2020) and (</a:t>
+            </a:r>
+            <a:r>
+              <a:rPr lang="en-US" sz="1400" dirty="0"/>
+              <a:t>﻿J. Hu, 2018)</a:t>
+            </a:r>
             <a:endParaRPr lang="en-US" sz="1400" dirty="0">
               <a:solidFill>
                 <a:prstClr val="black"/>
@@ -21463,6 +22205,60 @@
               <a:latin typeface="Ancizar Sans Black"/>
             </a:endParaRPr>
           </a:p>
+          <a:p>
+            <a:pPr marL="285750" lvl="1" indent="-285750" defTabSz="800100">
+              <a:lnSpc>
+                <a:spcPct val="90000"/>
+              </a:lnSpc>
+              <a:spcBef>
+                <a:spcPct val="0"/>
+              </a:spcBef>
+              <a:spcAft>
+                <a:spcPct val="15000"/>
+              </a:spcAft>
+              <a:buClr>
+                <a:schemeClr val="accent2">
+                  <a:lumMod val="50000"/>
+                </a:schemeClr>
+              </a:buClr>
+              <a:buFont typeface="Wingdings" pitchFamily="2" charset="2"/>
+              <a:buChar char="Ø"/>
+            </a:pPr>
+            <a:endParaRPr lang="en-US" sz="1400" dirty="0">
+              <a:solidFill>
+                <a:prstClr val="black"/>
+              </a:solidFill>
+              <a:latin typeface="Ancizar Sans Black"/>
+            </a:endParaRPr>
+          </a:p>
+        </p:txBody>
+      </p:sp>
+      <p:sp>
+        <p:nvSpPr>
+          <p:cNvPr id="19" name="Rectangle 18">
+            <a:extLst>
+              <a:ext uri="{FF2B5EF4-FFF2-40B4-BE49-F238E27FC236}">
+                <a16:creationId xmlns:a16="http://schemas.microsoft.com/office/drawing/2014/main" id="{D7033D68-08AA-084F-A35D-D308711BD1F5}"/>
+              </a:ext>
+            </a:extLst>
+          </p:cNvPr>
+          <p:cNvSpPr/>
+          <p:nvPr/>
+        </p:nvSpPr>
+        <p:spPr>
+          <a:xfrm>
+            <a:off x="485140" y="5782565"/>
+            <a:ext cx="6096000" cy="258532"/>
+          </a:xfrm>
+          <a:prstGeom prst="rect">
+            <a:avLst/>
+          </a:prstGeom>
+        </p:spPr>
+        <p:txBody>
+          <a:bodyPr>
+            <a:spAutoFit/>
+          </a:bodyPr>
+          <a:lstStyle/>
           <a:p>
             <a:pPr marL="0" lvl="1" defTabSz="800100">
               <a:lnSpc>
@@ -21480,34 +22276,25 @@
                 </a:schemeClr>
               </a:buClr>
             </a:pPr>
-            <a:endParaRPr lang="en-US" sz="1400" dirty="0">
-              <a:solidFill>
-                <a:prstClr val="black"/>
-              </a:solidFill>
-              <a:highlight>
-                <a:srgbClr val="FFFF00"/>
-              </a:highlight>
-              <a:latin typeface="Ancizar Sans Black"/>
-            </a:endParaRPr>
-          </a:p>
-          <a:p>
-            <a:pPr marL="0" lvl="1" defTabSz="800100">
-              <a:lnSpc>
-                <a:spcPct val="90000"/>
-              </a:lnSpc>
-              <a:spcBef>
-                <a:spcPct val="0"/>
-              </a:spcBef>
-              <a:spcAft>
-                <a:spcPct val="15000"/>
-              </a:spcAft>
-              <a:buClr>
-                <a:schemeClr val="accent2">
-                  <a:lumMod val="50000"/>
-                </a:schemeClr>
-              </a:buClr>
-            </a:pPr>
-            <a:endParaRPr lang="en-US" sz="1400" dirty="0">
+            <a:r>
+              <a:rPr lang="en-US" sz="1200" b="1" dirty="0">
+                <a:solidFill>
+                  <a:prstClr val="black"/>
+                </a:solidFill>
+                <a:latin typeface="Ancizar Sans Black"/>
+              </a:rPr>
+              <a:t>Note: </a:t>
+            </a:r>
+            <a:r>
+              <a:rPr lang="en-US" sz="1200" dirty="0">
+                <a:solidFill>
+                  <a:prstClr val="black"/>
+                </a:solidFill>
+                <a:latin typeface="Ancizar Sans Black"/>
+              </a:rPr>
+              <a:t> AV2 reference code error message when CVBR is tried to be used</a:t>
+            </a:r>
+            <a:endParaRPr lang="en-CO" sz="1200" dirty="0">
               <a:solidFill>
                 <a:prstClr val="black"/>
               </a:solidFill>
@@ -21764,7 +22551,7 @@
         <p:spPr>
           <a:xfrm>
             <a:off x="762000" y="1601819"/>
-            <a:ext cx="9067800" cy="738664"/>
+            <a:ext cx="5666740" cy="1191095"/>
           </a:xfrm>
           <a:prstGeom prst="rect">
             <a:avLst/>
@@ -21777,7 +22564,7 @@
           </a:bodyPr>
           <a:lstStyle/>
           <a:p>
-            <a:pPr marL="0" lvl="1" defTabSz="800100">
+            <a:pPr marL="285750" lvl="1" indent="-285750" defTabSz="800100">
               <a:lnSpc>
                 <a:spcPct val="90000"/>
               </a:lnSpc>
@@ -21792,25 +22579,21 @@
                   <a:lumMod val="50000"/>
                 </a:schemeClr>
               </a:buClr>
+              <a:buFont typeface="Wingdings" pitchFamily="2" charset="2"/>
+              <a:buChar char="Ø"/>
             </a:pPr>
             <a:r>
               <a:rPr lang="en-US" sz="1400" dirty="0">
                 <a:solidFill>
                   <a:prstClr val="black"/>
                 </a:solidFill>
+                <a:highlight>
+                  <a:srgbClr val="FFFF00"/>
+                </a:highlight>
                 <a:latin typeface="Ancizar Sans Black"/>
               </a:rPr>
-              <a:t>???</a:t>
-            </a:r>
-            <a:endParaRPr lang="en-US" sz="1400" dirty="0">
-              <a:solidFill>
-                <a:prstClr val="black"/>
-              </a:solidFill>
-              <a:highlight>
-                <a:srgbClr val="FFFF00"/>
-              </a:highlight>
-              <a:latin typeface="Ancizar Sans Black"/>
-            </a:endParaRPr>
+              <a:t>Upscaling vs super-resolution</a:t>
+            </a:r>
           </a:p>
           <a:p>
             <a:pPr marL="285750" lvl="1" indent="-285750" defTabSz="800100">
@@ -21842,7 +22625,7 @@
             </a:endParaRPr>
           </a:p>
           <a:p>
-            <a:pPr marL="0" lvl="1" defTabSz="800100">
+            <a:pPr marL="285750" lvl="1" indent="-285750" defTabSz="800100">
               <a:lnSpc>
                 <a:spcPct val="90000"/>
               </a:lnSpc>
@@ -21857,16 +22640,115 @@
                   <a:lumMod val="50000"/>
                 </a:schemeClr>
               </a:buClr>
+              <a:buFont typeface="Wingdings" pitchFamily="2" charset="2"/>
+              <a:buChar char="Ø"/>
+            </a:pPr>
+            <a:r>
+              <a:rPr lang="en-US" sz="1400" dirty="0">
+                <a:solidFill>
+                  <a:prstClr val="black"/>
+                </a:solidFill>
+                <a:highlight>
+                  <a:srgbClr val="FFFF00"/>
+                </a:highlight>
+                <a:latin typeface="Ancizar Sans Black"/>
+              </a:rPr>
+              <a:t>Super-resolution leverage by restoration filters</a:t>
+            </a:r>
+          </a:p>
+          <a:p>
+            <a:pPr marL="285750" lvl="1" indent="-285750" defTabSz="800100">
+              <a:lnSpc>
+                <a:spcPct val="90000"/>
+              </a:lnSpc>
+              <a:spcBef>
+                <a:spcPct val="0"/>
+              </a:spcBef>
+              <a:spcAft>
+                <a:spcPct val="15000"/>
+              </a:spcAft>
+              <a:buClr>
+                <a:schemeClr val="accent2">
+                  <a:lumMod val="50000"/>
+                </a:schemeClr>
+              </a:buClr>
+              <a:buFont typeface="Wingdings" pitchFamily="2" charset="2"/>
+              <a:buChar char="Ø"/>
             </a:pPr>
             <a:endParaRPr lang="en-US" sz="1400" dirty="0">
               <a:solidFill>
                 <a:prstClr val="black"/>
               </a:solidFill>
+              <a:highlight>
+                <a:srgbClr val="FFFF00"/>
+              </a:highlight>
               <a:latin typeface="Ancizar Sans Black"/>
             </a:endParaRPr>
           </a:p>
+          <a:p>
+            <a:pPr marL="285750" lvl="1" indent="-285750" defTabSz="800100">
+              <a:lnSpc>
+                <a:spcPct val="90000"/>
+              </a:lnSpc>
+              <a:spcBef>
+                <a:spcPct val="0"/>
+              </a:spcBef>
+              <a:spcAft>
+                <a:spcPct val="15000"/>
+              </a:spcAft>
+              <a:buClr>
+                <a:schemeClr val="accent2">
+                  <a:lumMod val="50000"/>
+                </a:schemeClr>
+              </a:buClr>
+              <a:buFont typeface="Wingdings" pitchFamily="2" charset="2"/>
+              <a:buChar char="Ø"/>
+            </a:pPr>
+            <a:r>
+              <a:rPr lang="en-US" sz="1400" dirty="0">
+                <a:solidFill>
+                  <a:prstClr val="black"/>
+                </a:solidFill>
+                <a:highlight>
+                  <a:srgbClr val="FFFF00"/>
+                </a:highlight>
+                <a:latin typeface="Ancizar Sans Black"/>
+              </a:rPr>
+              <a:t>Efficient storage usage because rate control mechanism</a:t>
+            </a:r>
+          </a:p>
         </p:txBody>
       </p:sp>
+      <p:pic>
+        <p:nvPicPr>
+          <p:cNvPr id="3" name="Picture 2">
+            <a:extLst>
+              <a:ext uri="{FF2B5EF4-FFF2-40B4-BE49-F238E27FC236}">
+                <a16:creationId xmlns:a16="http://schemas.microsoft.com/office/drawing/2014/main" id="{EA95B46A-4192-3849-8F44-8DB029078742}"/>
+              </a:ext>
+            </a:extLst>
+          </p:cNvPr>
+          <p:cNvPicPr>
+            <a:picLocks noChangeAspect="1"/>
+          </p:cNvPicPr>
+          <p:nvPr/>
+        </p:nvPicPr>
+        <p:blipFill>
+          <a:blip r:embed="rId3"/>
+          <a:stretch>
+            <a:fillRect/>
+          </a:stretch>
+        </p:blipFill>
+        <p:spPr>
+          <a:xfrm>
+            <a:off x="5486400" y="1666811"/>
+            <a:ext cx="6096000" cy="2070100"/>
+          </a:xfrm>
+          <a:prstGeom prst="rect">
+            <a:avLst/>
+          </a:prstGeom>
+        </p:spPr>
+      </p:pic>
     </p:spTree>
     <p:extLst>
       <p:ext uri="{BB962C8B-B14F-4D97-AF65-F5344CB8AC3E}">
@@ -22111,7 +22993,7 @@
         </p:nvSpPr>
         <p:spPr>
           <a:xfrm>
-            <a:off x="762000" y="1601819"/>
+            <a:off x="1295400" y="2041697"/>
             <a:ext cx="9067800" cy="2774606"/>
           </a:xfrm>
           <a:prstGeom prst="rect">
@@ -22124,6 +23006,33 @@
             <a:spAutoFit/>
           </a:bodyPr>
           <a:lstStyle/>
+          <a:p>
+            <a:pPr marL="0" lvl="1" defTabSz="800100">
+              <a:lnSpc>
+                <a:spcPct val="90000"/>
+              </a:lnSpc>
+              <a:spcBef>
+                <a:spcPct val="0"/>
+              </a:spcBef>
+              <a:spcAft>
+                <a:spcPct val="15000"/>
+              </a:spcAft>
+              <a:buClr>
+                <a:schemeClr val="accent2">
+                  <a:lumMod val="50000"/>
+                </a:schemeClr>
+              </a:buClr>
+            </a:pPr>
+            <a:endParaRPr lang="en-US" sz="1400" dirty="0">
+              <a:solidFill>
+                <a:prstClr val="black"/>
+              </a:solidFill>
+              <a:highlight>
+                <a:srgbClr val="FFFF00"/>
+              </a:highlight>
+              <a:latin typeface="Ancizar Sans Black"/>
+            </a:endParaRPr>
+          </a:p>
           <a:p>
             <a:pPr marL="285750" lvl="1" indent="-285750" defTabSz="800100">
               <a:lnSpc>
@@ -22153,7 +23062,7 @@
                 </a:highlight>
                 <a:latin typeface="Ancizar Sans Black"/>
               </a:rPr>
-              <a:t>Complexity</a:t>
+              <a:t>Real-time</a:t>
             </a:r>
           </a:p>
           <a:p>
@@ -22204,6 +23113,35 @@
               <a:buFont typeface="Wingdings" pitchFamily="2" charset="2"/>
               <a:buChar char="Ø"/>
             </a:pPr>
+            <a:endParaRPr lang="en-US" sz="1400" dirty="0">
+              <a:solidFill>
+                <a:prstClr val="black"/>
+              </a:solidFill>
+              <a:highlight>
+                <a:srgbClr val="FFFF00"/>
+              </a:highlight>
+              <a:latin typeface="Ancizar Sans Black"/>
+            </a:endParaRPr>
+          </a:p>
+          <a:p>
+            <a:pPr marL="285750" lvl="1" indent="-285750" defTabSz="800100">
+              <a:lnSpc>
+                <a:spcPct val="90000"/>
+              </a:lnSpc>
+              <a:spcBef>
+                <a:spcPct val="0"/>
+              </a:spcBef>
+              <a:spcAft>
+                <a:spcPct val="15000"/>
+              </a:spcAft>
+              <a:buClr>
+                <a:schemeClr val="accent2">
+                  <a:lumMod val="50000"/>
+                </a:schemeClr>
+              </a:buClr>
+              <a:buFont typeface="Wingdings" pitchFamily="2" charset="2"/>
+              <a:buChar char="Ø"/>
+            </a:pPr>
             <a:r>
               <a:rPr lang="en-US" sz="1400" dirty="0">
                 <a:solidFill>
@@ -22214,7 +23152,7 @@
                 </a:highlight>
                 <a:latin typeface="Ancizar Sans Black"/>
               </a:rPr>
-              <a:t>Reference hybrid video integration</a:t>
+              <a:t>Quality</a:t>
             </a:r>
           </a:p>
           <a:p>
@@ -22265,18 +23203,15 @@
               <a:buFont typeface="Wingdings" pitchFamily="2" charset="2"/>
               <a:buChar char="Ø"/>
             </a:pPr>
-            <a:r>
-              <a:rPr lang="en-US" sz="1400" dirty="0">
-                <a:solidFill>
-                  <a:prstClr val="black"/>
-                </a:solidFill>
-                <a:highlight>
-                  <a:srgbClr val="FFFF00"/>
-                </a:highlight>
-                <a:latin typeface="Ancizar Sans Black"/>
-              </a:rPr>
-              <a:t>Real-time</a:t>
-            </a:r>
+            <a:endParaRPr lang="en-US" sz="1400" dirty="0">
+              <a:solidFill>
+                <a:prstClr val="black"/>
+              </a:solidFill>
+              <a:highlight>
+                <a:srgbClr val="FFFF00"/>
+              </a:highlight>
+              <a:latin typeface="Ancizar Sans Black"/>
+            </a:endParaRPr>
           </a:p>
           <a:p>
             <a:pPr marL="285750" lvl="1" indent="-285750" defTabSz="800100">
@@ -22297,64 +23232,6 @@
               <a:buFont typeface="Wingdings" pitchFamily="2" charset="2"/>
               <a:buChar char="Ø"/>
             </a:pPr>
-            <a:endParaRPr lang="en-US" sz="1400" dirty="0">
-              <a:solidFill>
-                <a:prstClr val="black"/>
-              </a:solidFill>
-              <a:highlight>
-                <a:srgbClr val="FFFF00"/>
-              </a:highlight>
-              <a:latin typeface="Ancizar Sans Black"/>
-            </a:endParaRPr>
-          </a:p>
-          <a:p>
-            <a:pPr marL="285750" lvl="1" indent="-285750" defTabSz="800100">
-              <a:lnSpc>
-                <a:spcPct val="90000"/>
-              </a:lnSpc>
-              <a:spcBef>
-                <a:spcPct val="0"/>
-              </a:spcBef>
-              <a:spcAft>
-                <a:spcPct val="15000"/>
-              </a:spcAft>
-              <a:buClr>
-                <a:schemeClr val="accent2">
-                  <a:lumMod val="50000"/>
-                </a:schemeClr>
-              </a:buClr>
-              <a:buFont typeface="Wingdings" pitchFamily="2" charset="2"/>
-              <a:buChar char="Ø"/>
-            </a:pPr>
-            <a:endParaRPr lang="en-US" sz="1400" dirty="0">
-              <a:solidFill>
-                <a:prstClr val="black"/>
-              </a:solidFill>
-              <a:highlight>
-                <a:srgbClr val="FFFF00"/>
-              </a:highlight>
-              <a:latin typeface="Ancizar Sans Black"/>
-            </a:endParaRPr>
-          </a:p>
-          <a:p>
-            <a:pPr marL="285750" lvl="1" indent="-285750" defTabSz="800100">
-              <a:lnSpc>
-                <a:spcPct val="90000"/>
-              </a:lnSpc>
-              <a:spcBef>
-                <a:spcPct val="0"/>
-              </a:spcBef>
-              <a:spcAft>
-                <a:spcPct val="15000"/>
-              </a:spcAft>
-              <a:buClr>
-                <a:schemeClr val="accent2">
-                  <a:lumMod val="50000"/>
-                </a:schemeClr>
-              </a:buClr>
-              <a:buFont typeface="Wingdings" pitchFamily="2" charset="2"/>
-              <a:buChar char="Ø"/>
-            </a:pPr>
             <a:r>
               <a:rPr lang="en-US" sz="1400" dirty="0">
                 <a:solidFill>
@@ -22365,7 +23242,7 @@
                 </a:highlight>
                 <a:latin typeface="Ancizar Sans Black"/>
               </a:rPr>
-              <a:t>Bandwidth</a:t>
+              <a:t>Bandwidth efficiency </a:t>
             </a:r>
           </a:p>
           <a:p>
@@ -22733,7 +23610,7 @@
         <p:spPr>
           <a:xfrm>
             <a:off x="762000" y="1601819"/>
-            <a:ext cx="9067800" cy="964880"/>
+            <a:ext cx="9067800" cy="2095958"/>
           </a:xfrm>
           <a:prstGeom prst="rect">
             <a:avLst/>
@@ -22774,8 +23651,201 @@
                 </a:highlight>
                 <a:latin typeface="Ancizar Sans Black"/>
               </a:rPr>
-              <a:t>Same as  Germán</a:t>
-            </a:r>
+              <a:t>Trade-off  between complexity and  efficiency ( AV2 &lt; 2xAV1)</a:t>
+            </a:r>
+          </a:p>
+          <a:p>
+            <a:pPr marL="285750" lvl="1" indent="-285750" defTabSz="800100">
+              <a:lnSpc>
+                <a:spcPct val="90000"/>
+              </a:lnSpc>
+              <a:spcBef>
+                <a:spcPct val="0"/>
+              </a:spcBef>
+              <a:spcAft>
+                <a:spcPct val="15000"/>
+              </a:spcAft>
+              <a:buClr>
+                <a:schemeClr val="accent2">
+                  <a:lumMod val="50000"/>
+                </a:schemeClr>
+              </a:buClr>
+              <a:buFont typeface="Wingdings" pitchFamily="2" charset="2"/>
+              <a:buChar char="Ø"/>
+            </a:pPr>
+            <a:endParaRPr lang="en-US" sz="1400" dirty="0">
+              <a:solidFill>
+                <a:prstClr val="black"/>
+              </a:solidFill>
+              <a:highlight>
+                <a:srgbClr val="FFFF00"/>
+              </a:highlight>
+              <a:latin typeface="Ancizar Sans Black"/>
+            </a:endParaRPr>
+          </a:p>
+          <a:p>
+            <a:pPr marL="285750" lvl="1" indent="-285750" defTabSz="800100">
+              <a:lnSpc>
+                <a:spcPct val="90000"/>
+              </a:lnSpc>
+              <a:spcBef>
+                <a:spcPct val="0"/>
+              </a:spcBef>
+              <a:spcAft>
+                <a:spcPct val="15000"/>
+              </a:spcAft>
+              <a:buClr>
+                <a:schemeClr val="accent2">
+                  <a:lumMod val="50000"/>
+                </a:schemeClr>
+              </a:buClr>
+              <a:buFont typeface="Wingdings" pitchFamily="2" charset="2"/>
+              <a:buChar char="Ø"/>
+            </a:pPr>
+            <a:r>
+              <a:rPr lang="en-US" sz="1400" dirty="0">
+                <a:solidFill>
+                  <a:prstClr val="black"/>
+                </a:solidFill>
+                <a:latin typeface="Ancizar Sans Black"/>
+              </a:rPr>
+              <a:t>Baseline scheme conservation</a:t>
+            </a:r>
+          </a:p>
+          <a:p>
+            <a:pPr marL="285750" lvl="1" indent="-285750" defTabSz="800100">
+              <a:lnSpc>
+                <a:spcPct val="90000"/>
+              </a:lnSpc>
+              <a:spcBef>
+                <a:spcPct val="0"/>
+              </a:spcBef>
+              <a:spcAft>
+                <a:spcPct val="15000"/>
+              </a:spcAft>
+              <a:buClr>
+                <a:schemeClr val="accent2">
+                  <a:lumMod val="50000"/>
+                </a:schemeClr>
+              </a:buClr>
+              <a:buFont typeface="Wingdings" pitchFamily="2" charset="2"/>
+              <a:buChar char="Ø"/>
+            </a:pPr>
+            <a:endParaRPr lang="en-US" sz="1400" dirty="0">
+              <a:solidFill>
+                <a:prstClr val="black"/>
+              </a:solidFill>
+              <a:latin typeface="Ancizar Sans Black"/>
+            </a:endParaRPr>
+          </a:p>
+          <a:p>
+            <a:pPr marL="285750" lvl="1" indent="-285750" defTabSz="800100">
+              <a:lnSpc>
+                <a:spcPct val="90000"/>
+              </a:lnSpc>
+              <a:spcBef>
+                <a:spcPct val="0"/>
+              </a:spcBef>
+              <a:spcAft>
+                <a:spcPct val="15000"/>
+              </a:spcAft>
+              <a:buClr>
+                <a:schemeClr val="accent2">
+                  <a:lumMod val="50000"/>
+                </a:schemeClr>
+              </a:buClr>
+              <a:buFont typeface="Wingdings" pitchFamily="2" charset="2"/>
+              <a:buChar char="Ø"/>
+            </a:pPr>
+            <a:endParaRPr lang="en-US" sz="1400" dirty="0">
+              <a:solidFill>
+                <a:prstClr val="black"/>
+              </a:solidFill>
+              <a:latin typeface="Ancizar Sans Black"/>
+            </a:endParaRPr>
+          </a:p>
+          <a:p>
+            <a:pPr marL="285750" lvl="1" indent="-285750" defTabSz="800100">
+              <a:lnSpc>
+                <a:spcPct val="90000"/>
+              </a:lnSpc>
+              <a:spcBef>
+                <a:spcPct val="0"/>
+              </a:spcBef>
+              <a:spcAft>
+                <a:spcPct val="15000"/>
+              </a:spcAft>
+              <a:buClr>
+                <a:schemeClr val="accent2">
+                  <a:lumMod val="50000"/>
+                </a:schemeClr>
+              </a:buClr>
+              <a:buFont typeface="Wingdings" pitchFamily="2" charset="2"/>
+              <a:buChar char="Ø"/>
+            </a:pPr>
+            <a:r>
+              <a:rPr lang="en-US" sz="1400" dirty="0" err="1">
+                <a:solidFill>
+                  <a:prstClr val="black"/>
+                </a:solidFill>
+                <a:latin typeface="Ancizar Sans Black"/>
+              </a:rPr>
+              <a:t>Xxxxx</a:t>
+            </a:r>
+            <a:r>
+              <a:rPr lang="en-US" sz="1400" dirty="0">
+                <a:solidFill>
+                  <a:prstClr val="black"/>
+                </a:solidFill>
+                <a:latin typeface="Ancizar Sans Black"/>
+              </a:rPr>
+              <a:t>. (leer </a:t>
+            </a:r>
+            <a:r>
+              <a:rPr lang="en-US" sz="1400" dirty="0" err="1">
+                <a:solidFill>
+                  <a:prstClr val="black"/>
+                </a:solidFill>
+                <a:latin typeface="Ancizar Sans Black"/>
+              </a:rPr>
+              <a:t>articulo</a:t>
+            </a:r>
+            <a:r>
+              <a:rPr lang="en-US" sz="1400" dirty="0">
+                <a:solidFill>
+                  <a:prstClr val="black"/>
+                </a:solidFill>
+                <a:latin typeface="Ancizar Sans Black"/>
+              </a:rPr>
+              <a:t> survey de </a:t>
+            </a:r>
+            <a:r>
+              <a:rPr lang="en-US" sz="1400" dirty="0" err="1">
+                <a:solidFill>
+                  <a:prstClr val="black"/>
+                </a:solidFill>
+                <a:latin typeface="Ancizar Sans Black"/>
+              </a:rPr>
+              <a:t>cnn</a:t>
+            </a:r>
+            <a:r>
+              <a:rPr lang="en-US" sz="1400" dirty="0">
+                <a:solidFill>
+                  <a:prstClr val="black"/>
+                </a:solidFill>
+                <a:latin typeface="Ancizar Sans Black"/>
+              </a:rPr>
+              <a:t>)</a:t>
+            </a:r>
+            <a:endParaRPr lang="en-US" sz="1400" dirty="0">
+              <a:solidFill>
+                <a:prstClr val="black"/>
+              </a:solidFill>
+              <a:highlight>
+                <a:srgbClr val="FFFF00"/>
+              </a:highlight>
+              <a:latin typeface="Ancizar Sans Black"/>
+            </a:endParaRPr>
           </a:p>
           <a:p>
             <a:pPr marL="285750" lvl="1" indent="-285750" defTabSz="800100">
@@ -22943,7 +24013,7 @@
         <p:spPr>
           <a:xfrm>
             <a:off x="379222" y="1066800"/>
-            <a:ext cx="11433555" cy="4231928"/>
+            <a:ext cx="11433555" cy="4909036"/>
           </a:xfrm>
         </p:spPr>
         <p:txBody>
@@ -23316,16 +24386,80 @@
             </a:r>
             <a:r>
               <a:rPr lang="en-US" sz="1100" dirty="0"/>
-              <a:t>, 1–5. https://</a:t>
+              <a:t>, 1–5. </a:t>
+            </a:r>
+            <a:r>
+              <a:rPr lang="en-US" sz="1100" dirty="0">
+                <a:hlinkClick r:id="rId5"/>
+              </a:rPr>
+              <a:t>https://doi.org/10.1109/PCS48520.2019.8954553</a:t>
+            </a:r>
+            <a:endParaRPr lang="en-US" sz="1100" dirty="0"/>
+          </a:p>
+          <a:p>
+            <a:pPr marL="285750" indent="-285750">
+              <a:buFont typeface="Arial" panose="020B0604020202020204" pitchFamily="34" charset="0"/>
+              <a:buChar char="•"/>
+            </a:pPr>
+            <a:endParaRPr lang="en-US" sz="1100" dirty="0"/>
+          </a:p>
+          <a:p>
+            <a:pPr marL="285750" indent="-285750">
+              <a:buFont typeface="Arial" panose="020B0604020202020204" pitchFamily="34" charset="0"/>
+              <a:buChar char="•"/>
+            </a:pPr>
+            <a:r>
+              <a:rPr lang="en-US" sz="1100" dirty="0"/>
+              <a:t>Fang, M., Han, Y., &amp; Wen, J. (2020). Genetic Algorithm Based Rate Control for AV1. </a:t>
+            </a:r>
+            <a:r>
+              <a:rPr lang="en-US" sz="1100" i="1" dirty="0"/>
+              <a:t>IEEE Signal Processing Letters</a:t>
+            </a:r>
+            <a:r>
+              <a:rPr lang="en-US" sz="1100" dirty="0"/>
+              <a:t>, </a:t>
+            </a:r>
+            <a:r>
+              <a:rPr lang="en-US" sz="1100" i="1" dirty="0"/>
+              <a:t>27</a:t>
+            </a:r>
+            <a:r>
+              <a:rPr lang="en-US" sz="1100" dirty="0"/>
+              <a:t>, 520–524. </a:t>
+            </a:r>
+            <a:r>
+              <a:rPr lang="en-US" sz="1100" dirty="0">
+                <a:hlinkClick r:id="rId6"/>
+              </a:rPr>
+              <a:t>https://doi.org/10.1109/LSP.2020.2976578</a:t>
+            </a:r>
+            <a:endParaRPr lang="en-US" sz="1100" dirty="0"/>
+          </a:p>
+          <a:p>
+            <a:pPr marL="285750" indent="-285750">
+              <a:buFont typeface="Arial" panose="020B0604020202020204" pitchFamily="34" charset="0"/>
+              <a:buChar char="•"/>
+            </a:pPr>
+            <a:r>
+              <a:rPr lang="en-US" sz="1100" dirty="0"/>
+              <a:t>﻿J. Hu, W. Peng, and C. Chung. Reinforcement learning for HEVC/H.265 intra- frame rate control. In 2018 IEEE International Symposium on Circuits and Sys- </a:t>
             </a:r>
             <a:r>
               <a:rPr lang="en-US" sz="1100" dirty="0" err="1"/>
-              <a:t>doi.org</a:t>
+              <a:t>tems</a:t>
             </a:r>
             <a:r>
               <a:rPr lang="en-US" sz="1100" dirty="0"/>
-              <a:t>/10.1109/PCS48520.2019.8954553</a:t>
-            </a:r>
+              <a:t> (ISCAS), 2018.</a:t>
+            </a:r>
+          </a:p>
+          <a:p>
+            <a:pPr marL="285750" indent="-285750">
+              <a:buFont typeface="Arial" panose="020B0604020202020204" pitchFamily="34" charset="0"/>
+              <a:buChar char="•"/>
+            </a:pPr>
+            <a:endParaRPr lang="en-US" sz="1100" dirty="0"/>
           </a:p>
           <a:p>
             <a:pPr marL="285750" indent="-285750">

</xml_diff>

<commit_message>
Completado la Prof. Maria
</commit_message>
<xml_diff>
--- a/presentation/Examen de Calificacion de Doctorado_Carlos_Alberto_Salazar.pptx
+++ b/presentation/Examen de Calificacion de Doctorado_Carlos_Alberto_Salazar.pptx
@@ -21,7 +21,7 @@
     <p:sldId id="805" r:id="rId12"/>
     <p:sldId id="814" r:id="rId13"/>
     <p:sldId id="817" r:id="rId14"/>
-    <p:sldId id="818" r:id="rId15"/>
+    <p:sldId id="822" r:id="rId15"/>
     <p:sldId id="819" r:id="rId16"/>
     <p:sldId id="820" r:id="rId17"/>
     <p:sldId id="821" r:id="rId18"/>
@@ -141,7 +141,7 @@
             <p14:sldId id="805"/>
             <p14:sldId id="814"/>
             <p14:sldId id="817"/>
-            <p14:sldId id="818"/>
+            <p14:sldId id="822"/>
             <p14:sldId id="819"/>
             <p14:sldId id="820"/>
             <p14:sldId id="821"/>
@@ -7510,7 +7510,7 @@
     </p:spTree>
     <p:extLst>
       <p:ext uri="{BB962C8B-B14F-4D97-AF65-F5344CB8AC3E}">
-        <p14:creationId xmlns:p14="http://schemas.microsoft.com/office/powerpoint/2010/main" val="241514795"/>
+        <p14:creationId xmlns:p14="http://schemas.microsoft.com/office/powerpoint/2010/main" val="3270500404"/>
       </p:ext>
     </p:extLst>
   </p:cSld>
@@ -22518,7 +22518,12 @@
             <p:ph type="sldNum" sz="quarter" idx="7"/>
           </p:nvPr>
         </p:nvSpPr>
-        <p:spPr/>
+        <p:spPr>
+          <a:xfrm>
+            <a:off x="6428740" y="6883400"/>
+            <a:ext cx="256540" cy="203200"/>
+          </a:xfrm>
+        </p:spPr>
         <p:txBody>
           <a:bodyPr/>
           <a:lstStyle/>
@@ -22538,10 +22543,1356 @@
       </p:sp>
       <p:sp>
         <p:nvSpPr>
-          <p:cNvPr id="5" name="TextBox 4">
+          <p:cNvPr id="6" name="Rectangle 5">
             <a:extLst>
               <a:ext uri="{FF2B5EF4-FFF2-40B4-BE49-F238E27FC236}">
-                <a16:creationId xmlns:a16="http://schemas.microsoft.com/office/drawing/2014/main" id="{5EA15DD1-5550-0440-ADE4-413AF7BF1E60}"/>
+                <a16:creationId xmlns:a16="http://schemas.microsoft.com/office/drawing/2014/main" id="{C47ABD54-3948-EE48-B893-A63DF9E931E8}"/>
+              </a:ext>
+            </a:extLst>
+          </p:cNvPr>
+          <p:cNvSpPr/>
+          <p:nvPr/>
+        </p:nvSpPr>
+        <p:spPr>
+          <a:xfrm>
+            <a:off x="3708478" y="1841004"/>
+            <a:ext cx="2086306" cy="338554"/>
+          </a:xfrm>
+          <a:prstGeom prst="rect">
+            <a:avLst/>
+          </a:prstGeom>
+        </p:spPr>
+        <p:txBody>
+          <a:bodyPr wrap="square">
+            <a:spAutoFit/>
+          </a:bodyPr>
+          <a:lstStyle/>
+          <a:p>
+            <a:pPr algn="ctr"/>
+            <a:r>
+              <a:rPr lang="en-US" sz="1600" b="1" dirty="0">
+                <a:solidFill>
+                  <a:schemeClr val="accent2">
+                    <a:lumMod val="50000"/>
+                  </a:schemeClr>
+                </a:solidFill>
+                <a:latin typeface="Times" pitchFamily="2" charset="0"/>
+              </a:rPr>
+              <a:t>Protection/prevention</a:t>
+            </a:r>
+            <a:endParaRPr lang="en-CO" sz="1600" b="1" dirty="0">
+              <a:solidFill>
+                <a:schemeClr val="accent2">
+                  <a:lumMod val="50000"/>
+                </a:schemeClr>
+              </a:solidFill>
+              <a:latin typeface="Times" pitchFamily="2" charset="0"/>
+            </a:endParaRPr>
+          </a:p>
+        </p:txBody>
+      </p:sp>
+      <p:sp>
+        <p:nvSpPr>
+          <p:cNvPr id="8" name="Rectangle 7">
+            <a:extLst>
+              <a:ext uri="{FF2B5EF4-FFF2-40B4-BE49-F238E27FC236}">
+                <a16:creationId xmlns:a16="http://schemas.microsoft.com/office/drawing/2014/main" id="{BAB9F5AF-46C2-5D42-9E31-D990CFB249E9}"/>
+              </a:ext>
+            </a:extLst>
+          </p:cNvPr>
+          <p:cNvSpPr/>
+          <p:nvPr/>
+        </p:nvSpPr>
+        <p:spPr>
+          <a:xfrm>
+            <a:off x="6058752" y="1842071"/>
+            <a:ext cx="1018227" cy="338554"/>
+          </a:xfrm>
+          <a:prstGeom prst="rect">
+            <a:avLst/>
+          </a:prstGeom>
+        </p:spPr>
+        <p:txBody>
+          <a:bodyPr wrap="none">
+            <a:spAutoFit/>
+          </a:bodyPr>
+          <a:lstStyle/>
+          <a:p>
+            <a:r>
+              <a:rPr lang="en-US" sz="1600" b="1" dirty="0">
+                <a:solidFill>
+                  <a:schemeClr val="accent2">
+                    <a:lumMod val="50000"/>
+                  </a:schemeClr>
+                </a:solidFill>
+                <a:latin typeface="Times" pitchFamily="2" charset="0"/>
+              </a:rPr>
+              <a:t>Detection</a:t>
+            </a:r>
+            <a:endParaRPr lang="en-CO" sz="1600" b="1" dirty="0">
+              <a:solidFill>
+                <a:schemeClr val="accent2">
+                  <a:lumMod val="50000"/>
+                </a:schemeClr>
+              </a:solidFill>
+              <a:latin typeface="Times" pitchFamily="2" charset="0"/>
+            </a:endParaRPr>
+          </a:p>
+        </p:txBody>
+      </p:sp>
+      <p:sp>
+        <p:nvSpPr>
+          <p:cNvPr id="10" name="Rectangle 9">
+            <a:extLst>
+              <a:ext uri="{FF2B5EF4-FFF2-40B4-BE49-F238E27FC236}">
+                <a16:creationId xmlns:a16="http://schemas.microsoft.com/office/drawing/2014/main" id="{CACFBE58-D62B-4445-816D-E9AC78FCDED1}"/>
+              </a:ext>
+            </a:extLst>
+          </p:cNvPr>
+          <p:cNvSpPr/>
+          <p:nvPr/>
+        </p:nvSpPr>
+        <p:spPr>
+          <a:xfrm>
+            <a:off x="7273264" y="1828800"/>
+            <a:ext cx="1904346" cy="338554"/>
+          </a:xfrm>
+          <a:prstGeom prst="rect">
+            <a:avLst/>
+          </a:prstGeom>
+        </p:spPr>
+        <p:txBody>
+          <a:bodyPr wrap="square">
+            <a:spAutoFit/>
+          </a:bodyPr>
+          <a:lstStyle/>
+          <a:p>
+            <a:r>
+              <a:rPr lang="en-US" sz="1600" b="1" dirty="0">
+                <a:solidFill>
+                  <a:schemeClr val="accent2">
+                    <a:lumMod val="50000"/>
+                  </a:schemeClr>
+                </a:solidFill>
+                <a:latin typeface="Times" pitchFamily="2" charset="0"/>
+              </a:rPr>
+              <a:t>Evidence collection</a:t>
+            </a:r>
+            <a:endParaRPr lang="en-CO" sz="1600" b="1" dirty="0">
+              <a:solidFill>
+                <a:schemeClr val="accent2">
+                  <a:lumMod val="50000"/>
+                </a:schemeClr>
+              </a:solidFill>
+              <a:latin typeface="Times" pitchFamily="2" charset="0"/>
+            </a:endParaRPr>
+          </a:p>
+        </p:txBody>
+      </p:sp>
+      <p:sp>
+        <p:nvSpPr>
+          <p:cNvPr id="12" name="Rectangle 11">
+            <a:extLst>
+              <a:ext uri="{FF2B5EF4-FFF2-40B4-BE49-F238E27FC236}">
+                <a16:creationId xmlns:a16="http://schemas.microsoft.com/office/drawing/2014/main" id="{6283AE12-2ABD-AC49-AAA8-32BE6D5DD16D}"/>
+              </a:ext>
+            </a:extLst>
+          </p:cNvPr>
+          <p:cNvSpPr/>
+          <p:nvPr/>
+        </p:nvSpPr>
+        <p:spPr>
+          <a:xfrm>
+            <a:off x="3778710" y="2553315"/>
+            <a:ext cx="1922321" cy="584775"/>
+          </a:xfrm>
+          <a:prstGeom prst="rect">
+            <a:avLst/>
+          </a:prstGeom>
+        </p:spPr>
+        <p:txBody>
+          <a:bodyPr wrap="none">
+            <a:spAutoFit/>
+          </a:bodyPr>
+          <a:lstStyle/>
+          <a:p>
+            <a:pPr algn="ctr"/>
+            <a:r>
+              <a:rPr lang="en-US" sz="1600" dirty="0">
+                <a:latin typeface="Times" pitchFamily="2" charset="0"/>
+              </a:rPr>
+              <a:t>Distributed low-cost </a:t>
+            </a:r>
+          </a:p>
+          <a:p>
+            <a:pPr algn="ctr"/>
+            <a:r>
+              <a:rPr lang="en-US" sz="1600" dirty="0">
+                <a:latin typeface="Times" pitchFamily="2" charset="0"/>
+              </a:rPr>
+              <a:t>video cameras</a:t>
+            </a:r>
+          </a:p>
+        </p:txBody>
+      </p:sp>
+      <p:sp>
+        <p:nvSpPr>
+          <p:cNvPr id="13" name="Rectangle 12">
+            <a:extLst>
+              <a:ext uri="{FF2B5EF4-FFF2-40B4-BE49-F238E27FC236}">
+                <a16:creationId xmlns:a16="http://schemas.microsoft.com/office/drawing/2014/main" id="{AFB8EF4E-9B90-1246-9A16-FA231E4BB4C6}"/>
+              </a:ext>
+            </a:extLst>
+          </p:cNvPr>
+          <p:cNvSpPr/>
+          <p:nvPr/>
+        </p:nvSpPr>
+        <p:spPr>
+          <a:xfrm>
+            <a:off x="6066650" y="2550769"/>
+            <a:ext cx="997389" cy="338554"/>
+          </a:xfrm>
+          <a:prstGeom prst="rect">
+            <a:avLst/>
+          </a:prstGeom>
+        </p:spPr>
+        <p:txBody>
+          <a:bodyPr wrap="none">
+            <a:spAutoFit/>
+          </a:bodyPr>
+          <a:lstStyle/>
+          <a:p>
+            <a:pPr algn="ctr"/>
+            <a:r>
+              <a:rPr lang="en-US" sz="1600" dirty="0">
+                <a:latin typeface="Times" pitchFamily="2" charset="0"/>
+              </a:rPr>
+              <a:t>Real-time</a:t>
+            </a:r>
+            <a:endParaRPr lang="en-CO" sz="1600" dirty="0">
+              <a:latin typeface="Times" pitchFamily="2" charset="0"/>
+            </a:endParaRPr>
+          </a:p>
+        </p:txBody>
+      </p:sp>
+      <p:sp>
+        <p:nvSpPr>
+          <p:cNvPr id="18" name="Rectangle 17">
+            <a:extLst>
+              <a:ext uri="{FF2B5EF4-FFF2-40B4-BE49-F238E27FC236}">
+                <a16:creationId xmlns:a16="http://schemas.microsoft.com/office/drawing/2014/main" id="{5E3F23AB-A7F3-814E-A7C9-7A2B0A609D38}"/>
+              </a:ext>
+            </a:extLst>
+          </p:cNvPr>
+          <p:cNvSpPr/>
+          <p:nvPr/>
+        </p:nvSpPr>
+        <p:spPr>
+          <a:xfrm>
+            <a:off x="3674699" y="4780861"/>
+            <a:ext cx="1018228" cy="338554"/>
+          </a:xfrm>
+          <a:prstGeom prst="rect">
+            <a:avLst/>
+          </a:prstGeom>
+        </p:spPr>
+        <p:txBody>
+          <a:bodyPr wrap="none">
+            <a:spAutoFit/>
+          </a:bodyPr>
+          <a:lstStyle/>
+          <a:p>
+            <a:pPr algn="ctr"/>
+            <a:r>
+              <a:rPr lang="en-US" sz="1600" dirty="0">
+                <a:latin typeface="Times" pitchFamily="2" charset="0"/>
+              </a:rPr>
+              <a:t>Upscaling</a:t>
+            </a:r>
+            <a:endParaRPr lang="en-CO" sz="1600" dirty="0">
+              <a:latin typeface="Times" pitchFamily="2" charset="0"/>
+            </a:endParaRPr>
+          </a:p>
+        </p:txBody>
+      </p:sp>
+      <p:sp>
+        <p:nvSpPr>
+          <p:cNvPr id="19" name="Rectangle 18">
+            <a:extLst>
+              <a:ext uri="{FF2B5EF4-FFF2-40B4-BE49-F238E27FC236}">
+                <a16:creationId xmlns:a16="http://schemas.microsoft.com/office/drawing/2014/main" id="{A27853C5-71C6-A044-AEAC-CACF3104F4DB}"/>
+              </a:ext>
+            </a:extLst>
+          </p:cNvPr>
+          <p:cNvSpPr/>
+          <p:nvPr/>
+        </p:nvSpPr>
+        <p:spPr>
+          <a:xfrm>
+            <a:off x="4771889" y="4787916"/>
+            <a:ext cx="1794375" cy="338554"/>
+          </a:xfrm>
+          <a:prstGeom prst="rect">
+            <a:avLst/>
+          </a:prstGeom>
+        </p:spPr>
+        <p:txBody>
+          <a:bodyPr wrap="square">
+            <a:spAutoFit/>
+          </a:bodyPr>
+          <a:lstStyle/>
+          <a:p>
+            <a:pPr algn="ctr"/>
+            <a:r>
+              <a:rPr lang="en-US" sz="1600" dirty="0">
+                <a:latin typeface="Times" pitchFamily="2" charset="0"/>
+              </a:rPr>
+              <a:t>Restoration filters</a:t>
+            </a:r>
+            <a:endParaRPr lang="en-CO" sz="1600" dirty="0">
+              <a:latin typeface="Times" pitchFamily="2" charset="0"/>
+            </a:endParaRPr>
+          </a:p>
+        </p:txBody>
+      </p:sp>
+      <p:sp>
+        <p:nvSpPr>
+          <p:cNvPr id="31" name="Rectangle 30">
+            <a:extLst>
+              <a:ext uri="{FF2B5EF4-FFF2-40B4-BE49-F238E27FC236}">
+                <a16:creationId xmlns:a16="http://schemas.microsoft.com/office/drawing/2014/main" id="{84108650-148D-B946-B940-F89269F4947F}"/>
+              </a:ext>
+            </a:extLst>
+          </p:cNvPr>
+          <p:cNvSpPr/>
+          <p:nvPr/>
+        </p:nvSpPr>
+        <p:spPr>
+          <a:xfrm>
+            <a:off x="5659336" y="3404716"/>
+            <a:ext cx="1681432" cy="584775"/>
+          </a:xfrm>
+          <a:prstGeom prst="rect">
+            <a:avLst/>
+          </a:prstGeom>
+        </p:spPr>
+        <p:txBody>
+          <a:bodyPr wrap="square">
+            <a:spAutoFit/>
+          </a:bodyPr>
+          <a:lstStyle/>
+          <a:p>
+            <a:pPr algn="ctr"/>
+            <a:r>
+              <a:rPr lang="en-CO" sz="1600" dirty="0">
+                <a:latin typeface="Times" pitchFamily="2" charset="0"/>
+              </a:rPr>
+              <a:t>Less</a:t>
+            </a:r>
+          </a:p>
+          <a:p>
+            <a:pPr algn="ctr"/>
+            <a:r>
+              <a:rPr lang="en-CO" sz="1600" dirty="0">
+                <a:latin typeface="Times" pitchFamily="2" charset="0"/>
+              </a:rPr>
+              <a:t>complexity</a:t>
+            </a:r>
+          </a:p>
+        </p:txBody>
+      </p:sp>
+      <p:sp>
+        <p:nvSpPr>
+          <p:cNvPr id="41" name="Rectangle 40">
+            <a:extLst>
+              <a:ext uri="{FF2B5EF4-FFF2-40B4-BE49-F238E27FC236}">
+                <a16:creationId xmlns:a16="http://schemas.microsoft.com/office/drawing/2014/main" id="{82899170-EE9E-B443-94BF-10CA49FA1617}"/>
+              </a:ext>
+            </a:extLst>
+          </p:cNvPr>
+          <p:cNvSpPr/>
+          <p:nvPr/>
+        </p:nvSpPr>
+        <p:spPr>
+          <a:xfrm>
+            <a:off x="7049559" y="3399825"/>
+            <a:ext cx="2437529" cy="584775"/>
+          </a:xfrm>
+          <a:prstGeom prst="rect">
+            <a:avLst/>
+          </a:prstGeom>
+        </p:spPr>
+        <p:txBody>
+          <a:bodyPr wrap="square">
+            <a:spAutoFit/>
+          </a:bodyPr>
+          <a:lstStyle/>
+          <a:p>
+            <a:pPr algn="ctr"/>
+            <a:r>
+              <a:rPr lang="en-US" sz="1600" dirty="0">
+                <a:latin typeface="Times" pitchFamily="2" charset="0"/>
+              </a:rPr>
+              <a:t>C</a:t>
+            </a:r>
+            <a:r>
+              <a:rPr lang="en-CO" sz="1600" dirty="0">
+                <a:latin typeface="Times" pitchFamily="2" charset="0"/>
+              </a:rPr>
+              <a:t>ompression </a:t>
+            </a:r>
+          </a:p>
+          <a:p>
+            <a:pPr algn="ctr"/>
+            <a:r>
+              <a:rPr lang="en-CO" sz="1600" dirty="0">
+                <a:latin typeface="Times" pitchFamily="2" charset="0"/>
+              </a:rPr>
+              <a:t>efficiency</a:t>
+            </a:r>
+          </a:p>
+        </p:txBody>
+      </p:sp>
+      <p:sp>
+        <p:nvSpPr>
+          <p:cNvPr id="45" name="Rectangle 44">
+            <a:extLst>
+              <a:ext uri="{FF2B5EF4-FFF2-40B4-BE49-F238E27FC236}">
+                <a16:creationId xmlns:a16="http://schemas.microsoft.com/office/drawing/2014/main" id="{94BBDF5A-C12B-2341-8C27-C221BEAAD054}"/>
+              </a:ext>
+            </a:extLst>
+          </p:cNvPr>
+          <p:cNvSpPr/>
+          <p:nvPr/>
+        </p:nvSpPr>
+        <p:spPr>
+          <a:xfrm>
+            <a:off x="6879554" y="4780861"/>
+            <a:ext cx="1055354" cy="338554"/>
+          </a:xfrm>
+          <a:prstGeom prst="rect">
+            <a:avLst/>
+          </a:prstGeom>
+        </p:spPr>
+        <p:txBody>
+          <a:bodyPr wrap="none">
+            <a:spAutoFit/>
+          </a:bodyPr>
+          <a:lstStyle/>
+          <a:p>
+            <a:pPr algn="ctr"/>
+            <a:r>
+              <a:rPr lang="en-US" sz="1600" dirty="0">
+                <a:latin typeface="Times" pitchFamily="2" charset="0"/>
+              </a:rPr>
+              <a:t>Intra/Inter</a:t>
+            </a:r>
+            <a:endParaRPr lang="en-CO" sz="1600" dirty="0">
+              <a:latin typeface="Times" pitchFamily="2" charset="0"/>
+            </a:endParaRPr>
+          </a:p>
+        </p:txBody>
+      </p:sp>
+      <p:sp>
+        <p:nvSpPr>
+          <p:cNvPr id="47" name="Rectangle 46">
+            <a:extLst>
+              <a:ext uri="{FF2B5EF4-FFF2-40B4-BE49-F238E27FC236}">
+                <a16:creationId xmlns:a16="http://schemas.microsoft.com/office/drawing/2014/main" id="{5BC08D03-2EAB-FD4C-B4BC-27B0359B5D70}"/>
+              </a:ext>
+            </a:extLst>
+          </p:cNvPr>
+          <p:cNvSpPr/>
+          <p:nvPr/>
+        </p:nvSpPr>
+        <p:spPr>
+          <a:xfrm>
+            <a:off x="8137016" y="4782108"/>
+            <a:ext cx="1214307" cy="338554"/>
+          </a:xfrm>
+          <a:prstGeom prst="rect">
+            <a:avLst/>
+          </a:prstGeom>
+        </p:spPr>
+        <p:txBody>
+          <a:bodyPr wrap="none">
+            <a:spAutoFit/>
+          </a:bodyPr>
+          <a:lstStyle/>
+          <a:p>
+            <a:pPr algn="ctr"/>
+            <a:r>
+              <a:rPr lang="en-US" sz="1600" dirty="0">
+                <a:latin typeface="Times" pitchFamily="2" charset="0"/>
+              </a:rPr>
+              <a:t>Rate-control</a:t>
+            </a:r>
+            <a:endParaRPr lang="en-CO" sz="1600" dirty="0">
+              <a:latin typeface="Times" pitchFamily="2" charset="0"/>
+            </a:endParaRPr>
+          </a:p>
+        </p:txBody>
+      </p:sp>
+      <p:sp>
+        <p:nvSpPr>
+          <p:cNvPr id="3" name="Rectangle 2">
+            <a:extLst>
+              <a:ext uri="{FF2B5EF4-FFF2-40B4-BE49-F238E27FC236}">
+                <a16:creationId xmlns:a16="http://schemas.microsoft.com/office/drawing/2014/main" id="{54E02D4D-EBA8-264D-8EF1-ED5A2DE93059}"/>
+              </a:ext>
+            </a:extLst>
+          </p:cNvPr>
+          <p:cNvSpPr/>
+          <p:nvPr/>
+        </p:nvSpPr>
+        <p:spPr>
+          <a:xfrm>
+            <a:off x="7798196" y="2493549"/>
+            <a:ext cx="953723" cy="584775"/>
+          </a:xfrm>
+          <a:prstGeom prst="rect">
+            <a:avLst/>
+          </a:prstGeom>
+        </p:spPr>
+        <p:txBody>
+          <a:bodyPr wrap="none">
+            <a:spAutoFit/>
+          </a:bodyPr>
+          <a:lstStyle/>
+          <a:p>
+            <a:pPr algn="ctr"/>
+            <a:r>
+              <a:rPr lang="en-US" sz="1600" dirty="0">
+                <a:latin typeface="Times" pitchFamily="2" charset="0"/>
+              </a:rPr>
+              <a:t>Efficient </a:t>
+            </a:r>
+          </a:p>
+          <a:p>
+            <a:pPr algn="ctr"/>
+            <a:r>
+              <a:rPr lang="en-US" sz="1600" dirty="0">
+                <a:latin typeface="Times" pitchFamily="2" charset="0"/>
+              </a:rPr>
+              <a:t>storage</a:t>
+            </a:r>
+            <a:endParaRPr lang="en-CO" sz="1600" dirty="0">
+              <a:latin typeface="Times" pitchFamily="2" charset="0"/>
+            </a:endParaRPr>
+          </a:p>
+        </p:txBody>
+      </p:sp>
+      <p:sp>
+        <p:nvSpPr>
+          <p:cNvPr id="32" name="Rectangle 31">
+            <a:extLst>
+              <a:ext uri="{FF2B5EF4-FFF2-40B4-BE49-F238E27FC236}">
+                <a16:creationId xmlns:a16="http://schemas.microsoft.com/office/drawing/2014/main" id="{79FB817A-885D-F146-B11A-1E43B8B8E88F}"/>
+              </a:ext>
+            </a:extLst>
+          </p:cNvPr>
+          <p:cNvSpPr/>
+          <p:nvPr/>
+        </p:nvSpPr>
+        <p:spPr>
+          <a:xfrm>
+            <a:off x="4004733" y="3463265"/>
+            <a:ext cx="1470274" cy="584775"/>
+          </a:xfrm>
+          <a:prstGeom prst="rect">
+            <a:avLst/>
+          </a:prstGeom>
+        </p:spPr>
+        <p:txBody>
+          <a:bodyPr wrap="none">
+            <a:spAutoFit/>
+          </a:bodyPr>
+          <a:lstStyle/>
+          <a:p>
+            <a:pPr algn="ctr"/>
+            <a:r>
+              <a:rPr lang="en-US" sz="1600" dirty="0">
+                <a:latin typeface="Times" pitchFamily="2" charset="0"/>
+              </a:rPr>
+              <a:t>High quality at </a:t>
+            </a:r>
+          </a:p>
+          <a:p>
+            <a:pPr algn="ctr"/>
+            <a:r>
+              <a:rPr lang="en-US" sz="1600" dirty="0">
+                <a:latin typeface="Times" pitchFamily="2" charset="0"/>
+              </a:rPr>
+              <a:t>Low bitrate</a:t>
+            </a:r>
+          </a:p>
+        </p:txBody>
+      </p:sp>
+      <p:sp>
+        <p:nvSpPr>
+          <p:cNvPr id="58" name="Down Arrow 57">
+            <a:extLst>
+              <a:ext uri="{FF2B5EF4-FFF2-40B4-BE49-F238E27FC236}">
+                <a16:creationId xmlns:a16="http://schemas.microsoft.com/office/drawing/2014/main" id="{77C0791C-42E1-5C44-9069-DC6700ABEF95}"/>
+              </a:ext>
+            </a:extLst>
+          </p:cNvPr>
+          <p:cNvSpPr/>
+          <p:nvPr/>
+        </p:nvSpPr>
+        <p:spPr>
+          <a:xfrm rot="2652359">
+            <a:off x="4134818" y="4363859"/>
+            <a:ext cx="328781" cy="360473"/>
+          </a:xfrm>
+          <a:prstGeom prst="downArrow">
+            <a:avLst/>
+          </a:prstGeom>
+          <a:noFill/>
+          <a:ln w="12700">
+            <a:solidFill>
+              <a:schemeClr val="tx1">
+                <a:lumMod val="95000"/>
+                <a:lumOff val="5000"/>
+                <a:alpha val="33000"/>
+              </a:schemeClr>
+            </a:solidFill>
+          </a:ln>
+        </p:spPr>
+        <p:style>
+          <a:lnRef idx="2">
+            <a:schemeClr val="accent1">
+              <a:shade val="50000"/>
+            </a:schemeClr>
+          </a:lnRef>
+          <a:fillRef idx="1">
+            <a:schemeClr val="accent1"/>
+          </a:fillRef>
+          <a:effectRef idx="0">
+            <a:schemeClr val="accent1"/>
+          </a:effectRef>
+          <a:fontRef idx="minor">
+            <a:schemeClr val="lt1"/>
+          </a:fontRef>
+        </p:style>
+        <p:txBody>
+          <a:bodyPr rtlCol="0" anchor="ctr"/>
+          <a:lstStyle/>
+          <a:p>
+            <a:pPr algn="ctr"/>
+            <a:endParaRPr lang="en-CO" sz="1600"/>
+          </a:p>
+        </p:txBody>
+      </p:sp>
+      <p:sp>
+        <p:nvSpPr>
+          <p:cNvPr id="59" name="Down Arrow 58">
+            <a:extLst>
+              <a:ext uri="{FF2B5EF4-FFF2-40B4-BE49-F238E27FC236}">
+                <a16:creationId xmlns:a16="http://schemas.microsoft.com/office/drawing/2014/main" id="{79B53A55-9C81-2841-8483-E8E4A7F91CD6}"/>
+              </a:ext>
+            </a:extLst>
+          </p:cNvPr>
+          <p:cNvSpPr/>
+          <p:nvPr/>
+        </p:nvSpPr>
+        <p:spPr>
+          <a:xfrm rot="18862676">
+            <a:off x="5019113" y="4357072"/>
+            <a:ext cx="328781" cy="360473"/>
+          </a:xfrm>
+          <a:prstGeom prst="downArrow">
+            <a:avLst/>
+          </a:prstGeom>
+          <a:noFill/>
+          <a:ln w="12700">
+            <a:solidFill>
+              <a:schemeClr val="tx1">
+                <a:lumMod val="95000"/>
+                <a:lumOff val="5000"/>
+                <a:alpha val="33000"/>
+              </a:schemeClr>
+            </a:solidFill>
+          </a:ln>
+        </p:spPr>
+        <p:style>
+          <a:lnRef idx="2">
+            <a:schemeClr val="accent1">
+              <a:shade val="50000"/>
+            </a:schemeClr>
+          </a:lnRef>
+          <a:fillRef idx="1">
+            <a:schemeClr val="accent1"/>
+          </a:fillRef>
+          <a:effectRef idx="0">
+            <a:schemeClr val="accent1"/>
+          </a:effectRef>
+          <a:fontRef idx="minor">
+            <a:schemeClr val="lt1"/>
+          </a:fontRef>
+        </p:style>
+        <p:txBody>
+          <a:bodyPr rtlCol="0" anchor="ctr"/>
+          <a:lstStyle/>
+          <a:p>
+            <a:pPr algn="ctr"/>
+            <a:endParaRPr lang="en-CO" sz="1600"/>
+          </a:p>
+        </p:txBody>
+      </p:sp>
+      <p:sp>
+        <p:nvSpPr>
+          <p:cNvPr id="60" name="Down Arrow 59">
+            <a:extLst>
+              <a:ext uri="{FF2B5EF4-FFF2-40B4-BE49-F238E27FC236}">
+                <a16:creationId xmlns:a16="http://schemas.microsoft.com/office/drawing/2014/main" id="{E41B0796-6081-EC42-9F7E-FB79CB3BF028}"/>
+              </a:ext>
+            </a:extLst>
+          </p:cNvPr>
+          <p:cNvSpPr/>
+          <p:nvPr/>
+        </p:nvSpPr>
+        <p:spPr>
+          <a:xfrm rot="2652359">
+            <a:off x="5899440" y="4372348"/>
+            <a:ext cx="328781" cy="360473"/>
+          </a:xfrm>
+          <a:prstGeom prst="downArrow">
+            <a:avLst/>
+          </a:prstGeom>
+          <a:noFill/>
+          <a:ln w="12700">
+            <a:solidFill>
+              <a:schemeClr val="tx1">
+                <a:lumMod val="95000"/>
+                <a:lumOff val="5000"/>
+                <a:alpha val="33000"/>
+              </a:schemeClr>
+            </a:solidFill>
+          </a:ln>
+        </p:spPr>
+        <p:style>
+          <a:lnRef idx="2">
+            <a:schemeClr val="accent1">
+              <a:shade val="50000"/>
+            </a:schemeClr>
+          </a:lnRef>
+          <a:fillRef idx="1">
+            <a:schemeClr val="accent1"/>
+          </a:fillRef>
+          <a:effectRef idx="0">
+            <a:schemeClr val="accent1"/>
+          </a:effectRef>
+          <a:fontRef idx="minor">
+            <a:schemeClr val="lt1"/>
+          </a:fontRef>
+        </p:style>
+        <p:txBody>
+          <a:bodyPr rtlCol="0" anchor="ctr"/>
+          <a:lstStyle/>
+          <a:p>
+            <a:pPr algn="ctr"/>
+            <a:endParaRPr lang="en-CO" sz="1600"/>
+          </a:p>
+        </p:txBody>
+      </p:sp>
+      <p:sp>
+        <p:nvSpPr>
+          <p:cNvPr id="61" name="Down Arrow 60">
+            <a:extLst>
+              <a:ext uri="{FF2B5EF4-FFF2-40B4-BE49-F238E27FC236}">
+                <a16:creationId xmlns:a16="http://schemas.microsoft.com/office/drawing/2014/main" id="{62DD6BC9-CCB7-D44E-9631-3B4D0C34155A}"/>
+              </a:ext>
+            </a:extLst>
+          </p:cNvPr>
+          <p:cNvSpPr/>
+          <p:nvPr/>
+        </p:nvSpPr>
+        <p:spPr>
+          <a:xfrm rot="18862676">
+            <a:off x="6783735" y="4365561"/>
+            <a:ext cx="328781" cy="360473"/>
+          </a:xfrm>
+          <a:prstGeom prst="downArrow">
+            <a:avLst/>
+          </a:prstGeom>
+          <a:noFill/>
+          <a:ln w="12700">
+            <a:solidFill>
+              <a:schemeClr val="tx1">
+                <a:lumMod val="95000"/>
+                <a:lumOff val="5000"/>
+                <a:alpha val="33000"/>
+              </a:schemeClr>
+            </a:solidFill>
+          </a:ln>
+        </p:spPr>
+        <p:style>
+          <a:lnRef idx="2">
+            <a:schemeClr val="accent1">
+              <a:shade val="50000"/>
+            </a:schemeClr>
+          </a:lnRef>
+          <a:fillRef idx="1">
+            <a:schemeClr val="accent1"/>
+          </a:fillRef>
+          <a:effectRef idx="0">
+            <a:schemeClr val="accent1"/>
+          </a:effectRef>
+          <a:fontRef idx="minor">
+            <a:schemeClr val="lt1"/>
+          </a:fontRef>
+        </p:style>
+        <p:txBody>
+          <a:bodyPr rtlCol="0" anchor="ctr"/>
+          <a:lstStyle/>
+          <a:p>
+            <a:pPr algn="ctr"/>
+            <a:endParaRPr lang="en-CO" sz="1600"/>
+          </a:p>
+        </p:txBody>
+      </p:sp>
+      <p:sp>
+        <p:nvSpPr>
+          <p:cNvPr id="65" name="Down Arrow 64">
+            <a:extLst>
+              <a:ext uri="{FF2B5EF4-FFF2-40B4-BE49-F238E27FC236}">
+                <a16:creationId xmlns:a16="http://schemas.microsoft.com/office/drawing/2014/main" id="{9779FBDF-D9B1-8445-A132-F512602D9AF3}"/>
+              </a:ext>
+            </a:extLst>
+          </p:cNvPr>
+          <p:cNvSpPr/>
+          <p:nvPr/>
+        </p:nvSpPr>
+        <p:spPr>
+          <a:xfrm rot="2652359">
+            <a:off x="7585473" y="4363860"/>
+            <a:ext cx="328781" cy="360473"/>
+          </a:xfrm>
+          <a:prstGeom prst="downArrow">
+            <a:avLst/>
+          </a:prstGeom>
+          <a:noFill/>
+          <a:ln w="12700">
+            <a:solidFill>
+              <a:schemeClr val="tx1">
+                <a:lumMod val="95000"/>
+                <a:lumOff val="5000"/>
+                <a:alpha val="33000"/>
+              </a:schemeClr>
+            </a:solidFill>
+          </a:ln>
+        </p:spPr>
+        <p:style>
+          <a:lnRef idx="2">
+            <a:schemeClr val="accent1">
+              <a:shade val="50000"/>
+            </a:schemeClr>
+          </a:lnRef>
+          <a:fillRef idx="1">
+            <a:schemeClr val="accent1"/>
+          </a:fillRef>
+          <a:effectRef idx="0">
+            <a:schemeClr val="accent1"/>
+          </a:effectRef>
+          <a:fontRef idx="minor">
+            <a:schemeClr val="lt1"/>
+          </a:fontRef>
+        </p:style>
+        <p:txBody>
+          <a:bodyPr rtlCol="0" anchor="ctr"/>
+          <a:lstStyle/>
+          <a:p>
+            <a:pPr algn="ctr"/>
+            <a:endParaRPr lang="en-CO" sz="1600"/>
+          </a:p>
+        </p:txBody>
+      </p:sp>
+      <p:sp>
+        <p:nvSpPr>
+          <p:cNvPr id="66" name="Down Arrow 65">
+            <a:extLst>
+              <a:ext uri="{FF2B5EF4-FFF2-40B4-BE49-F238E27FC236}">
+                <a16:creationId xmlns:a16="http://schemas.microsoft.com/office/drawing/2014/main" id="{40EB7A74-76FE-2346-B0A7-D648F22A66DD}"/>
+              </a:ext>
+            </a:extLst>
+          </p:cNvPr>
+          <p:cNvSpPr/>
+          <p:nvPr/>
+        </p:nvSpPr>
+        <p:spPr>
+          <a:xfrm rot="18862676">
+            <a:off x="8469768" y="4357073"/>
+            <a:ext cx="328781" cy="360473"/>
+          </a:xfrm>
+          <a:prstGeom prst="downArrow">
+            <a:avLst/>
+          </a:prstGeom>
+          <a:noFill/>
+          <a:ln w="12700">
+            <a:solidFill>
+              <a:schemeClr val="tx1">
+                <a:lumMod val="95000"/>
+                <a:lumOff val="5000"/>
+                <a:alpha val="33000"/>
+              </a:schemeClr>
+            </a:solidFill>
+          </a:ln>
+        </p:spPr>
+        <p:style>
+          <a:lnRef idx="2">
+            <a:schemeClr val="accent1">
+              <a:shade val="50000"/>
+            </a:schemeClr>
+          </a:lnRef>
+          <a:fillRef idx="1">
+            <a:schemeClr val="accent1"/>
+          </a:fillRef>
+          <a:effectRef idx="0">
+            <a:schemeClr val="accent1"/>
+          </a:effectRef>
+          <a:fontRef idx="minor">
+            <a:schemeClr val="lt1"/>
+          </a:fontRef>
+        </p:style>
+        <p:txBody>
+          <a:bodyPr rtlCol="0" anchor="ctr"/>
+          <a:lstStyle/>
+          <a:p>
+            <a:pPr algn="ctr"/>
+            <a:endParaRPr lang="en-CO" sz="1600"/>
+          </a:p>
+        </p:txBody>
+      </p:sp>
+      <p:cxnSp>
+        <p:nvCxnSpPr>
+          <p:cNvPr id="68" name="Straight Connector 67">
+            <a:extLst>
+              <a:ext uri="{FF2B5EF4-FFF2-40B4-BE49-F238E27FC236}">
+                <a16:creationId xmlns:a16="http://schemas.microsoft.com/office/drawing/2014/main" id="{287CDBC5-D3D7-0446-B35E-E2837EE0825A}"/>
+              </a:ext>
+            </a:extLst>
+          </p:cNvPr>
+          <p:cNvCxnSpPr>
+            <a:cxnSpLocks/>
+          </p:cNvCxnSpPr>
+          <p:nvPr/>
+        </p:nvCxnSpPr>
+        <p:spPr>
+          <a:xfrm>
+            <a:off x="2081858" y="3247425"/>
+            <a:ext cx="7238346" cy="0"/>
+          </a:xfrm>
+          <a:prstGeom prst="line">
+            <a:avLst/>
+          </a:prstGeom>
+          <a:ln>
+            <a:solidFill>
+              <a:schemeClr val="dk1">
+                <a:shade val="95000"/>
+                <a:satMod val="105000"/>
+                <a:alpha val="53000"/>
+              </a:schemeClr>
+            </a:solidFill>
+          </a:ln>
+        </p:spPr>
+        <p:style>
+          <a:lnRef idx="1">
+            <a:schemeClr val="dk1"/>
+          </a:lnRef>
+          <a:fillRef idx="0">
+            <a:schemeClr val="dk1"/>
+          </a:fillRef>
+          <a:effectRef idx="0">
+            <a:schemeClr val="dk1"/>
+          </a:effectRef>
+          <a:fontRef idx="minor">
+            <a:schemeClr val="tx1"/>
+          </a:fontRef>
+        </p:style>
+      </p:cxnSp>
+      <p:cxnSp>
+        <p:nvCxnSpPr>
+          <p:cNvPr id="71" name="Straight Connector 70">
+            <a:extLst>
+              <a:ext uri="{FF2B5EF4-FFF2-40B4-BE49-F238E27FC236}">
+                <a16:creationId xmlns:a16="http://schemas.microsoft.com/office/drawing/2014/main" id="{2FB9B637-BA1C-4140-9260-BAD3B3095837}"/>
+              </a:ext>
+            </a:extLst>
+          </p:cNvPr>
+          <p:cNvCxnSpPr>
+            <a:cxnSpLocks/>
+          </p:cNvCxnSpPr>
+          <p:nvPr/>
+        </p:nvCxnSpPr>
+        <p:spPr>
+          <a:xfrm flipV="1">
+            <a:off x="3446943" y="2398738"/>
+            <a:ext cx="0" cy="2551400"/>
+          </a:xfrm>
+          <a:prstGeom prst="line">
+            <a:avLst/>
+          </a:prstGeom>
+          <a:ln>
+            <a:solidFill>
+              <a:schemeClr val="dk1">
+                <a:shade val="95000"/>
+                <a:satMod val="105000"/>
+                <a:alpha val="53000"/>
+              </a:schemeClr>
+            </a:solidFill>
+          </a:ln>
+        </p:spPr>
+        <p:style>
+          <a:lnRef idx="1">
+            <a:schemeClr val="dk1"/>
+          </a:lnRef>
+          <a:fillRef idx="0">
+            <a:schemeClr val="dk1"/>
+          </a:fillRef>
+          <a:effectRef idx="0">
+            <a:schemeClr val="dk1"/>
+          </a:effectRef>
+          <a:fontRef idx="minor">
+            <a:schemeClr val="tx1"/>
+          </a:fontRef>
+        </p:style>
+      </p:cxnSp>
+      <p:sp>
+        <p:nvSpPr>
+          <p:cNvPr id="75" name="Rectangle 74">
+            <a:extLst>
+              <a:ext uri="{FF2B5EF4-FFF2-40B4-BE49-F238E27FC236}">
+                <a16:creationId xmlns:a16="http://schemas.microsoft.com/office/drawing/2014/main" id="{2E72C5F0-CCF5-E64B-BD98-7BBF9CDB7D64}"/>
+              </a:ext>
+            </a:extLst>
+          </p:cNvPr>
+          <p:cNvSpPr/>
+          <p:nvPr/>
+        </p:nvSpPr>
+        <p:spPr>
+          <a:xfrm>
+            <a:off x="2434697" y="2703217"/>
+            <a:ext cx="853119" cy="307777"/>
+          </a:xfrm>
+          <a:prstGeom prst="rect">
+            <a:avLst/>
+          </a:prstGeom>
+        </p:spPr>
+        <p:txBody>
+          <a:bodyPr wrap="none">
+            <a:spAutoFit/>
+          </a:bodyPr>
+          <a:lstStyle/>
+          <a:p>
+            <a:pPr algn="r"/>
+            <a:r>
+              <a:rPr lang="en-US" sz="1400" b="1" dirty="0">
+                <a:solidFill>
+                  <a:schemeClr val="accent2">
+                    <a:lumMod val="50000"/>
+                  </a:schemeClr>
+                </a:solidFill>
+                <a:latin typeface="Times" pitchFamily="2" charset="0"/>
+              </a:rPr>
+              <a:t>Scenario</a:t>
+            </a:r>
+          </a:p>
+        </p:txBody>
+      </p:sp>
+      <p:cxnSp>
+        <p:nvCxnSpPr>
+          <p:cNvPr id="76" name="Straight Connector 75">
+            <a:extLst>
+              <a:ext uri="{FF2B5EF4-FFF2-40B4-BE49-F238E27FC236}">
+                <a16:creationId xmlns:a16="http://schemas.microsoft.com/office/drawing/2014/main" id="{1A460306-4A17-B947-B894-1C4C43FC1D80}"/>
+              </a:ext>
+            </a:extLst>
+          </p:cNvPr>
+          <p:cNvCxnSpPr>
+            <a:cxnSpLocks/>
+          </p:cNvCxnSpPr>
+          <p:nvPr/>
+        </p:nvCxnSpPr>
+        <p:spPr>
+          <a:xfrm>
+            <a:off x="2071963" y="4161825"/>
+            <a:ext cx="7238346" cy="0"/>
+          </a:xfrm>
+          <a:prstGeom prst="line">
+            <a:avLst/>
+          </a:prstGeom>
+          <a:ln>
+            <a:solidFill>
+              <a:schemeClr val="dk1">
+                <a:shade val="95000"/>
+                <a:satMod val="105000"/>
+                <a:alpha val="53000"/>
+              </a:schemeClr>
+            </a:solidFill>
+          </a:ln>
+        </p:spPr>
+        <p:style>
+          <a:lnRef idx="1">
+            <a:schemeClr val="dk1"/>
+          </a:lnRef>
+          <a:fillRef idx="0">
+            <a:schemeClr val="dk1"/>
+          </a:fillRef>
+          <a:effectRef idx="0">
+            <a:schemeClr val="dk1"/>
+          </a:effectRef>
+          <a:fontRef idx="minor">
+            <a:schemeClr val="tx1"/>
+          </a:fontRef>
+        </p:style>
+      </p:cxnSp>
+      <p:sp>
+        <p:nvSpPr>
+          <p:cNvPr id="77" name="Rectangle 76">
+            <a:extLst>
+              <a:ext uri="{FF2B5EF4-FFF2-40B4-BE49-F238E27FC236}">
+                <a16:creationId xmlns:a16="http://schemas.microsoft.com/office/drawing/2014/main" id="{59D22B05-6866-DD49-928C-9DD98ADE5524}"/>
+              </a:ext>
+            </a:extLst>
+          </p:cNvPr>
+          <p:cNvSpPr/>
+          <p:nvPr/>
+        </p:nvSpPr>
+        <p:spPr>
+          <a:xfrm>
+            <a:off x="2192828" y="3532371"/>
+            <a:ext cx="1258743" cy="307777"/>
+          </a:xfrm>
+          <a:prstGeom prst="rect">
+            <a:avLst/>
+          </a:prstGeom>
+        </p:spPr>
+        <p:txBody>
+          <a:bodyPr wrap="none">
+            <a:spAutoFit/>
+          </a:bodyPr>
+          <a:lstStyle/>
+          <a:p>
+            <a:pPr algn="r"/>
+            <a:r>
+              <a:rPr lang="en-US" sz="1400" b="1" dirty="0">
+                <a:solidFill>
+                  <a:schemeClr val="accent2">
+                    <a:lumMod val="50000"/>
+                  </a:schemeClr>
+                </a:solidFill>
+                <a:latin typeface="Times" pitchFamily="2" charset="0"/>
+              </a:rPr>
+              <a:t>Requirements</a:t>
+            </a:r>
+          </a:p>
+        </p:txBody>
+      </p:sp>
+      <p:sp>
+        <p:nvSpPr>
+          <p:cNvPr id="78" name="Rectangle 77">
+            <a:extLst>
+              <a:ext uri="{FF2B5EF4-FFF2-40B4-BE49-F238E27FC236}">
+                <a16:creationId xmlns:a16="http://schemas.microsoft.com/office/drawing/2014/main" id="{2A5A798B-D766-D446-9F36-ABC2E30D63AB}"/>
+              </a:ext>
+            </a:extLst>
+          </p:cNvPr>
+          <p:cNvSpPr/>
+          <p:nvPr/>
+        </p:nvSpPr>
+        <p:spPr>
+          <a:xfrm>
+            <a:off x="2155802" y="4437102"/>
+            <a:ext cx="1257075" cy="307777"/>
+          </a:xfrm>
+          <a:prstGeom prst="rect">
+            <a:avLst/>
+          </a:prstGeom>
+        </p:spPr>
+        <p:txBody>
+          <a:bodyPr wrap="none">
+            <a:spAutoFit/>
+          </a:bodyPr>
+          <a:lstStyle/>
+          <a:p>
+            <a:pPr algn="r"/>
+            <a:r>
+              <a:rPr lang="en-US" sz="1400" b="1" dirty="0">
+                <a:solidFill>
+                  <a:schemeClr val="accent2">
+                    <a:lumMod val="50000"/>
+                  </a:schemeClr>
+                </a:solidFill>
+                <a:latin typeface="Times" pitchFamily="2" charset="0"/>
+              </a:rPr>
+              <a:t>Involved tools</a:t>
+            </a:r>
+          </a:p>
+        </p:txBody>
+      </p:sp>
+      <p:sp>
+        <p:nvSpPr>
+          <p:cNvPr id="82" name="Rectangle 81">
+            <a:extLst>
+              <a:ext uri="{FF2B5EF4-FFF2-40B4-BE49-F238E27FC236}">
+                <a16:creationId xmlns:a16="http://schemas.microsoft.com/office/drawing/2014/main" id="{252E4BB4-D785-0144-8032-EA8926E085F5}"/>
+              </a:ext>
+            </a:extLst>
+          </p:cNvPr>
+          <p:cNvSpPr/>
+          <p:nvPr/>
+        </p:nvSpPr>
+        <p:spPr>
+          <a:xfrm>
+            <a:off x="3855838" y="5119415"/>
+            <a:ext cx="918841" cy="261610"/>
+          </a:xfrm>
+          <a:prstGeom prst="rect">
+            <a:avLst/>
+          </a:prstGeom>
+        </p:spPr>
+        <p:txBody>
+          <a:bodyPr wrap="none">
+            <a:spAutoFit/>
+          </a:bodyPr>
+          <a:lstStyle/>
+          <a:p>
+            <a:r>
+              <a:rPr lang="en-US" sz="1100" dirty="0">
+                <a:latin typeface="Times" pitchFamily="2" charset="0"/>
+              </a:rPr>
+              <a:t>(Joshi, 2020)</a:t>
+            </a:r>
+            <a:endParaRPr lang="en-CO" sz="1100" dirty="0">
+              <a:latin typeface="Times" pitchFamily="2" charset="0"/>
+            </a:endParaRPr>
+          </a:p>
+        </p:txBody>
+      </p:sp>
+      <p:sp>
+        <p:nvSpPr>
+          <p:cNvPr id="83" name="Rectangle 82">
+            <a:extLst>
+              <a:ext uri="{FF2B5EF4-FFF2-40B4-BE49-F238E27FC236}">
+                <a16:creationId xmlns:a16="http://schemas.microsoft.com/office/drawing/2014/main" id="{CA434F7C-8D0D-EC4D-A4BC-181BA4DB9D7E}"/>
+              </a:ext>
+            </a:extLst>
+          </p:cNvPr>
+          <p:cNvSpPr/>
+          <p:nvPr/>
+        </p:nvSpPr>
+        <p:spPr>
+          <a:xfrm>
+            <a:off x="4963386" y="5119415"/>
+            <a:ext cx="1414170" cy="261610"/>
+          </a:xfrm>
+          <a:prstGeom prst="rect">
+            <a:avLst/>
+          </a:prstGeom>
+        </p:spPr>
+        <p:txBody>
+          <a:bodyPr wrap="none">
+            <a:spAutoFit/>
+          </a:bodyPr>
+          <a:lstStyle/>
+          <a:p>
+            <a:r>
+              <a:rPr lang="en-US" sz="1100" dirty="0">
+                <a:latin typeface="Times" pitchFamily="2" charset="0"/>
+              </a:rPr>
+              <a:t>(D. Mukherjee, 2017)</a:t>
+            </a:r>
+            <a:endParaRPr lang="en-CO" sz="1100" dirty="0">
+              <a:latin typeface="Times" pitchFamily="2" charset="0"/>
+            </a:endParaRPr>
+          </a:p>
+        </p:txBody>
+      </p:sp>
+      <p:sp>
+        <p:nvSpPr>
+          <p:cNvPr id="85" name="Rectangle 84">
+            <a:extLst>
+              <a:ext uri="{FF2B5EF4-FFF2-40B4-BE49-F238E27FC236}">
+                <a16:creationId xmlns:a16="http://schemas.microsoft.com/office/drawing/2014/main" id="{63F6FDEC-BC69-2546-9106-F061D7B36D7E}"/>
+              </a:ext>
+            </a:extLst>
+          </p:cNvPr>
+          <p:cNvSpPr/>
+          <p:nvPr/>
+        </p:nvSpPr>
+        <p:spPr>
+          <a:xfrm>
+            <a:off x="6704330" y="5091936"/>
+            <a:ext cx="1308371" cy="261610"/>
+          </a:xfrm>
+          <a:prstGeom prst="rect">
+            <a:avLst/>
+          </a:prstGeom>
+        </p:spPr>
+        <p:txBody>
+          <a:bodyPr wrap="none">
+            <a:spAutoFit/>
+          </a:bodyPr>
+          <a:lstStyle/>
+          <a:p>
+            <a:r>
+              <a:rPr lang="en-US" sz="1100" dirty="0">
+                <a:latin typeface="Times" pitchFamily="2" charset="0"/>
+              </a:rPr>
+              <a:t>﻿(Y.-J. Chang, 2019)</a:t>
+            </a:r>
+            <a:endParaRPr lang="en-CO" sz="1100" dirty="0">
+              <a:latin typeface="Times" pitchFamily="2" charset="0"/>
+            </a:endParaRPr>
+          </a:p>
+        </p:txBody>
+      </p:sp>
+      <p:sp>
+        <p:nvSpPr>
+          <p:cNvPr id="86" name="Rectangle 85">
+            <a:extLst>
+              <a:ext uri="{FF2B5EF4-FFF2-40B4-BE49-F238E27FC236}">
+                <a16:creationId xmlns:a16="http://schemas.microsoft.com/office/drawing/2014/main" id="{5E1F51BF-B0AB-C34E-9013-7CC65D518A49}"/>
+              </a:ext>
+            </a:extLst>
+          </p:cNvPr>
+          <p:cNvSpPr/>
+          <p:nvPr/>
+        </p:nvSpPr>
+        <p:spPr>
+          <a:xfrm>
+            <a:off x="8205993" y="5091936"/>
+            <a:ext cx="1037463" cy="261610"/>
+          </a:xfrm>
+          <a:prstGeom prst="rect">
+            <a:avLst/>
+          </a:prstGeom>
+        </p:spPr>
+        <p:txBody>
+          <a:bodyPr wrap="none">
+            <a:spAutoFit/>
+          </a:bodyPr>
+          <a:lstStyle/>
+          <a:p>
+            <a:r>
+              <a:rPr lang="en-US" sz="1100" dirty="0">
+                <a:latin typeface="Times" pitchFamily="2" charset="0"/>
+              </a:rPr>
+              <a:t>﻿(Gomez, 2020)</a:t>
+            </a:r>
+            <a:endParaRPr lang="en-CO" sz="1100" dirty="0">
+              <a:latin typeface="Times" pitchFamily="2" charset="0"/>
+            </a:endParaRPr>
+          </a:p>
+        </p:txBody>
+      </p:sp>
+      <p:sp>
+        <p:nvSpPr>
+          <p:cNvPr id="87" name="TextBox 86">
+            <a:extLst>
+              <a:ext uri="{FF2B5EF4-FFF2-40B4-BE49-F238E27FC236}">
+                <a16:creationId xmlns:a16="http://schemas.microsoft.com/office/drawing/2014/main" id="{77A5DB0D-4568-744F-A91A-FE7CC8E29140}"/>
               </a:ext>
             </a:extLst>
           </p:cNvPr>
@@ -22550,8 +23901,8 @@
         </p:nvSpPr>
         <p:spPr>
           <a:xfrm>
-            <a:off x="762000" y="1601819"/>
-            <a:ext cx="5666740" cy="1191095"/>
+            <a:off x="1159497" y="2215299"/>
+            <a:ext cx="184731" cy="369332"/>
           </a:xfrm>
           <a:prstGeom prst="rect">
             <a:avLst/>
@@ -22559,200 +23910,19 @@
           <a:noFill/>
         </p:spPr>
         <p:txBody>
-          <a:bodyPr wrap="square" rtlCol="0">
+          <a:bodyPr wrap="none" rtlCol="0">
             <a:spAutoFit/>
           </a:bodyPr>
           <a:lstStyle/>
           <a:p>
-            <a:pPr marL="285750" lvl="1" indent="-285750" defTabSz="800100">
-              <a:lnSpc>
-                <a:spcPct val="90000"/>
-              </a:lnSpc>
-              <a:spcBef>
-                <a:spcPct val="0"/>
-              </a:spcBef>
-              <a:spcAft>
-                <a:spcPct val="15000"/>
-              </a:spcAft>
-              <a:buClr>
-                <a:schemeClr val="accent2">
-                  <a:lumMod val="50000"/>
-                </a:schemeClr>
-              </a:buClr>
-              <a:buFont typeface="Wingdings" pitchFamily="2" charset="2"/>
-              <a:buChar char="Ø"/>
-            </a:pPr>
-            <a:r>
-              <a:rPr lang="en-US" sz="1400" dirty="0">
-                <a:solidFill>
-                  <a:prstClr val="black"/>
-                </a:solidFill>
-                <a:highlight>
-                  <a:srgbClr val="FFFF00"/>
-                </a:highlight>
-                <a:latin typeface="Ancizar Sans Black"/>
-              </a:rPr>
-              <a:t>Upscaling vs super-resolution</a:t>
-            </a:r>
-          </a:p>
-          <a:p>
-            <a:pPr marL="285750" lvl="1" indent="-285750" defTabSz="800100">
-              <a:lnSpc>
-                <a:spcPct val="90000"/>
-              </a:lnSpc>
-              <a:spcBef>
-                <a:spcPct val="0"/>
-              </a:spcBef>
-              <a:spcAft>
-                <a:spcPct val="15000"/>
-              </a:spcAft>
-              <a:buClr>
-                <a:schemeClr val="accent2">
-                  <a:lumMod val="50000"/>
-                </a:schemeClr>
-              </a:buClr>
-              <a:buFont typeface="Wingdings" pitchFamily="2" charset="2"/>
-              <a:buChar char="Ø"/>
-            </a:pPr>
-            <a:endParaRPr lang="en-US" sz="1400" dirty="0">
-              <a:solidFill>
-                <a:prstClr val="black"/>
-              </a:solidFill>
-              <a:highlight>
-                <a:srgbClr val="FFFF00"/>
-              </a:highlight>
-              <a:latin typeface="Ancizar Sans Black"/>
-            </a:endParaRPr>
-          </a:p>
-          <a:p>
-            <a:pPr marL="285750" lvl="1" indent="-285750" defTabSz="800100">
-              <a:lnSpc>
-                <a:spcPct val="90000"/>
-              </a:lnSpc>
-              <a:spcBef>
-                <a:spcPct val="0"/>
-              </a:spcBef>
-              <a:spcAft>
-                <a:spcPct val="15000"/>
-              </a:spcAft>
-              <a:buClr>
-                <a:schemeClr val="accent2">
-                  <a:lumMod val="50000"/>
-                </a:schemeClr>
-              </a:buClr>
-              <a:buFont typeface="Wingdings" pitchFamily="2" charset="2"/>
-              <a:buChar char="Ø"/>
-            </a:pPr>
-            <a:r>
-              <a:rPr lang="en-US" sz="1400" dirty="0">
-                <a:solidFill>
-                  <a:prstClr val="black"/>
-                </a:solidFill>
-                <a:highlight>
-                  <a:srgbClr val="FFFF00"/>
-                </a:highlight>
-                <a:latin typeface="Ancizar Sans Black"/>
-              </a:rPr>
-              <a:t>Super-resolution leverage by restoration filters</a:t>
-            </a:r>
-          </a:p>
-          <a:p>
-            <a:pPr marL="285750" lvl="1" indent="-285750" defTabSz="800100">
-              <a:lnSpc>
-                <a:spcPct val="90000"/>
-              </a:lnSpc>
-              <a:spcBef>
-                <a:spcPct val="0"/>
-              </a:spcBef>
-              <a:spcAft>
-                <a:spcPct val="15000"/>
-              </a:spcAft>
-              <a:buClr>
-                <a:schemeClr val="accent2">
-                  <a:lumMod val="50000"/>
-                </a:schemeClr>
-              </a:buClr>
-              <a:buFont typeface="Wingdings" pitchFamily="2" charset="2"/>
-              <a:buChar char="Ø"/>
-            </a:pPr>
-            <a:endParaRPr lang="en-US" sz="1400" dirty="0">
-              <a:solidFill>
-                <a:prstClr val="black"/>
-              </a:solidFill>
-              <a:highlight>
-                <a:srgbClr val="FFFF00"/>
-              </a:highlight>
-              <a:latin typeface="Ancizar Sans Black"/>
-            </a:endParaRPr>
-          </a:p>
-          <a:p>
-            <a:pPr marL="285750" lvl="1" indent="-285750" defTabSz="800100">
-              <a:lnSpc>
-                <a:spcPct val="90000"/>
-              </a:lnSpc>
-              <a:spcBef>
-                <a:spcPct val="0"/>
-              </a:spcBef>
-              <a:spcAft>
-                <a:spcPct val="15000"/>
-              </a:spcAft>
-              <a:buClr>
-                <a:schemeClr val="accent2">
-                  <a:lumMod val="50000"/>
-                </a:schemeClr>
-              </a:buClr>
-              <a:buFont typeface="Wingdings" pitchFamily="2" charset="2"/>
-              <a:buChar char="Ø"/>
-            </a:pPr>
-            <a:r>
-              <a:rPr lang="en-US" sz="1400" dirty="0">
-                <a:solidFill>
-                  <a:prstClr val="black"/>
-                </a:solidFill>
-                <a:highlight>
-                  <a:srgbClr val="FFFF00"/>
-                </a:highlight>
-                <a:latin typeface="Ancizar Sans Black"/>
-              </a:rPr>
-              <a:t>Efficient storage usage because rate control mechanism</a:t>
-            </a:r>
+            <a:endParaRPr lang="en-CO" dirty="0"/>
           </a:p>
         </p:txBody>
       </p:sp>
-      <p:pic>
-        <p:nvPicPr>
-          <p:cNvPr id="3" name="Picture 2">
-            <a:extLst>
-              <a:ext uri="{FF2B5EF4-FFF2-40B4-BE49-F238E27FC236}">
-                <a16:creationId xmlns:a16="http://schemas.microsoft.com/office/drawing/2014/main" id="{EA95B46A-4192-3849-8F44-8DB029078742}"/>
-              </a:ext>
-            </a:extLst>
-          </p:cNvPr>
-          <p:cNvPicPr>
-            <a:picLocks noChangeAspect="1"/>
-          </p:cNvPicPr>
-          <p:nvPr/>
-        </p:nvPicPr>
-        <p:blipFill>
-          <a:blip r:embed="rId3"/>
-          <a:stretch>
-            <a:fillRect/>
-          </a:stretch>
-        </p:blipFill>
-        <p:spPr>
-          <a:xfrm>
-            <a:off x="5486400" y="1666811"/>
-            <a:ext cx="6096000" cy="2070100"/>
-          </a:xfrm>
-          <a:prstGeom prst="rect">
-            <a:avLst/>
-          </a:prstGeom>
-        </p:spPr>
-      </p:pic>
     </p:spTree>
     <p:extLst>
       <p:ext uri="{BB962C8B-B14F-4D97-AF65-F5344CB8AC3E}">
-        <p14:creationId xmlns:p14="http://schemas.microsoft.com/office/powerpoint/2010/main" val="114275109"/>
+        <p14:creationId xmlns:p14="http://schemas.microsoft.com/office/powerpoint/2010/main" val="841229332"/>
       </p:ext>
     </p:extLst>
   </p:cSld>
@@ -24013,7 +25183,7 @@
         <p:spPr>
           <a:xfrm>
             <a:off x="379222" y="1066800"/>
-            <a:ext cx="11433555" cy="4909036"/>
+            <a:ext cx="11433555" cy="5924699"/>
           </a:xfrm>
         </p:spPr>
         <p:txBody>
@@ -24453,6 +25623,104 @@
               <a:rPr lang="en-US" sz="1100" dirty="0"/>
               <a:t> (ISCAS), 2018.</a:t>
             </a:r>
+          </a:p>
+          <a:p>
+            <a:pPr marL="285750" indent="-285750">
+              <a:buFont typeface="Arial" panose="020B0604020202020204" pitchFamily="34" charset="0"/>
+              <a:buChar char="•"/>
+            </a:pPr>
+            <a:r>
+              <a:rPr lang="en-US" sz="1100" dirty="0"/>
+              <a:t>D. Mukherjee, S. Li, Y. Chen, A. Anis, S. Parker and J. </a:t>
+            </a:r>
+            <a:r>
+              <a:rPr lang="en-US" sz="1100" dirty="0" err="1"/>
+              <a:t>Bankoski</a:t>
+            </a:r>
+            <a:r>
+              <a:rPr lang="en-US" sz="1100" dirty="0"/>
+              <a:t>, "A switchable loop-restoration with side-information framework for the emerging AV1 video codec," </a:t>
+            </a:r>
+            <a:r>
+              <a:rPr lang="en-US" sz="1100" i="1" dirty="0"/>
+              <a:t>2017 IEEE International Conference on Image Processing (ICIP)</a:t>
+            </a:r>
+            <a:r>
+              <a:rPr lang="en-US" sz="1100" dirty="0"/>
+              <a:t>, Beijing, 2017, pp. 265-269, </a:t>
+            </a:r>
+            <a:r>
+              <a:rPr lang="en-US" sz="1100" dirty="0" err="1"/>
+              <a:t>doi</a:t>
+            </a:r>
+            <a:r>
+              <a:rPr lang="en-US" sz="1100" dirty="0"/>
+              <a:t>: 10.1109/ICIP.2017.8296284.</a:t>
+            </a:r>
+          </a:p>
+          <a:p>
+            <a:pPr marL="285750" indent="-285750">
+              <a:buFont typeface="Arial" panose="020B0604020202020204" pitchFamily="34" charset="0"/>
+              <a:buChar char="•"/>
+            </a:pPr>
+            <a:r>
+              <a:rPr lang="en-US" sz="1100" dirty="0"/>
+              <a:t>﻿Y.-J. Chang, H.-J. </a:t>
+            </a:r>
+            <a:r>
+              <a:rPr lang="en-US" sz="1100" dirty="0" err="1"/>
+              <a:t>Jhu</a:t>
+            </a:r>
+            <a:r>
+              <a:rPr lang="en-US" sz="1100" dirty="0"/>
+              <a:t>, H.-Y. Jian, L. Zhao, X. Zhao, X. Li, S. Liu, B. </a:t>
+            </a:r>
+            <a:r>
+              <a:rPr lang="en-US" sz="1100" dirty="0" err="1"/>
+              <a:t>Bross</a:t>
+            </a:r>
+            <a:r>
+              <a:rPr lang="en-US" sz="1100" dirty="0"/>
+              <a:t>, P. </a:t>
+            </a:r>
+            <a:r>
+              <a:rPr lang="en-US" sz="1100" dirty="0" err="1"/>
+              <a:t>Keydel</a:t>
+            </a:r>
+            <a:r>
+              <a:rPr lang="en-US" sz="1100" dirty="0"/>
+              <a:t>, H. Schwarz, D. </a:t>
+            </a:r>
+            <a:r>
+              <a:rPr lang="en-US" sz="1100" dirty="0" err="1"/>
+              <a:t>Marpe</a:t>
+            </a:r>
+            <a:r>
+              <a:rPr lang="en-US" sz="1100" dirty="0"/>
+              <a:t>, and T. Wiegand. Intra prediction using </a:t>
+            </a:r>
+            <a:r>
+              <a:rPr lang="en-US" sz="1100" dirty="0" err="1"/>
+              <a:t>mul</a:t>
+            </a:r>
+            <a:r>
+              <a:rPr lang="en-US" sz="1100" dirty="0"/>
+              <a:t>- tiple reference lines for the versatile video coding standard. In A. G. </a:t>
+            </a:r>
+            <a:r>
+              <a:rPr lang="en-US" sz="1100" dirty="0" err="1"/>
+              <a:t>Tescher</a:t>
+            </a:r>
+            <a:r>
+              <a:rPr lang="en-US" sz="1100" dirty="0"/>
+              <a:t> and T. Ebrahimi, editors, Applications of Digital Image Processing XLII, volume 11137, pages 302 – 309. International Society for Optics and Photonics, SPIE, 2019.</a:t>
+            </a:r>
+          </a:p>
+          <a:p>
+            <a:br>
+              <a:rPr lang="en-US" sz="1100" dirty="0"/>
+            </a:br>
+            <a:endParaRPr lang="en-US" sz="1100" dirty="0"/>
           </a:p>
           <a:p>
             <a:pPr marL="285750" indent="-285750">

</xml_diff>